<commit_message>
Thesis + presentation changes
</commit_message>
<xml_diff>
--- a/Presentazione_Tesi_Triennale_Informatica_Unimore_2022_2023_Enrico_Marras_152336.pptx
+++ b/Presentazione_Tesi_Triennale_Informatica_Unimore_2022_2023_Enrico_Marras_152336.pptx
@@ -5,7 +5,7 @@
     <p:sldMasterId id="2147483648" r:id="rId1"/>
   </p:sldMasterIdLst>
   <p:notesMasterIdLst>
-    <p:notesMasterId r:id="rId27"/>
+    <p:notesMasterId r:id="rId28"/>
   </p:notesMasterIdLst>
   <p:sldIdLst>
     <p:sldId id="256" r:id="rId2"/>
@@ -27,12 +27,13 @@
     <p:sldId id="270" r:id="rId18"/>
     <p:sldId id="283" r:id="rId19"/>
     <p:sldId id="266" r:id="rId20"/>
-    <p:sldId id="271" r:id="rId21"/>
-    <p:sldId id="284" r:id="rId22"/>
-    <p:sldId id="274" r:id="rId23"/>
-    <p:sldId id="285" r:id="rId24"/>
-    <p:sldId id="286" r:id="rId25"/>
-    <p:sldId id="272" r:id="rId26"/>
+    <p:sldId id="287" r:id="rId21"/>
+    <p:sldId id="271" r:id="rId22"/>
+    <p:sldId id="284" r:id="rId23"/>
+    <p:sldId id="274" r:id="rId24"/>
+    <p:sldId id="285" r:id="rId25"/>
+    <p:sldId id="286" r:id="rId26"/>
+    <p:sldId id="272" r:id="rId27"/>
   </p:sldIdLst>
   <p:sldSz cx="12192000" cy="6858000"/>
   <p:notesSz cx="6858000" cy="9144000"/>
@@ -1274,6 +1275,431 @@
             </c:ext>
           </c:extLst>
         </c:ser>
+        <c:dLbls>
+          <c:showLegendKey val="0"/>
+          <c:showVal val="0"/>
+          <c:showCatName val="0"/>
+          <c:showSerName val="0"/>
+          <c:showPercent val="0"/>
+          <c:showBubbleSize val="0"/>
+        </c:dLbls>
+        <c:smooth val="0"/>
+        <c:axId val="1527741247"/>
+        <c:axId val="1689843311"/>
+      </c:lineChart>
+      <c:catAx>
+        <c:axId val="1527741247"/>
+        <c:scaling>
+          <c:orientation val="minMax"/>
+        </c:scaling>
+        <c:delete val="0"/>
+        <c:axPos val="b"/>
+        <c:title>
+          <c:tx>
+            <c:rich>
+              <a:bodyPr rot="0" spcFirstLastPara="1" vertOverflow="ellipsis" vert="horz" wrap="square" anchor="ctr" anchorCtr="1"/>
+              <a:lstStyle/>
+              <a:p>
+                <a:pPr>
+                  <a:defRPr sz="1400" b="1" i="0" u="none" strike="noStrike" kern="1200" baseline="0">
+                    <a:solidFill>
+                      <a:schemeClr val="tx2"/>
+                    </a:solidFill>
+                    <a:latin typeface="Times New Roman" panose="02020603050405020304" pitchFamily="18" charset="0"/>
+                    <a:ea typeface="+mn-ea"/>
+                    <a:cs typeface="Times New Roman" panose="02020603050405020304" pitchFamily="18" charset="0"/>
+                  </a:defRPr>
+                </a:pPr>
+                <a:r>
+                  <a:rPr lang="it-IT" sz="1400" b="0"/>
+                  <a:t>Campionamenti</a:t>
+                </a:r>
+              </a:p>
+            </c:rich>
+          </c:tx>
+          <c:layout>
+            <c:manualLayout>
+              <c:xMode val="edge"/>
+              <c:yMode val="edge"/>
+              <c:x val="0.46671295949599639"/>
+              <c:y val="0.83536012863544107"/>
+            </c:manualLayout>
+          </c:layout>
+          <c:overlay val="0"/>
+          <c:spPr>
+            <a:noFill/>
+            <a:ln>
+              <a:noFill/>
+            </a:ln>
+            <a:effectLst/>
+          </c:spPr>
+          <c:txPr>
+            <a:bodyPr rot="0" spcFirstLastPara="1" vertOverflow="ellipsis" vert="horz" wrap="square" anchor="ctr" anchorCtr="1"/>
+            <a:lstStyle/>
+            <a:p>
+              <a:pPr>
+                <a:defRPr sz="1400" b="1" i="0" u="none" strike="noStrike" kern="1200" baseline="0">
+                  <a:solidFill>
+                    <a:schemeClr val="tx2"/>
+                  </a:solidFill>
+                  <a:latin typeface="Times New Roman" panose="02020603050405020304" pitchFamily="18" charset="0"/>
+                  <a:ea typeface="+mn-ea"/>
+                  <a:cs typeface="Times New Roman" panose="02020603050405020304" pitchFamily="18" charset="0"/>
+                </a:defRPr>
+              </a:pPr>
+              <a:endParaRPr lang="it-IT"/>
+            </a:p>
+          </c:txPr>
+        </c:title>
+        <c:numFmt formatCode="General" sourceLinked="1"/>
+        <c:majorTickMark val="out"/>
+        <c:minorTickMark val="none"/>
+        <c:tickLblPos val="nextTo"/>
+        <c:spPr>
+          <a:noFill/>
+          <a:ln w="9525" cap="flat" cmpd="sng" algn="ctr">
+            <a:solidFill>
+              <a:schemeClr val="tx2">
+                <a:lumMod val="15000"/>
+                <a:lumOff val="85000"/>
+              </a:schemeClr>
+            </a:solidFill>
+            <a:round/>
+          </a:ln>
+          <a:effectLst/>
+        </c:spPr>
+        <c:txPr>
+          <a:bodyPr rot="-60000000" spcFirstLastPara="1" vertOverflow="ellipsis" vert="horz" wrap="square" anchor="ctr" anchorCtr="1"/>
+          <a:lstStyle/>
+          <a:p>
+            <a:pPr>
+              <a:defRPr sz="1200" b="0" i="0" u="none" strike="noStrike" kern="1200" baseline="0">
+                <a:solidFill>
+                  <a:schemeClr val="tx2"/>
+                </a:solidFill>
+                <a:latin typeface="Times New Roman" panose="02020603050405020304" pitchFamily="18" charset="0"/>
+                <a:ea typeface="+mn-ea"/>
+                <a:cs typeface="Times New Roman" panose="02020603050405020304" pitchFamily="18" charset="0"/>
+              </a:defRPr>
+            </a:pPr>
+            <a:endParaRPr lang="it-IT"/>
+          </a:p>
+        </c:txPr>
+        <c:crossAx val="1689843311"/>
+        <c:crosses val="autoZero"/>
+        <c:auto val="1"/>
+        <c:lblAlgn val="ctr"/>
+        <c:lblOffset val="100"/>
+        <c:noMultiLvlLbl val="0"/>
+      </c:catAx>
+      <c:valAx>
+        <c:axId val="1689843311"/>
+        <c:scaling>
+          <c:orientation val="minMax"/>
+        </c:scaling>
+        <c:delete val="0"/>
+        <c:axPos val="l"/>
+        <c:majorGridlines>
+          <c:spPr>
+            <a:ln w="9525" cap="flat" cmpd="sng" algn="ctr">
+              <a:solidFill>
+                <a:schemeClr val="tx2">
+                  <a:lumMod val="15000"/>
+                  <a:lumOff val="85000"/>
+                </a:schemeClr>
+              </a:solidFill>
+              <a:round/>
+            </a:ln>
+            <a:effectLst/>
+          </c:spPr>
+        </c:majorGridlines>
+        <c:title>
+          <c:tx>
+            <c:rich>
+              <a:bodyPr rot="-5400000" spcFirstLastPara="1" vertOverflow="ellipsis" vert="horz" wrap="square" anchor="ctr" anchorCtr="1"/>
+              <a:lstStyle/>
+              <a:p>
+                <a:pPr>
+                  <a:defRPr sz="1600" b="1" i="0" u="none" strike="noStrike" kern="1200" baseline="0">
+                    <a:solidFill>
+                      <a:schemeClr val="tx2"/>
+                    </a:solidFill>
+                    <a:latin typeface="Times New Roman" panose="02020603050405020304" pitchFamily="18" charset="0"/>
+                    <a:ea typeface="+mn-ea"/>
+                    <a:cs typeface="Times New Roman" panose="02020603050405020304" pitchFamily="18" charset="0"/>
+                  </a:defRPr>
+                </a:pPr>
+                <a:r>
+                  <a:rPr lang="it-IT" sz="1600" b="0"/>
+                  <a:t>Secondi</a:t>
+                </a:r>
+              </a:p>
+            </c:rich>
+          </c:tx>
+          <c:overlay val="0"/>
+          <c:spPr>
+            <a:noFill/>
+            <a:ln>
+              <a:noFill/>
+            </a:ln>
+            <a:effectLst/>
+          </c:spPr>
+          <c:txPr>
+            <a:bodyPr rot="-5400000" spcFirstLastPara="1" vertOverflow="ellipsis" vert="horz" wrap="square" anchor="ctr" anchorCtr="1"/>
+            <a:lstStyle/>
+            <a:p>
+              <a:pPr>
+                <a:defRPr sz="1600" b="1" i="0" u="none" strike="noStrike" kern="1200" baseline="0">
+                  <a:solidFill>
+                    <a:schemeClr val="tx2"/>
+                  </a:solidFill>
+                  <a:latin typeface="Times New Roman" panose="02020603050405020304" pitchFamily="18" charset="0"/>
+                  <a:ea typeface="+mn-ea"/>
+                  <a:cs typeface="Times New Roman" panose="02020603050405020304" pitchFamily="18" charset="0"/>
+                </a:defRPr>
+              </a:pPr>
+              <a:endParaRPr lang="it-IT"/>
+            </a:p>
+          </c:txPr>
+        </c:title>
+        <c:numFmt formatCode="0" sourceLinked="0"/>
+        <c:majorTickMark val="none"/>
+        <c:minorTickMark val="none"/>
+        <c:tickLblPos val="nextTo"/>
+        <c:spPr>
+          <a:noFill/>
+          <a:ln>
+            <a:noFill/>
+          </a:ln>
+          <a:effectLst/>
+        </c:spPr>
+        <c:txPr>
+          <a:bodyPr rot="-60000000" spcFirstLastPara="1" vertOverflow="ellipsis" vert="horz" wrap="square" anchor="ctr" anchorCtr="1"/>
+          <a:lstStyle/>
+          <a:p>
+            <a:pPr>
+              <a:defRPr sz="1200" b="0" i="0" u="none" strike="noStrike" kern="1200" baseline="0">
+                <a:solidFill>
+                  <a:schemeClr val="tx2"/>
+                </a:solidFill>
+                <a:latin typeface="Times New Roman" panose="02020603050405020304" pitchFamily="18" charset="0"/>
+                <a:ea typeface="+mn-ea"/>
+                <a:cs typeface="Times New Roman" panose="02020603050405020304" pitchFamily="18" charset="0"/>
+              </a:defRPr>
+            </a:pPr>
+            <a:endParaRPr lang="it-IT"/>
+          </a:p>
+        </c:txPr>
+        <c:crossAx val="1527741247"/>
+        <c:crosses val="autoZero"/>
+        <c:crossBetween val="between"/>
+      </c:valAx>
+      <c:spPr>
+        <a:noFill/>
+        <a:ln>
+          <a:noFill/>
+        </a:ln>
+        <a:effectLst/>
+      </c:spPr>
+    </c:plotArea>
+    <c:legend>
+      <c:legendPos val="b"/>
+      <c:overlay val="0"/>
+      <c:spPr>
+        <a:noFill/>
+        <a:ln>
+          <a:noFill/>
+        </a:ln>
+        <a:effectLst/>
+      </c:spPr>
+      <c:txPr>
+        <a:bodyPr rot="0" spcFirstLastPara="1" vertOverflow="ellipsis" vert="horz" wrap="square" anchor="ctr" anchorCtr="1"/>
+        <a:lstStyle/>
+        <a:p>
+          <a:pPr>
+            <a:defRPr sz="1200" b="0" i="0" u="none" strike="noStrike" kern="1200" baseline="0">
+              <a:solidFill>
+                <a:schemeClr val="tx2"/>
+              </a:solidFill>
+              <a:latin typeface="Times New Roman" panose="02020603050405020304" pitchFamily="18" charset="0"/>
+              <a:ea typeface="+mn-ea"/>
+              <a:cs typeface="Times New Roman" panose="02020603050405020304" pitchFamily="18" charset="0"/>
+            </a:defRPr>
+          </a:pPr>
+          <a:endParaRPr lang="it-IT"/>
+        </a:p>
+      </c:txPr>
+    </c:legend>
+    <c:plotVisOnly val="1"/>
+    <c:dispBlanksAs val="gap"/>
+    <c:showDLblsOverMax val="0"/>
+  </c:chart>
+  <c:spPr>
+    <a:solidFill>
+      <a:schemeClr val="bg1"/>
+    </a:solidFill>
+    <a:ln w="9525" cap="flat" cmpd="sng" algn="ctr">
+      <a:noFill/>
+      <a:round/>
+    </a:ln>
+    <a:effectLst/>
+  </c:spPr>
+  <c:txPr>
+    <a:bodyPr/>
+    <a:lstStyle/>
+    <a:p>
+      <a:pPr>
+        <a:defRPr>
+          <a:latin typeface="Times New Roman" panose="02020603050405020304" pitchFamily="18" charset="0"/>
+          <a:cs typeface="Times New Roman" panose="02020603050405020304" pitchFamily="18" charset="0"/>
+        </a:defRPr>
+      </a:pPr>
+      <a:endParaRPr lang="it-IT"/>
+    </a:p>
+  </c:txPr>
+  <c:externalData r:id="rId4">
+    <c:autoUpdate val="0"/>
+  </c:externalData>
+</c:chartSpace>
+</file>
+
+<file path=ppt/charts/chart3.xml><?xml version="1.0" encoding="utf-8"?>
+<c:chartSpace xmlns:c="http://schemas.openxmlformats.org/drawingml/2006/chart" xmlns:a="http://schemas.openxmlformats.org/drawingml/2006/main" xmlns:r="http://schemas.openxmlformats.org/officeDocument/2006/relationships" xmlns:c16r2="http://schemas.microsoft.com/office/drawing/2015/06/chart">
+  <c:date1904 val="0"/>
+  <c:lang val="en-US"/>
+  <c:roundedCorners val="0"/>
+  <mc:AlternateContent xmlns:mc="http://schemas.openxmlformats.org/markup-compatibility/2006">
+    <mc:Choice xmlns:c14="http://schemas.microsoft.com/office/drawing/2007/8/2/chart" Requires="c14">
+      <c14:style val="102"/>
+    </mc:Choice>
+    <mc:Fallback>
+      <c:style val="2"/>
+    </mc:Fallback>
+  </mc:AlternateContent>
+  <c:clrMapOvr bg1="lt1" tx1="dk1" bg2="lt2" tx2="dk2" accent1="accent1" accent2="accent2" accent3="accent3" accent4="accent4" accent5="accent5" accent6="accent6" hlink="hlink" folHlink="folHlink"/>
+  <c:chart>
+    <c:autoTitleDeleted val="1"/>
+    <c:plotArea>
+      <c:layout>
+        <c:manualLayout>
+          <c:layoutTarget val="inner"/>
+          <c:xMode val="edge"/>
+          <c:yMode val="edge"/>
+          <c:x val="9.217807067638116E-2"/>
+          <c:y val="5.0925972777412336E-2"/>
+          <c:w val="0.88139547421437181"/>
+          <c:h val="0.71536966798383761"/>
+        </c:manualLayout>
+      </c:layout>
+      <c:lineChart>
+        <c:grouping val="standard"/>
+        <c:varyColors val="0"/>
+        <c:ser>
+          <c:idx val="0"/>
+          <c:order val="0"/>
+          <c:tx>
+            <c:strRef>
+              <c:f>Sheet1!$A$1</c:f>
+              <c:strCache>
+                <c:ptCount val="1"/>
+                <c:pt idx="0">
+                  <c:v>Software originale</c:v>
+                </c:pt>
+              </c:strCache>
+            </c:strRef>
+          </c:tx>
+          <c:spPr>
+            <a:ln w="25400" cap="rnd">
+              <a:solidFill>
+                <a:srgbClr val="FF4B4B"/>
+              </a:solidFill>
+              <a:prstDash val="solid"/>
+              <a:round/>
+            </a:ln>
+            <a:effectLst>
+              <a:glow>
+                <a:schemeClr val="accent1">
+                  <a:alpha val="40000"/>
+                </a:schemeClr>
+              </a:glow>
+            </a:effectLst>
+          </c:spPr>
+          <c:marker>
+            <c:symbol val="none"/>
+          </c:marker>
+          <c:val>
+            <c:numRef>
+              <c:f>Sheet1!$A$2:$A$20</c:f>
+              <c:numCache>
+                <c:formatCode>0.00</c:formatCode>
+                <c:ptCount val="19"/>
+                <c:pt idx="0">
+                  <c:v>6.92</c:v>
+                </c:pt>
+                <c:pt idx="1">
+                  <c:v>5.38</c:v>
+                </c:pt>
+                <c:pt idx="2">
+                  <c:v>5.81</c:v>
+                </c:pt>
+                <c:pt idx="3">
+                  <c:v>6.61</c:v>
+                </c:pt>
+                <c:pt idx="4">
+                  <c:v>12.87</c:v>
+                </c:pt>
+                <c:pt idx="5">
+                  <c:v>6.48</c:v>
+                </c:pt>
+                <c:pt idx="6">
+                  <c:v>6.42</c:v>
+                </c:pt>
+                <c:pt idx="7">
+                  <c:v>5.98</c:v>
+                </c:pt>
+                <c:pt idx="8">
+                  <c:v>5.79</c:v>
+                </c:pt>
+                <c:pt idx="9">
+                  <c:v>11.54</c:v>
+                </c:pt>
+                <c:pt idx="10">
+                  <c:v>6.32</c:v>
+                </c:pt>
+                <c:pt idx="11">
+                  <c:v>6.94</c:v>
+                </c:pt>
+                <c:pt idx="12">
+                  <c:v>5.52</c:v>
+                </c:pt>
+                <c:pt idx="13">
+                  <c:v>6.52</c:v>
+                </c:pt>
+                <c:pt idx="14">
+                  <c:v>5.91</c:v>
+                </c:pt>
+                <c:pt idx="15">
+                  <c:v>7.13</c:v>
+                </c:pt>
+                <c:pt idx="16">
+                  <c:v>6.28</c:v>
+                </c:pt>
+                <c:pt idx="17">
+                  <c:v>12.26</c:v>
+                </c:pt>
+                <c:pt idx="18">
+                  <c:v>5.62</c:v>
+                </c:pt>
+              </c:numCache>
+            </c:numRef>
+          </c:val>
+          <c:smooth val="0"/>
+          <c:extLst>
+            <c:ext xmlns:c16="http://schemas.microsoft.com/office/drawing/2014/chart" uri="{C3380CC4-5D6E-409C-BE32-E72D297353CC}">
+              <c16:uniqueId val="{00000000-72A7-412A-B95B-5CF86AF62D58}"/>
+            </c:ext>
+          </c:extLst>
+        </c:ser>
         <c:ser>
           <c:idx val="1"/>
           <c:order val="1"/>
@@ -1664,7 +2090,7 @@
 </c:chartSpace>
 </file>
 
-<file path=ppt/charts/chart3.xml><?xml version="1.0" encoding="utf-8"?>
+<file path=ppt/charts/chart4.xml><?xml version="1.0" encoding="utf-8"?>
 <c:chartSpace xmlns:c="http://schemas.openxmlformats.org/drawingml/2006/chart" xmlns:a="http://schemas.openxmlformats.org/drawingml/2006/main" xmlns:r="http://schemas.openxmlformats.org/officeDocument/2006/relationships" xmlns:c16r2="http://schemas.microsoft.com/office/drawing/2015/06/chart">
   <c:date1904 val="0"/>
   <c:lang val="en-US"/>
@@ -2229,6 +2655,46 @@
 </file>
 
 <file path=ppt/charts/colors3.xml><?xml version="1.0" encoding="utf-8"?>
+<cs:colorStyle xmlns:cs="http://schemas.microsoft.com/office/drawing/2012/chartStyle" xmlns:a="http://schemas.openxmlformats.org/drawingml/2006/main" meth="cycle" id="10">
+  <a:schemeClr val="accent1"/>
+  <a:schemeClr val="accent2"/>
+  <a:schemeClr val="accent3"/>
+  <a:schemeClr val="accent4"/>
+  <a:schemeClr val="accent5"/>
+  <a:schemeClr val="accent6"/>
+  <cs:variation/>
+  <cs:variation>
+    <a:lumMod val="60000"/>
+  </cs:variation>
+  <cs:variation>
+    <a:lumMod val="80000"/>
+    <a:lumOff val="20000"/>
+  </cs:variation>
+  <cs:variation>
+    <a:lumMod val="80000"/>
+  </cs:variation>
+  <cs:variation>
+    <a:lumMod val="60000"/>
+    <a:lumOff val="40000"/>
+  </cs:variation>
+  <cs:variation>
+    <a:lumMod val="50000"/>
+  </cs:variation>
+  <cs:variation>
+    <a:lumMod val="70000"/>
+    <a:lumOff val="30000"/>
+  </cs:variation>
+  <cs:variation>
+    <a:lumMod val="70000"/>
+  </cs:variation>
+  <cs:variation>
+    <a:lumMod val="50000"/>
+    <a:lumOff val="50000"/>
+  </cs:variation>
+</cs:colorStyle>
+</file>
+
+<file path=ppt/charts/colors4.xml><?xml version="1.0" encoding="utf-8"?>
 <cs:colorStyle xmlns:cs="http://schemas.microsoft.com/office/drawing/2012/chartStyle" xmlns:a="http://schemas.openxmlformats.org/drawingml/2006/main" meth="cycle" id="10">
   <a:schemeClr val="accent1"/>
   <a:schemeClr val="accent2"/>
@@ -3253,6 +3719,474 @@
 </file>
 
 <file path=ppt/charts/style3.xml><?xml version="1.0" encoding="utf-8"?>
+<cs:chartStyle xmlns:cs="http://schemas.microsoft.com/office/drawing/2012/chartStyle" xmlns:a="http://schemas.openxmlformats.org/drawingml/2006/main" id="231">
+  <cs:axisTitle>
+    <cs:lnRef idx="0"/>
+    <cs:fillRef idx="0"/>
+    <cs:effectRef idx="0"/>
+    <cs:fontRef idx="minor">
+      <a:schemeClr val="tx2"/>
+    </cs:fontRef>
+    <cs:defRPr sz="900" b="1" kern="1200"/>
+  </cs:axisTitle>
+  <cs:categoryAxis>
+    <cs:lnRef idx="0"/>
+    <cs:fillRef idx="0"/>
+    <cs:effectRef idx="0"/>
+    <cs:fontRef idx="minor">
+      <a:schemeClr val="tx2"/>
+    </cs:fontRef>
+    <cs:spPr>
+      <a:ln w="9525" cap="flat" cmpd="sng" algn="ctr">
+        <a:solidFill>
+          <a:schemeClr val="tx2">
+            <a:lumMod val="15000"/>
+            <a:lumOff val="85000"/>
+          </a:schemeClr>
+        </a:solidFill>
+        <a:round/>
+      </a:ln>
+    </cs:spPr>
+    <cs:defRPr sz="900" kern="1200"/>
+  </cs:categoryAxis>
+  <cs:chartArea mods="allowNoFillOverride allowNoLineOverride">
+    <cs:lnRef idx="0"/>
+    <cs:fillRef idx="0"/>
+    <cs:effectRef idx="0"/>
+    <cs:fontRef idx="minor">
+      <a:schemeClr val="tx2"/>
+    </cs:fontRef>
+    <cs:spPr>
+      <a:solidFill>
+        <a:schemeClr val="bg1"/>
+      </a:solidFill>
+      <a:ln w="9525" cap="flat" cmpd="sng" algn="ctr">
+        <a:solidFill>
+          <a:schemeClr val="tx2">
+            <a:lumMod val="15000"/>
+            <a:lumOff val="85000"/>
+          </a:schemeClr>
+        </a:solidFill>
+        <a:round/>
+      </a:ln>
+    </cs:spPr>
+    <cs:defRPr sz="900" kern="1200"/>
+  </cs:chartArea>
+  <cs:dataLabel>
+    <cs:lnRef idx="0"/>
+    <cs:fillRef idx="0"/>
+    <cs:effectRef idx="0"/>
+    <cs:fontRef idx="minor">
+      <a:schemeClr val="tx2"/>
+    </cs:fontRef>
+    <cs:defRPr sz="900" kern="1200"/>
+  </cs:dataLabel>
+  <cs:dataLabelCallout>
+    <cs:lnRef idx="0"/>
+    <cs:fillRef idx="0"/>
+    <cs:effectRef idx="0"/>
+    <cs:fontRef idx="minor">
+      <a:schemeClr val="dk2">
+        <a:lumMod val="75000"/>
+      </a:schemeClr>
+    </cs:fontRef>
+    <cs:spPr>
+      <a:solidFill>
+        <a:schemeClr val="lt1"/>
+      </a:solidFill>
+      <a:ln>
+        <a:solidFill>
+          <a:schemeClr val="dk1">
+            <a:lumMod val="25000"/>
+            <a:lumOff val="75000"/>
+          </a:schemeClr>
+        </a:solidFill>
+      </a:ln>
+    </cs:spPr>
+    <cs:defRPr sz="900" kern="1200"/>
+    <cs:bodyPr rot="0" spcFirstLastPara="1" vertOverflow="clip" horzOverflow="clip" vert="horz" wrap="square" lIns="36576" tIns="18288" rIns="36576" bIns="18288" anchor="ctr" anchorCtr="1">
+      <a:spAutoFit/>
+    </cs:bodyPr>
+  </cs:dataLabelCallout>
+  <cs:dataPoint>
+    <cs:lnRef idx="0"/>
+    <cs:fillRef idx="3">
+      <cs:styleClr val="auto"/>
+    </cs:fillRef>
+    <cs:effectRef idx="2"/>
+    <cs:fontRef idx="minor">
+      <a:schemeClr val="tx2"/>
+    </cs:fontRef>
+  </cs:dataPoint>
+  <cs:dataPoint3D>
+    <cs:lnRef idx="0"/>
+    <cs:fillRef idx="3">
+      <cs:styleClr val="auto"/>
+    </cs:fillRef>
+    <cs:effectRef idx="2"/>
+    <cs:fontRef idx="minor">
+      <a:schemeClr val="tx2"/>
+    </cs:fontRef>
+  </cs:dataPoint3D>
+  <cs:dataPointLine>
+    <cs:lnRef idx="0">
+      <cs:styleClr val="auto"/>
+    </cs:lnRef>
+    <cs:fillRef idx="3"/>
+    <cs:effectRef idx="2"/>
+    <cs:fontRef idx="minor">
+      <a:schemeClr val="tx2"/>
+    </cs:fontRef>
+    <cs:spPr>
+      <a:ln w="31750" cap="rnd">
+        <a:solidFill>
+          <a:schemeClr val="phClr"/>
+        </a:solidFill>
+        <a:round/>
+      </a:ln>
+    </cs:spPr>
+  </cs:dataPointLine>
+  <cs:dataPointMarker>
+    <cs:lnRef idx="0"/>
+    <cs:fillRef idx="3">
+      <cs:styleClr val="auto"/>
+    </cs:fillRef>
+    <cs:effectRef idx="2"/>
+    <cs:fontRef idx="minor">
+      <a:schemeClr val="tx2"/>
+    </cs:fontRef>
+    <cs:spPr>
+      <a:ln w="12700">
+        <a:solidFill>
+          <a:schemeClr val="lt2"/>
+        </a:solidFill>
+        <a:round/>
+      </a:ln>
+    </cs:spPr>
+  </cs:dataPointMarker>
+  <cs:dataPointMarkerLayout symbol="circle" size="6"/>
+  <cs:dataPointWireframe>
+    <cs:lnRef idx="0">
+      <cs:styleClr val="auto"/>
+    </cs:lnRef>
+    <cs:fillRef idx="3"/>
+    <cs:effectRef idx="2"/>
+    <cs:fontRef idx="minor">
+      <a:schemeClr val="tx2"/>
+    </cs:fontRef>
+    <cs:spPr>
+      <a:ln w="9525" cap="rnd">
+        <a:solidFill>
+          <a:schemeClr val="phClr"/>
+        </a:solidFill>
+        <a:round/>
+      </a:ln>
+    </cs:spPr>
+  </cs:dataPointWireframe>
+  <cs:dataTable>
+    <cs:lnRef idx="0"/>
+    <cs:fillRef idx="0"/>
+    <cs:effectRef idx="0"/>
+    <cs:fontRef idx="minor">
+      <a:schemeClr val="tx2"/>
+    </cs:fontRef>
+    <cs:spPr>
+      <a:ln w="9525">
+        <a:solidFill>
+          <a:schemeClr val="tx2">
+            <a:lumMod val="15000"/>
+            <a:lumOff val="85000"/>
+          </a:schemeClr>
+        </a:solidFill>
+      </a:ln>
+    </cs:spPr>
+    <cs:defRPr sz="900" kern="1200"/>
+  </cs:dataTable>
+  <cs:downBar>
+    <cs:lnRef idx="0"/>
+    <cs:fillRef idx="0"/>
+    <cs:effectRef idx="0"/>
+    <cs:fontRef idx="minor">
+      <a:schemeClr val="dk1"/>
+    </cs:fontRef>
+    <cs:spPr>
+      <a:solidFill>
+        <a:schemeClr val="dk1">
+          <a:lumMod val="65000"/>
+          <a:lumOff val="35000"/>
+        </a:schemeClr>
+      </a:solidFill>
+      <a:ln w="9525">
+        <a:solidFill>
+          <a:schemeClr val="tx1">
+            <a:lumMod val="65000"/>
+            <a:lumOff val="35000"/>
+          </a:schemeClr>
+        </a:solidFill>
+      </a:ln>
+    </cs:spPr>
+  </cs:downBar>
+  <cs:dropLine>
+    <cs:lnRef idx="0"/>
+    <cs:fillRef idx="0"/>
+    <cs:effectRef idx="0"/>
+    <cs:fontRef idx="minor">
+      <a:schemeClr val="tx2"/>
+    </cs:fontRef>
+    <cs:spPr>
+      <a:ln w="9525">
+        <a:solidFill>
+          <a:schemeClr val="tx2">
+            <a:lumMod val="60000"/>
+            <a:lumOff val="40000"/>
+          </a:schemeClr>
+        </a:solidFill>
+        <a:prstDash val="dash"/>
+      </a:ln>
+    </cs:spPr>
+  </cs:dropLine>
+  <cs:errorBar>
+    <cs:lnRef idx="0"/>
+    <cs:fillRef idx="0"/>
+    <cs:effectRef idx="0"/>
+    <cs:fontRef idx="minor">
+      <a:schemeClr val="tx2"/>
+    </cs:fontRef>
+    <cs:spPr>
+      <a:ln w="9525">
+        <a:solidFill>
+          <a:schemeClr val="tx2">
+            <a:lumMod val="75000"/>
+          </a:schemeClr>
+        </a:solidFill>
+        <a:round/>
+      </a:ln>
+    </cs:spPr>
+  </cs:errorBar>
+  <cs:floor>
+    <cs:lnRef idx="0"/>
+    <cs:fillRef idx="0"/>
+    <cs:effectRef idx="0"/>
+    <cs:fontRef idx="minor">
+      <a:schemeClr val="tx2"/>
+    </cs:fontRef>
+  </cs:floor>
+  <cs:gridlineMajor>
+    <cs:lnRef idx="0"/>
+    <cs:fillRef idx="0"/>
+    <cs:effectRef idx="0"/>
+    <cs:fontRef idx="minor">
+      <a:schemeClr val="tx2"/>
+    </cs:fontRef>
+    <cs:spPr>
+      <a:ln w="9525" cap="flat" cmpd="sng" algn="ctr">
+        <a:solidFill>
+          <a:schemeClr val="tx2">
+            <a:lumMod val="15000"/>
+            <a:lumOff val="85000"/>
+          </a:schemeClr>
+        </a:solidFill>
+        <a:round/>
+      </a:ln>
+    </cs:spPr>
+  </cs:gridlineMajor>
+  <cs:gridlineMinor>
+    <cs:lnRef idx="0"/>
+    <cs:fillRef idx="0"/>
+    <cs:effectRef idx="0"/>
+    <cs:fontRef idx="minor">
+      <a:schemeClr val="tx2"/>
+    </cs:fontRef>
+    <cs:spPr>
+      <a:ln>
+        <a:solidFill>
+          <a:schemeClr val="tx2">
+            <a:lumMod val="5000"/>
+            <a:lumOff val="95000"/>
+          </a:schemeClr>
+        </a:solidFill>
+      </a:ln>
+    </cs:spPr>
+  </cs:gridlineMinor>
+  <cs:hiLoLine>
+    <cs:lnRef idx="0"/>
+    <cs:fillRef idx="0"/>
+    <cs:effectRef idx="0"/>
+    <cs:fontRef idx="minor">
+      <a:schemeClr val="tx2"/>
+    </cs:fontRef>
+    <cs:spPr>
+      <a:ln w="9525">
+        <a:solidFill>
+          <a:schemeClr val="tx2">
+            <a:lumMod val="60000"/>
+            <a:lumOff val="40000"/>
+          </a:schemeClr>
+        </a:solidFill>
+        <a:prstDash val="dash"/>
+      </a:ln>
+    </cs:spPr>
+  </cs:hiLoLine>
+  <cs:leaderLine>
+    <cs:lnRef idx="0"/>
+    <cs:fillRef idx="0"/>
+    <cs:effectRef idx="0"/>
+    <cs:fontRef idx="minor">
+      <a:schemeClr val="tx2"/>
+    </cs:fontRef>
+    <cs:spPr>
+      <a:ln w="9525">
+        <a:solidFill>
+          <a:schemeClr val="tx2">
+            <a:lumMod val="35000"/>
+            <a:lumOff val="65000"/>
+          </a:schemeClr>
+        </a:solidFill>
+      </a:ln>
+    </cs:spPr>
+  </cs:leaderLine>
+  <cs:legend>
+    <cs:lnRef idx="0"/>
+    <cs:fillRef idx="0"/>
+    <cs:effectRef idx="0"/>
+    <cs:fontRef idx="minor">
+      <a:schemeClr val="tx2"/>
+    </cs:fontRef>
+    <cs:defRPr sz="900" kern="1200"/>
+  </cs:legend>
+  <cs:plotArea>
+    <cs:lnRef idx="0"/>
+    <cs:fillRef idx="0"/>
+    <cs:effectRef idx="0"/>
+    <cs:fontRef idx="minor">
+      <a:schemeClr val="tx2"/>
+    </cs:fontRef>
+  </cs:plotArea>
+  <cs:plotArea3D>
+    <cs:lnRef idx="0"/>
+    <cs:fillRef idx="0"/>
+    <cs:effectRef idx="0"/>
+    <cs:fontRef idx="minor">
+      <a:schemeClr val="tx2"/>
+    </cs:fontRef>
+  </cs:plotArea3D>
+  <cs:seriesAxis>
+    <cs:lnRef idx="0"/>
+    <cs:fillRef idx="0"/>
+    <cs:effectRef idx="0"/>
+    <cs:fontRef idx="minor">
+      <a:schemeClr val="tx2"/>
+    </cs:fontRef>
+    <cs:spPr>
+      <a:ln w="9525" cap="flat" cmpd="sng" algn="ctr">
+        <a:solidFill>
+          <a:schemeClr val="tx2">
+            <a:lumMod val="15000"/>
+            <a:lumOff val="85000"/>
+          </a:schemeClr>
+        </a:solidFill>
+        <a:round/>
+      </a:ln>
+    </cs:spPr>
+    <cs:defRPr sz="900" kern="1200"/>
+  </cs:seriesAxis>
+  <cs:seriesLine>
+    <cs:lnRef idx="0"/>
+    <cs:fillRef idx="0"/>
+    <cs:effectRef idx="0"/>
+    <cs:fontRef idx="minor">
+      <a:schemeClr val="tx2"/>
+    </cs:fontRef>
+    <cs:spPr>
+      <a:ln w="9525">
+        <a:solidFill>
+          <a:schemeClr val="tx2">
+            <a:lumMod val="60000"/>
+            <a:lumOff val="40000"/>
+          </a:schemeClr>
+        </a:solidFill>
+        <a:prstDash val="dash"/>
+      </a:ln>
+    </cs:spPr>
+  </cs:seriesLine>
+  <cs:title>
+    <cs:lnRef idx="0"/>
+    <cs:fillRef idx="0"/>
+    <cs:effectRef idx="0"/>
+    <cs:fontRef idx="minor">
+      <a:schemeClr val="tx2"/>
+    </cs:fontRef>
+    <cs:defRPr sz="1600" b="1" kern="1200"/>
+  </cs:title>
+  <cs:trendline>
+    <cs:lnRef idx="0">
+      <cs:styleClr val="auto"/>
+    </cs:lnRef>
+    <cs:fillRef idx="0"/>
+    <cs:effectRef idx="0"/>
+    <cs:fontRef idx="minor">
+      <a:schemeClr val="tx2"/>
+    </cs:fontRef>
+    <cs:spPr>
+      <a:ln w="19050" cap="rnd">
+        <a:solidFill>
+          <a:schemeClr val="phClr"/>
+        </a:solidFill>
+        <a:prstDash val="sysDash"/>
+      </a:ln>
+    </cs:spPr>
+  </cs:trendline>
+  <cs:trendlineLabel>
+    <cs:lnRef idx="0"/>
+    <cs:fillRef idx="0"/>
+    <cs:effectRef idx="0"/>
+    <cs:fontRef idx="minor">
+      <a:schemeClr val="tx2"/>
+    </cs:fontRef>
+    <cs:defRPr sz="900" kern="1200"/>
+  </cs:trendlineLabel>
+  <cs:upBar>
+    <cs:lnRef idx="0"/>
+    <cs:fillRef idx="0"/>
+    <cs:effectRef idx="0"/>
+    <cs:fontRef idx="minor">
+      <a:schemeClr val="tx2"/>
+    </cs:fontRef>
+    <cs:spPr>
+      <a:solidFill>
+        <a:schemeClr val="lt1"/>
+      </a:solidFill>
+      <a:ln w="9525">
+        <a:solidFill>
+          <a:schemeClr val="tx1">
+            <a:lumMod val="15000"/>
+            <a:lumOff val="85000"/>
+          </a:schemeClr>
+        </a:solidFill>
+      </a:ln>
+    </cs:spPr>
+  </cs:upBar>
+  <cs:valueAxis>
+    <cs:lnRef idx="0"/>
+    <cs:fillRef idx="0"/>
+    <cs:effectRef idx="0"/>
+    <cs:fontRef idx="minor">
+      <a:schemeClr val="tx2"/>
+    </cs:fontRef>
+    <cs:defRPr sz="900" kern="1200"/>
+  </cs:valueAxis>
+  <cs:wall>
+    <cs:lnRef idx="0"/>
+    <cs:fillRef idx="0"/>
+    <cs:effectRef idx="0"/>
+    <cs:fontRef idx="minor">
+      <a:schemeClr val="tx2"/>
+    </cs:fontRef>
+  </cs:wall>
+</cs:chartStyle>
+</file>
+
+<file path=ppt/charts/style4.xml><?xml version="1.0" encoding="utf-8"?>
 <cs:chartStyle xmlns:cs="http://schemas.microsoft.com/office/drawing/2012/chartStyle" xmlns:a="http://schemas.openxmlformats.org/drawingml/2006/main" id="219">
   <cs:axisTitle>
     <cs:lnRef idx="0"/>
@@ -3859,7 +4793,7 @@
           <a:p>
             <a:fld id="{5A380E97-91F5-47EA-9D04-C3513F44CB51}" type="datetimeFigureOut">
               <a:rPr lang="it-IT" smtClean="0"/>
-              <a:t>15/10/2023</a:t>
+              <a:t>16/10/2023</a:t>
             </a:fld>
             <a:endParaRPr lang="it-IT"/>
           </a:p>
@@ -5641,7 +6575,7 @@
     </p:spTree>
     <p:extLst>
       <p:ext uri="{BB962C8B-B14F-4D97-AF65-F5344CB8AC3E}">
-        <p14:creationId xmlns:p14="http://schemas.microsoft.com/office/powerpoint/2010/main" val="1724870212"/>
+        <p14:creationId xmlns:p14="http://schemas.microsoft.com/office/powerpoint/2010/main" val="2900343034"/>
       </p:ext>
     </p:extLst>
   </p:cSld>
@@ -5929,7 +6863,7 @@
     </p:spTree>
     <p:extLst>
       <p:ext uri="{BB962C8B-B14F-4D97-AF65-F5344CB8AC3E}">
-        <p14:creationId xmlns:p14="http://schemas.microsoft.com/office/powerpoint/2010/main" val="505399425"/>
+        <p14:creationId xmlns:p14="http://schemas.microsoft.com/office/powerpoint/2010/main" val="1724870212"/>
       </p:ext>
     </p:extLst>
   </p:cSld>
@@ -6073,7 +7007,7 @@
     </p:spTree>
     <p:extLst>
       <p:ext uri="{BB962C8B-B14F-4D97-AF65-F5344CB8AC3E}">
-        <p14:creationId xmlns:p14="http://schemas.microsoft.com/office/powerpoint/2010/main" val="2121086211"/>
+        <p14:creationId xmlns:p14="http://schemas.microsoft.com/office/powerpoint/2010/main" val="505399425"/>
       </p:ext>
     </p:extLst>
   </p:cSld>
@@ -6217,7 +7151,7 @@
     </p:spTree>
     <p:extLst>
       <p:ext uri="{BB962C8B-B14F-4D97-AF65-F5344CB8AC3E}">
-        <p14:creationId xmlns:p14="http://schemas.microsoft.com/office/powerpoint/2010/main" val="3236551705"/>
+        <p14:creationId xmlns:p14="http://schemas.microsoft.com/office/powerpoint/2010/main" val="2121086211"/>
       </p:ext>
     </p:extLst>
   </p:cSld>
@@ -6361,7 +7295,7 @@
     </p:spTree>
     <p:extLst>
       <p:ext uri="{BB962C8B-B14F-4D97-AF65-F5344CB8AC3E}">
-        <p14:creationId xmlns:p14="http://schemas.microsoft.com/office/powerpoint/2010/main" val="3615466969"/>
+        <p14:creationId xmlns:p14="http://schemas.microsoft.com/office/powerpoint/2010/main" val="3236551705"/>
       </p:ext>
     </p:extLst>
   </p:cSld>
@@ -6505,6 +7439,150 @@
     </p:spTree>
     <p:extLst>
       <p:ext uri="{BB962C8B-B14F-4D97-AF65-F5344CB8AC3E}">
+        <p14:creationId xmlns:p14="http://schemas.microsoft.com/office/powerpoint/2010/main" val="3615466969"/>
+      </p:ext>
+    </p:extLst>
+  </p:cSld>
+  <p:clrMapOvr>
+    <a:masterClrMapping/>
+  </p:clrMapOvr>
+</p:notes>
+</file>
+
+<file path=ppt/notesSlides/notesSlide25.xml><?xml version="1.0" encoding="utf-8"?>
+<p:notes xmlns:a="http://schemas.openxmlformats.org/drawingml/2006/main" xmlns:r="http://schemas.openxmlformats.org/officeDocument/2006/relationships" xmlns:p="http://schemas.openxmlformats.org/presentationml/2006/main">
+  <p:cSld>
+    <p:spTree>
+      <p:nvGrpSpPr>
+        <p:cNvPr id="1" name=""/>
+        <p:cNvGrpSpPr/>
+        <p:nvPr/>
+      </p:nvGrpSpPr>
+      <p:grpSpPr>
+        <a:xfrm>
+          <a:off x="0" y="0"/>
+          <a:ext cx="0" cy="0"/>
+          <a:chOff x="0" y="0"/>
+          <a:chExt cx="0" cy="0"/>
+        </a:xfrm>
+      </p:grpSpPr>
+      <p:sp>
+        <p:nvSpPr>
+          <p:cNvPr id="2" name="Slide Image Placeholder 1"/>
+          <p:cNvSpPr>
+            <a:spLocks noGrp="1" noRot="1" noChangeAspect="1"/>
+          </p:cNvSpPr>
+          <p:nvPr>
+            <p:ph type="sldImg"/>
+          </p:nvPr>
+        </p:nvSpPr>
+        <p:spPr/>
+      </p:sp>
+      <p:sp>
+        <p:nvSpPr>
+          <p:cNvPr id="3" name="Notes Placeholder 2"/>
+          <p:cNvSpPr>
+            <a:spLocks noGrp="1"/>
+          </p:cNvSpPr>
+          <p:nvPr>
+            <p:ph type="body" idx="1"/>
+          </p:nvPr>
+        </p:nvSpPr>
+        <p:spPr/>
+        <p:txBody>
+          <a:bodyPr/>
+          <a:lstStyle/>
+          <a:p>
+            <a:endParaRPr lang="it-IT" dirty="0"/>
+          </a:p>
+        </p:txBody>
+      </p:sp>
+      <p:sp>
+        <p:nvSpPr>
+          <p:cNvPr id="4" name="Slide Number Placeholder 3"/>
+          <p:cNvSpPr>
+            <a:spLocks noGrp="1"/>
+          </p:cNvSpPr>
+          <p:nvPr>
+            <p:ph type="sldNum" sz="quarter" idx="5"/>
+          </p:nvPr>
+        </p:nvSpPr>
+        <p:spPr/>
+        <p:txBody>
+          <a:bodyPr/>
+          <a:lstStyle/>
+          <a:p>
+            <a:pPr marL="0" marR="0" lvl="0" indent="0" algn="r" defTabSz="914400" rtl="0" eaLnBrk="1" fontAlgn="auto" latinLnBrk="0" hangingPunct="1">
+              <a:lnSpc>
+                <a:spcPct val="100000"/>
+              </a:lnSpc>
+              <a:spcBef>
+                <a:spcPts val="0"/>
+              </a:spcBef>
+              <a:spcAft>
+                <a:spcPts val="0"/>
+              </a:spcAft>
+              <a:buClrTx/>
+              <a:buSzTx/>
+              <a:buFontTx/>
+              <a:buNone/>
+              <a:tabLst/>
+              <a:defRPr/>
+            </a:pPr>
+            <a:fld id="{D2114AE1-B372-4C50-AF80-98AA322DCCC6}" type="slidenum">
+              <a:rPr kumimoji="0" lang="it-IT" sz="1200" b="0" i="0" u="none" strike="noStrike" kern="1200" cap="none" spc="0" normalizeH="0" baseline="0" noProof="0" smtClean="0">
+                <a:ln>
+                  <a:noFill/>
+                </a:ln>
+                <a:solidFill>
+                  <a:prstClr val="black"/>
+                </a:solidFill>
+                <a:effectLst/>
+                <a:uLnTx/>
+                <a:uFillTx/>
+                <a:latin typeface="Calibri" panose="020F0502020204030204"/>
+                <a:ea typeface="+mn-ea"/>
+                <a:cs typeface="+mn-cs"/>
+              </a:rPr>
+              <a:pPr marL="0" marR="0" lvl="0" indent="0" algn="r" defTabSz="914400" rtl="0" eaLnBrk="1" fontAlgn="auto" latinLnBrk="0" hangingPunct="1">
+                <a:lnSpc>
+                  <a:spcPct val="100000"/>
+                </a:lnSpc>
+                <a:spcBef>
+                  <a:spcPts val="0"/>
+                </a:spcBef>
+                <a:spcAft>
+                  <a:spcPts val="0"/>
+                </a:spcAft>
+                <a:buClrTx/>
+                <a:buSzTx/>
+                <a:buFontTx/>
+                <a:buNone/>
+                <a:tabLst/>
+                <a:defRPr/>
+              </a:pPr>
+              <a:t>26</a:t>
+            </a:fld>
+            <a:endParaRPr kumimoji="0" lang="it-IT" sz="1200" b="0" i="0" u="none" strike="noStrike" kern="1200" cap="none" spc="0" normalizeH="0" baseline="0" noProof="0">
+              <a:ln>
+                <a:noFill/>
+              </a:ln>
+              <a:solidFill>
+                <a:prstClr val="black"/>
+              </a:solidFill>
+              <a:effectLst/>
+              <a:uLnTx/>
+              <a:uFillTx/>
+              <a:latin typeface="Calibri" panose="020F0502020204030204"/>
+              <a:ea typeface="+mn-ea"/>
+              <a:cs typeface="+mn-cs"/>
+            </a:endParaRPr>
+          </a:p>
+        </p:txBody>
+      </p:sp>
+    </p:spTree>
+    <p:extLst>
+      <p:ext uri="{BB962C8B-B14F-4D97-AF65-F5344CB8AC3E}">
         <p14:creationId xmlns:p14="http://schemas.microsoft.com/office/powerpoint/2010/main" val="2081459818"/>
       </p:ext>
     </p:extLst>
@@ -7672,7 +8750,7 @@
           <a:p>
             <a:fld id="{D55E9482-D5C2-4AB3-BBE2-3386C30CEF8D}" type="datetimeFigureOut">
               <a:rPr lang="it-IT" smtClean="0"/>
-              <a:t>15/10/2023</a:t>
+              <a:t>16/10/2023</a:t>
             </a:fld>
             <a:endParaRPr lang="it-IT"/>
           </a:p>
@@ -7872,7 +8950,7 @@
           <a:p>
             <a:fld id="{D55E9482-D5C2-4AB3-BBE2-3386C30CEF8D}" type="datetimeFigureOut">
               <a:rPr lang="it-IT" smtClean="0"/>
-              <a:t>15/10/2023</a:t>
+              <a:t>16/10/2023</a:t>
             </a:fld>
             <a:endParaRPr lang="it-IT"/>
           </a:p>
@@ -8082,7 +9160,7 @@
           <a:p>
             <a:fld id="{D55E9482-D5C2-4AB3-BBE2-3386C30CEF8D}" type="datetimeFigureOut">
               <a:rPr lang="it-IT" smtClean="0"/>
-              <a:t>15/10/2023</a:t>
+              <a:t>16/10/2023</a:t>
             </a:fld>
             <a:endParaRPr lang="it-IT"/>
           </a:p>
@@ -8282,7 +9360,7 @@
           <a:p>
             <a:fld id="{D55E9482-D5C2-4AB3-BBE2-3386C30CEF8D}" type="datetimeFigureOut">
               <a:rPr lang="it-IT" smtClean="0"/>
-              <a:t>15/10/2023</a:t>
+              <a:t>16/10/2023</a:t>
             </a:fld>
             <a:endParaRPr lang="it-IT"/>
           </a:p>
@@ -8558,7 +9636,7 @@
           <a:p>
             <a:fld id="{D55E9482-D5C2-4AB3-BBE2-3386C30CEF8D}" type="datetimeFigureOut">
               <a:rPr lang="it-IT" smtClean="0"/>
-              <a:t>15/10/2023</a:t>
+              <a:t>16/10/2023</a:t>
             </a:fld>
             <a:endParaRPr lang="it-IT"/>
           </a:p>
@@ -8826,7 +9904,7 @@
           <a:p>
             <a:fld id="{D55E9482-D5C2-4AB3-BBE2-3386C30CEF8D}" type="datetimeFigureOut">
               <a:rPr lang="it-IT" smtClean="0"/>
-              <a:t>15/10/2023</a:t>
+              <a:t>16/10/2023</a:t>
             </a:fld>
             <a:endParaRPr lang="it-IT"/>
           </a:p>
@@ -9241,7 +10319,7 @@
           <a:p>
             <a:fld id="{D55E9482-D5C2-4AB3-BBE2-3386C30CEF8D}" type="datetimeFigureOut">
               <a:rPr lang="it-IT" smtClean="0"/>
-              <a:t>15/10/2023</a:t>
+              <a:t>16/10/2023</a:t>
             </a:fld>
             <a:endParaRPr lang="it-IT"/>
           </a:p>
@@ -9383,7 +10461,7 @@
           <a:p>
             <a:fld id="{D55E9482-D5C2-4AB3-BBE2-3386C30CEF8D}" type="datetimeFigureOut">
               <a:rPr lang="it-IT" smtClean="0"/>
-              <a:t>15/10/2023</a:t>
+              <a:t>16/10/2023</a:t>
             </a:fld>
             <a:endParaRPr lang="it-IT"/>
           </a:p>
@@ -9496,7 +10574,7 @@
           <a:p>
             <a:fld id="{D55E9482-D5C2-4AB3-BBE2-3386C30CEF8D}" type="datetimeFigureOut">
               <a:rPr lang="it-IT" smtClean="0"/>
-              <a:t>15/10/2023</a:t>
+              <a:t>16/10/2023</a:t>
             </a:fld>
             <a:endParaRPr lang="it-IT"/>
           </a:p>
@@ -9809,7 +10887,7 @@
           <a:p>
             <a:fld id="{D55E9482-D5C2-4AB3-BBE2-3386C30CEF8D}" type="datetimeFigureOut">
               <a:rPr lang="it-IT" smtClean="0"/>
-              <a:t>15/10/2023</a:t>
+              <a:t>16/10/2023</a:t>
             </a:fld>
             <a:endParaRPr lang="it-IT"/>
           </a:p>
@@ -10098,7 +11176,7 @@
           <a:p>
             <a:fld id="{D55E9482-D5C2-4AB3-BBE2-3386C30CEF8D}" type="datetimeFigureOut">
               <a:rPr lang="it-IT" smtClean="0"/>
-              <a:t>15/10/2023</a:t>
+              <a:t>16/10/2023</a:t>
             </a:fld>
             <a:endParaRPr lang="it-IT"/>
           </a:p>
@@ -10175,9 +11253,26 @@
 <p:sldMaster xmlns:a="http://schemas.openxmlformats.org/drawingml/2006/main" xmlns:r="http://schemas.openxmlformats.org/officeDocument/2006/relationships" xmlns:p="http://schemas.openxmlformats.org/presentationml/2006/main">
   <p:cSld>
     <p:bg>
-      <p:bgRef idx="1001">
-        <a:schemeClr val="bg1"/>
-      </p:bgRef>
+      <p:bgPr>
+        <a:gradFill flip="none" rotWithShape="1">
+          <a:gsLst>
+            <a:gs pos="0">
+              <a:schemeClr val="accent6">
+                <a:lumMod val="40000"/>
+                <a:lumOff val="60000"/>
+              </a:schemeClr>
+            </a:gs>
+            <a:gs pos="100000">
+              <a:schemeClr val="accent6">
+                <a:lumMod val="75000"/>
+              </a:schemeClr>
+            </a:gs>
+          </a:gsLst>
+          <a:lin ang="8100000" scaled="1"/>
+          <a:tileRect/>
+        </a:gradFill>
+        <a:effectLst/>
+      </p:bgPr>
     </p:bg>
     <p:spTree>
       <p:nvGrpSpPr>
@@ -10341,7 +11436,7 @@
           <a:p>
             <a:fld id="{D55E9482-D5C2-4AB3-BBE2-3386C30CEF8D}" type="datetimeFigureOut">
               <a:rPr lang="it-IT" smtClean="0"/>
-              <a:t>15/10/2023</a:t>
+              <a:t>16/10/2023</a:t>
             </a:fld>
             <a:endParaRPr lang="it-IT"/>
           </a:p>
@@ -10744,27 +11839,6 @@
 <file path=ppt/slides/slide1.xml><?xml version="1.0" encoding="utf-8"?>
 <p:sld xmlns:a="http://schemas.openxmlformats.org/drawingml/2006/main" xmlns:r="http://schemas.openxmlformats.org/officeDocument/2006/relationships" xmlns:p="http://schemas.openxmlformats.org/presentationml/2006/main">
   <p:cSld>
-    <p:bg>
-      <p:bgPr>
-        <a:gradFill>
-          <a:gsLst>
-            <a:gs pos="0">
-              <a:schemeClr val="accent6">
-                <a:lumMod val="40000"/>
-                <a:lumOff val="60000"/>
-              </a:schemeClr>
-            </a:gs>
-            <a:gs pos="100000">
-              <a:schemeClr val="accent6">
-                <a:lumMod val="75000"/>
-              </a:schemeClr>
-            </a:gs>
-          </a:gsLst>
-          <a:lin ang="8100000" scaled="1"/>
-        </a:gradFill>
-        <a:effectLst/>
-      </p:bgPr>
-    </p:bg>
     <p:spTree>
       <p:nvGrpSpPr>
         <p:cNvPr id="1" name=""/>
@@ -11526,7 +12600,7 @@
                 <a:ea typeface="+mn-ea"/>
                 <a:cs typeface="Times New Roman" panose="02020603050405020304" pitchFamily="18" charset="0"/>
               </a:rPr>
-              <a:t>Ad alta priorità </a:t>
+              <a:t>Periodici ad alta priorità </a:t>
             </a:r>
             <a:r>
               <a:rPr kumimoji="0" lang="it-IT" sz="2800" b="0" i="0" u="none" strike="noStrike" kern="1200" cap="none" spc="0" normalizeH="0" baseline="0" noProof="0" dirty="0">
@@ -11613,7 +12687,7 @@
                 <a:ea typeface="+mn-ea"/>
                 <a:cs typeface="Times New Roman" panose="02020603050405020304" pitchFamily="18" charset="0"/>
               </a:rPr>
-              <a:t>A priorità normale </a:t>
+              <a:t>Periodici a priorità normale </a:t>
             </a:r>
             <a:r>
               <a:rPr kumimoji="0" lang="it-IT" sz="2800" b="0" i="0" u="none" strike="noStrike" kern="1200" cap="none" spc="0" normalizeH="0" baseline="0" noProof="0" dirty="0">
@@ -12149,7 +13223,7 @@
                 <a:ea typeface="+mn-ea"/>
                 <a:cs typeface="Times New Roman" panose="02020603050405020304" pitchFamily="18" charset="0"/>
               </a:rPr>
-              <a:t>Ad alta priorità </a:t>
+              <a:t>Periodici ad alta priorità </a:t>
             </a:r>
             <a:r>
               <a:rPr kumimoji="0" lang="it-IT" sz="2800" b="0" i="0" u="none" strike="noStrike" kern="1200" cap="none" spc="0" normalizeH="0" baseline="0" noProof="0" dirty="0">
@@ -12236,7 +13310,7 @@
                 <a:ea typeface="+mn-ea"/>
                 <a:cs typeface="Times New Roman" panose="02020603050405020304" pitchFamily="18" charset="0"/>
               </a:rPr>
-              <a:t>A priorità normale </a:t>
+              <a:t>Periodici a priorità normale </a:t>
             </a:r>
             <a:r>
               <a:rPr kumimoji="0" lang="it-IT" sz="2800" b="0" i="0" u="none" strike="noStrike" kern="1200" cap="none" spc="0" normalizeH="0" baseline="0" noProof="0" dirty="0">
@@ -12772,7 +13846,7 @@
                 <a:ea typeface="+mn-ea"/>
                 <a:cs typeface="Times New Roman" panose="02020603050405020304" pitchFamily="18" charset="0"/>
               </a:rPr>
-              <a:t>Ad alta priorità </a:t>
+              <a:t>Periodici ad alta priorità </a:t>
             </a:r>
             <a:r>
               <a:rPr kumimoji="0" lang="it-IT" sz="2800" b="0" i="0" u="none" strike="noStrike" kern="1200" cap="none" spc="0" normalizeH="0" baseline="0" noProof="0" dirty="0">
@@ -12859,7 +13933,7 @@
                 <a:ea typeface="+mn-ea"/>
                 <a:cs typeface="Times New Roman" panose="02020603050405020304" pitchFamily="18" charset="0"/>
               </a:rPr>
-              <a:t>A priorità normale </a:t>
+              <a:t>Periodici a priorità normale</a:t>
             </a:r>
             <a:r>
               <a:rPr kumimoji="0" lang="it-IT" sz="2800" b="0" i="0" u="none" strike="noStrike" kern="1200" cap="none" spc="0" normalizeH="0" baseline="0" noProof="0" dirty="0">
@@ -13051,27 +14125,6 @@
 <file path=ppt/slides/slide13.xml><?xml version="1.0" encoding="utf-8"?>
 <p:sld xmlns:a="http://schemas.openxmlformats.org/drawingml/2006/main" xmlns:r="http://schemas.openxmlformats.org/officeDocument/2006/relationships" xmlns:p="http://schemas.openxmlformats.org/presentationml/2006/main">
   <p:cSld>
-    <p:bg>
-      <p:bgPr>
-        <a:gradFill>
-          <a:gsLst>
-            <a:gs pos="0">
-              <a:schemeClr val="accent6">
-                <a:lumMod val="40000"/>
-                <a:lumOff val="60000"/>
-              </a:schemeClr>
-            </a:gs>
-            <a:gs pos="100000">
-              <a:schemeClr val="accent6">
-                <a:lumMod val="75000"/>
-              </a:schemeClr>
-            </a:gs>
-          </a:gsLst>
-          <a:lin ang="8100000" scaled="1"/>
-        </a:gradFill>
-        <a:effectLst/>
-      </p:bgPr>
-    </p:bg>
     <p:spTree>
       <p:nvGrpSpPr>
         <p:cNvPr id="1" name=""/>
@@ -13498,7 +14551,7 @@
       </p:pic>
       <p:pic>
         <p:nvPicPr>
-          <p:cNvPr id="12" name="Picture 11" descr="A diagram of a task&#10;&#10;Description automatically generated">
+          <p:cNvPr id="12" name="Picture 11">
             <a:extLst>
               <a:ext uri="{FF2B5EF4-FFF2-40B4-BE49-F238E27FC236}">
                 <a16:creationId xmlns:a16="http://schemas.microsoft.com/office/drawing/2014/main" id="{0CDB1E7D-6CA8-0EEE-6B16-A246D9174957}"/>
@@ -13512,14 +14565,13 @@
         </p:nvPicPr>
         <p:blipFill>
           <a:blip r:embed="rId6"/>
-          <a:stretch>
-            <a:fillRect/>
-          </a:stretch>
+          <a:srcRect/>
+          <a:stretch/>
         </p:blipFill>
         <p:spPr>
           <a:xfrm>
             <a:off x="835286" y="960794"/>
-            <a:ext cx="5416393" cy="3916007"/>
+            <a:ext cx="5416392" cy="3916007"/>
           </a:xfrm>
           <a:prstGeom prst="rect">
             <a:avLst/>
@@ -13822,27 +14874,6 @@
 <file path=ppt/slides/slide14.xml><?xml version="1.0" encoding="utf-8"?>
 <p:sld xmlns:a="http://schemas.openxmlformats.org/drawingml/2006/main" xmlns:r="http://schemas.openxmlformats.org/officeDocument/2006/relationships" xmlns:p="http://schemas.openxmlformats.org/presentationml/2006/main">
   <p:cSld>
-    <p:bg>
-      <p:bgPr>
-        <a:gradFill>
-          <a:gsLst>
-            <a:gs pos="0">
-              <a:schemeClr val="accent6">
-                <a:lumMod val="40000"/>
-                <a:lumOff val="60000"/>
-              </a:schemeClr>
-            </a:gs>
-            <a:gs pos="100000">
-              <a:schemeClr val="accent6">
-                <a:lumMod val="75000"/>
-              </a:schemeClr>
-            </a:gs>
-          </a:gsLst>
-          <a:lin ang="8100000" scaled="1"/>
-        </a:gradFill>
-        <a:effectLst/>
-      </p:bgPr>
-    </p:bg>
     <p:spTree>
       <p:nvGrpSpPr>
         <p:cNvPr id="1" name=""/>
@@ -15305,27 +16336,6 @@
 <file path=ppt/slides/slide15.xml><?xml version="1.0" encoding="utf-8"?>
 <p:sld xmlns:a="http://schemas.openxmlformats.org/drawingml/2006/main" xmlns:r="http://schemas.openxmlformats.org/officeDocument/2006/relationships" xmlns:p="http://schemas.openxmlformats.org/presentationml/2006/main">
   <p:cSld>
-    <p:bg>
-      <p:bgPr>
-        <a:gradFill>
-          <a:gsLst>
-            <a:gs pos="0">
-              <a:schemeClr val="accent6">
-                <a:lumMod val="40000"/>
-                <a:lumOff val="60000"/>
-              </a:schemeClr>
-            </a:gs>
-            <a:gs pos="100000">
-              <a:schemeClr val="accent6">
-                <a:lumMod val="75000"/>
-              </a:schemeClr>
-            </a:gs>
-          </a:gsLst>
-          <a:lin ang="8100000" scaled="1"/>
-        </a:gradFill>
-        <a:effectLst/>
-      </p:bgPr>
-    </p:bg>
     <p:spTree>
       <p:nvGrpSpPr>
         <p:cNvPr id="1" name=""/>
@@ -15955,27 +16965,6 @@
 <file path=ppt/slides/slide16.xml><?xml version="1.0" encoding="utf-8"?>
 <p:sld xmlns:a="http://schemas.openxmlformats.org/drawingml/2006/main" xmlns:r="http://schemas.openxmlformats.org/officeDocument/2006/relationships" xmlns:p="http://schemas.openxmlformats.org/presentationml/2006/main">
   <p:cSld>
-    <p:bg>
-      <p:bgPr>
-        <a:gradFill>
-          <a:gsLst>
-            <a:gs pos="0">
-              <a:schemeClr val="accent6">
-                <a:lumMod val="40000"/>
-                <a:lumOff val="60000"/>
-              </a:schemeClr>
-            </a:gs>
-            <a:gs pos="100000">
-              <a:schemeClr val="accent6">
-                <a:lumMod val="75000"/>
-              </a:schemeClr>
-            </a:gs>
-          </a:gsLst>
-          <a:lin ang="8100000" scaled="1"/>
-        </a:gradFill>
-        <a:effectLst/>
-      </p:bgPr>
-    </p:bg>
     <p:spTree>
       <p:nvGrpSpPr>
         <p:cNvPr id="1" name=""/>
@@ -16337,27 +17326,6 @@
 <file path=ppt/slides/slide17.xml><?xml version="1.0" encoding="utf-8"?>
 <p:sld xmlns:a="http://schemas.openxmlformats.org/drawingml/2006/main" xmlns:r="http://schemas.openxmlformats.org/officeDocument/2006/relationships" xmlns:p="http://schemas.openxmlformats.org/presentationml/2006/main">
   <p:cSld>
-    <p:bg>
-      <p:bgPr>
-        <a:gradFill>
-          <a:gsLst>
-            <a:gs pos="0">
-              <a:schemeClr val="accent6">
-                <a:lumMod val="40000"/>
-                <a:lumOff val="60000"/>
-              </a:schemeClr>
-            </a:gs>
-            <a:gs pos="100000">
-              <a:schemeClr val="accent6">
-                <a:lumMod val="75000"/>
-              </a:schemeClr>
-            </a:gs>
-          </a:gsLst>
-          <a:lin ang="8100000" scaled="1"/>
-        </a:gradFill>
-        <a:effectLst/>
-      </p:bgPr>
-    </p:bg>
     <p:spTree>
       <p:nvGrpSpPr>
         <p:cNvPr id="1" name=""/>
@@ -17363,27 +18331,6 @@
 <file path=ppt/slides/slide18.xml><?xml version="1.0" encoding="utf-8"?>
 <p:sld xmlns:a="http://schemas.openxmlformats.org/drawingml/2006/main" xmlns:r="http://schemas.openxmlformats.org/officeDocument/2006/relationships" xmlns:p="http://schemas.openxmlformats.org/presentationml/2006/main">
   <p:cSld>
-    <p:bg>
-      <p:bgPr>
-        <a:gradFill>
-          <a:gsLst>
-            <a:gs pos="0">
-              <a:schemeClr val="accent6">
-                <a:lumMod val="40000"/>
-                <a:lumOff val="60000"/>
-              </a:schemeClr>
-            </a:gs>
-            <a:gs pos="100000">
-              <a:schemeClr val="accent6">
-                <a:lumMod val="75000"/>
-              </a:schemeClr>
-            </a:gs>
-          </a:gsLst>
-          <a:lin ang="8100000" scaled="1"/>
-        </a:gradFill>
-        <a:effectLst/>
-      </p:bgPr>
-    </p:bg>
     <p:spTree>
       <p:nvGrpSpPr>
         <p:cNvPr id="1" name=""/>
@@ -17924,13 +18871,13 @@
   <p:clrMapOvr>
     <a:masterClrMapping/>
   </p:clrMapOvr>
-  <mc:AlternateContent xmlns:mc="http://schemas.openxmlformats.org/markup-compatibility/2006">
-    <mc:Choice xmlns:p14="http://schemas.microsoft.com/office/powerpoint/2010/main" Requires="p14">
+  <mc:AlternateContent xmlns:mc="http://schemas.openxmlformats.org/markup-compatibility/2006" xmlns:p14="http://schemas.microsoft.com/office/powerpoint/2010/main">
+    <mc:Choice Requires="p14">
       <p:transition spd="med" p14:dur="700">
         <p:fade/>
       </p:transition>
     </mc:Choice>
-    <mc:Fallback>
+    <mc:Fallback xmlns="">
       <p:transition spd="med">
         <p:fade/>
       </p:transition>
@@ -18063,27 +19010,6 @@
 <file path=ppt/slides/slide19.xml><?xml version="1.0" encoding="utf-8"?>
 <p:sld xmlns:a="http://schemas.openxmlformats.org/drawingml/2006/main" xmlns:r="http://schemas.openxmlformats.org/officeDocument/2006/relationships" xmlns:p="http://schemas.openxmlformats.org/presentationml/2006/main">
   <p:cSld>
-    <p:bg>
-      <p:bgPr>
-        <a:gradFill>
-          <a:gsLst>
-            <a:gs pos="0">
-              <a:schemeClr val="accent6">
-                <a:lumMod val="40000"/>
-                <a:lumOff val="60000"/>
-              </a:schemeClr>
-            </a:gs>
-            <a:gs pos="100000">
-              <a:schemeClr val="accent6">
-                <a:lumMod val="75000"/>
-              </a:schemeClr>
-            </a:gs>
-          </a:gsLst>
-          <a:lin ang="8100000" scaled="1"/>
-        </a:gradFill>
-        <a:effectLst/>
-      </p:bgPr>
-    </p:bg>
     <p:spTree>
       <p:nvGrpSpPr>
         <p:cNvPr id="1" name=""/>
@@ -18312,46 +19238,6 @@
           </a:p>
         </p:txBody>
       </p:sp>
-      <p:sp>
-        <p:nvSpPr>
-          <p:cNvPr id="3" name="Subtitle 2">
-            <a:extLst>
-              <a:ext uri="{FF2B5EF4-FFF2-40B4-BE49-F238E27FC236}">
-                <a16:creationId xmlns:a16="http://schemas.microsoft.com/office/drawing/2014/main" id="{FC446B2D-F94A-2F94-9904-6D62ADA65C8F}"/>
-              </a:ext>
-            </a:extLst>
-          </p:cNvPr>
-          <p:cNvSpPr>
-            <a:spLocks noGrp="1"/>
-          </p:cNvSpPr>
-          <p:nvPr>
-            <p:ph type="subTitle" idx="1"/>
-          </p:nvPr>
-        </p:nvSpPr>
-        <p:spPr>
-          <a:xfrm>
-            <a:off x="1159136" y="1141768"/>
-            <a:ext cx="9601200" cy="5497157"/>
-          </a:xfrm>
-        </p:spPr>
-        <p:txBody>
-          <a:bodyPr>
-            <a:normAutofit/>
-          </a:bodyPr>
-          <a:lstStyle/>
-          <a:p>
-            <a:pPr algn="l">
-              <a:lnSpc>
-                <a:spcPct val="200000"/>
-              </a:lnSpc>
-            </a:pPr>
-            <a:endParaRPr lang="it-IT" dirty="0">
-              <a:latin typeface="Times New Roman" panose="02020603050405020304" pitchFamily="18" charset="0"/>
-              <a:cs typeface="Times New Roman" panose="02020603050405020304" pitchFamily="18" charset="0"/>
-            </a:endParaRPr>
-          </a:p>
-        </p:txBody>
-      </p:sp>
       <p:pic>
         <p:nvPicPr>
           <p:cNvPr id="5" name="Picture 4" descr="A screenshot of a computer code&#10;&#10;Description automatically generated">
@@ -18374,14 +19260,210 @@
         </p:blipFill>
         <p:spPr>
           <a:xfrm>
-            <a:off x="1961018" y="4676775"/>
-            <a:ext cx="8269964" cy="1398159"/>
+            <a:off x="749720" y="4278900"/>
+            <a:ext cx="10692557" cy="1807734"/>
+          </a:xfrm>
+          <a:prstGeom prst="roundRect">
+            <a:avLst>
+              <a:gd name="adj" fmla="val 2442"/>
+            </a:avLst>
+          </a:prstGeom>
+          <a:solidFill>
+            <a:srgbClr val="FFFFFF">
+              <a:shade val="85000"/>
+            </a:srgbClr>
+          </a:solidFill>
+          <a:ln>
+            <a:noFill/>
+          </a:ln>
+          <a:effectLst>
+            <a:outerShdw blurRad="50800" dist="50800" dir="5400000" algn="ctr" rotWithShape="0">
+              <a:srgbClr val="000000">
+                <a:alpha val="36000"/>
+              </a:srgbClr>
+            </a:outerShdw>
+            <a:reflection blurRad="12700" stA="0" endPos="28000" dist="5000" dir="5400000" sy="-100000" algn="bl" rotWithShape="0"/>
+          </a:effectLst>
+        </p:spPr>
+      </p:pic>
+      <p:pic>
+        <p:nvPicPr>
+          <p:cNvPr id="6" name="Picture 5">
+            <a:extLst>
+              <a:ext uri="{FF2B5EF4-FFF2-40B4-BE49-F238E27FC236}">
+                <a16:creationId xmlns:a16="http://schemas.microsoft.com/office/drawing/2014/main" id="{947C81BD-AC36-AEB4-CE01-F51688A46AD0}"/>
+              </a:ext>
+            </a:extLst>
+          </p:cNvPr>
+          <p:cNvPicPr>
+            <a:picLocks noChangeAspect="1"/>
+          </p:cNvPicPr>
+          <p:nvPr/>
+        </p:nvPicPr>
+        <p:blipFill>
+          <a:blip r:embed="rId4"/>
+          <a:stretch>
+            <a:fillRect/>
+          </a:stretch>
+        </p:blipFill>
+        <p:spPr>
+          <a:xfrm>
+            <a:off x="2532360" y="1503445"/>
+            <a:ext cx="7126824" cy="1949936"/>
+          </a:xfrm>
+          <a:prstGeom prst="roundRect">
+            <a:avLst>
+              <a:gd name="adj" fmla="val 3962"/>
+            </a:avLst>
+          </a:prstGeom>
+          <a:solidFill>
+            <a:srgbClr val="FFFFFF">
+              <a:shade val="85000"/>
+            </a:srgbClr>
+          </a:solidFill>
+          <a:ln>
+            <a:noFill/>
+          </a:ln>
+          <a:effectLst>
+            <a:outerShdw blurRad="50800" dist="50800" dir="5400000" algn="ctr" rotWithShape="0">
+              <a:srgbClr val="000000">
+                <a:alpha val="28000"/>
+              </a:srgbClr>
+            </a:outerShdw>
+            <a:reflection blurRad="12700" stA="0" endPos="28000" dist="5000" dir="5400000" sy="-100000" algn="bl" rotWithShape="0"/>
+          </a:effectLst>
+        </p:spPr>
+      </p:pic>
+      <p:cxnSp>
+        <p:nvCxnSpPr>
+          <p:cNvPr id="7" name="Straight Arrow Connector 6">
+            <a:extLst>
+              <a:ext uri="{FF2B5EF4-FFF2-40B4-BE49-F238E27FC236}">
+                <a16:creationId xmlns:a16="http://schemas.microsoft.com/office/drawing/2014/main" id="{F91A57FF-C095-021B-5AB2-0CEC55DC1645}"/>
+              </a:ext>
+            </a:extLst>
+          </p:cNvPr>
+          <p:cNvCxnSpPr>
+            <a:cxnSpLocks/>
+          </p:cNvCxnSpPr>
+          <p:nvPr/>
+        </p:nvCxnSpPr>
+        <p:spPr>
+          <a:xfrm>
+            <a:off x="6095772" y="3583459"/>
+            <a:ext cx="228" cy="661574"/>
+          </a:xfrm>
+          <a:prstGeom prst="straightConnector1">
+            <a:avLst/>
+          </a:prstGeom>
+          <a:ln w="76200">
+            <a:solidFill>
+              <a:srgbClr val="56517E"/>
+            </a:solidFill>
+            <a:tailEnd type="triangle"/>
+          </a:ln>
+        </p:spPr>
+        <p:style>
+          <a:lnRef idx="1">
+            <a:schemeClr val="accent1"/>
+          </a:lnRef>
+          <a:fillRef idx="0">
+            <a:schemeClr val="accent1"/>
+          </a:fillRef>
+          <a:effectRef idx="0">
+            <a:schemeClr val="accent1"/>
+          </a:effectRef>
+          <a:fontRef idx="minor">
+            <a:schemeClr val="tx1"/>
+          </a:fontRef>
+        </p:style>
+      </p:cxnSp>
+      <p:sp>
+        <p:nvSpPr>
+          <p:cNvPr id="11" name="TextBox 10">
+            <a:extLst>
+              <a:ext uri="{FF2B5EF4-FFF2-40B4-BE49-F238E27FC236}">
+                <a16:creationId xmlns:a16="http://schemas.microsoft.com/office/drawing/2014/main" id="{C6A82DDC-8F02-B692-974D-2BFDF81BC9AA}"/>
+              </a:ext>
+            </a:extLst>
+          </p:cNvPr>
+          <p:cNvSpPr txBox="1"/>
+          <p:nvPr/>
+        </p:nvSpPr>
+        <p:spPr>
+          <a:xfrm>
+            <a:off x="2532360" y="1103335"/>
+            <a:ext cx="6265651" cy="400110"/>
           </a:xfrm>
           <a:prstGeom prst="rect">
             <a:avLst/>
           </a:prstGeom>
+          <a:noFill/>
         </p:spPr>
-      </p:pic>
+        <p:txBody>
+          <a:bodyPr wrap="square" rtlCol="0">
+            <a:spAutoFit/>
+          </a:bodyPr>
+          <a:lstStyle/>
+          <a:p>
+            <a:r>
+              <a:rPr lang="it-IT" sz="2000" dirty="0">
+                <a:solidFill>
+                  <a:schemeClr val="accent2">
+                    <a:lumMod val="50000"/>
+                  </a:schemeClr>
+                </a:solidFill>
+                <a:latin typeface="Times New Roman" panose="02020603050405020304" pitchFamily="18" charset="0"/>
+                <a:cs typeface="Times New Roman" panose="02020603050405020304" pitchFamily="18" charset="0"/>
+              </a:rPr>
+              <a:t>Dati sensibili degli utenti in chiaro</a:t>
+            </a:r>
+          </a:p>
+        </p:txBody>
+      </p:sp>
+      <p:sp>
+        <p:nvSpPr>
+          <p:cNvPr id="13" name="TextBox 12">
+            <a:extLst>
+              <a:ext uri="{FF2B5EF4-FFF2-40B4-BE49-F238E27FC236}">
+                <a16:creationId xmlns:a16="http://schemas.microsoft.com/office/drawing/2014/main" id="{5AD41940-5F17-E476-9B16-103FD69FC7B2}"/>
+              </a:ext>
+            </a:extLst>
+          </p:cNvPr>
+          <p:cNvSpPr txBox="1"/>
+          <p:nvPr/>
+        </p:nvSpPr>
+        <p:spPr>
+          <a:xfrm>
+            <a:off x="749720" y="3902602"/>
+            <a:ext cx="4761801" cy="400110"/>
+          </a:xfrm>
+          <a:prstGeom prst="rect">
+            <a:avLst/>
+          </a:prstGeom>
+          <a:noFill/>
+        </p:spPr>
+        <p:txBody>
+          <a:bodyPr wrap="square" rtlCol="0">
+            <a:spAutoFit/>
+          </a:bodyPr>
+          <a:lstStyle/>
+          <a:p>
+            <a:r>
+              <a:rPr lang="it-IT" sz="2000" dirty="0">
+                <a:solidFill>
+                  <a:schemeClr val="accent2">
+                    <a:lumMod val="50000"/>
+                  </a:schemeClr>
+                </a:solidFill>
+                <a:latin typeface="Times New Roman" panose="02020603050405020304" pitchFamily="18" charset="0"/>
+                <a:cs typeface="Times New Roman" panose="02020603050405020304" pitchFamily="18" charset="0"/>
+              </a:rPr>
+              <a:t>Dati sensibili degli utenti occultati</a:t>
+            </a:r>
+          </a:p>
+        </p:txBody>
+      </p:sp>
     </p:spTree>
     <p:extLst>
       <p:ext uri="{BB962C8B-B14F-4D97-AF65-F5344CB8AC3E}">
@@ -18392,33 +19474,266 @@
   <p:clrMapOvr>
     <a:masterClrMapping/>
   </p:clrMapOvr>
+  <p:timing>
+    <p:tnLst>
+      <p:par>
+        <p:cTn id="1" dur="indefinite" restart="never" nodeType="tmRoot">
+          <p:childTnLst>
+            <p:seq concurrent="1" nextAc="seek">
+              <p:cTn id="2" dur="indefinite" nodeType="mainSeq">
+                <p:childTnLst>
+                  <p:par>
+                    <p:cTn id="3" fill="hold">
+                      <p:stCondLst>
+                        <p:cond delay="indefinite"/>
+                      </p:stCondLst>
+                      <p:childTnLst>
+                        <p:par>
+                          <p:cTn id="4" fill="hold">
+                            <p:stCondLst>
+                              <p:cond delay="0"/>
+                            </p:stCondLst>
+                            <p:childTnLst>
+                              <p:par>
+                                <p:cTn id="5" presetID="10" presetClass="entr" presetSubtype="0" fill="hold" nodeType="clickEffect">
+                                  <p:stCondLst>
+                                    <p:cond delay="0"/>
+                                  </p:stCondLst>
+                                  <p:childTnLst>
+                                    <p:set>
+                                      <p:cBhvr>
+                                        <p:cTn id="6" dur="1" fill="hold">
+                                          <p:stCondLst>
+                                            <p:cond delay="0"/>
+                                          </p:stCondLst>
+                                        </p:cTn>
+                                        <p:tgtEl>
+                                          <p:spTgt spid="6"/>
+                                        </p:tgtEl>
+                                        <p:attrNameLst>
+                                          <p:attrName>style.visibility</p:attrName>
+                                        </p:attrNameLst>
+                                      </p:cBhvr>
+                                      <p:to>
+                                        <p:strVal val="visible"/>
+                                      </p:to>
+                                    </p:set>
+                                    <p:animEffect transition="in" filter="fade">
+                                      <p:cBhvr>
+                                        <p:cTn id="7" dur="300"/>
+                                        <p:tgtEl>
+                                          <p:spTgt spid="6"/>
+                                        </p:tgtEl>
+                                      </p:cBhvr>
+                                    </p:animEffect>
+                                  </p:childTnLst>
+                                </p:cTn>
+                              </p:par>
+                              <p:par>
+                                <p:cTn id="8" presetID="10" presetClass="entr" presetSubtype="0" fill="hold" grpId="0" nodeType="withEffect">
+                                  <p:stCondLst>
+                                    <p:cond delay="0"/>
+                                  </p:stCondLst>
+                                  <p:childTnLst>
+                                    <p:set>
+                                      <p:cBhvr>
+                                        <p:cTn id="9" dur="1" fill="hold">
+                                          <p:stCondLst>
+                                            <p:cond delay="0"/>
+                                          </p:stCondLst>
+                                        </p:cTn>
+                                        <p:tgtEl>
+                                          <p:spTgt spid="11"/>
+                                        </p:tgtEl>
+                                        <p:attrNameLst>
+                                          <p:attrName>style.visibility</p:attrName>
+                                        </p:attrNameLst>
+                                      </p:cBhvr>
+                                      <p:to>
+                                        <p:strVal val="visible"/>
+                                      </p:to>
+                                    </p:set>
+                                    <p:animEffect transition="in" filter="fade">
+                                      <p:cBhvr>
+                                        <p:cTn id="10" dur="500"/>
+                                        <p:tgtEl>
+                                          <p:spTgt spid="11"/>
+                                        </p:tgtEl>
+                                      </p:cBhvr>
+                                    </p:animEffect>
+                                  </p:childTnLst>
+                                </p:cTn>
+                              </p:par>
+                            </p:childTnLst>
+                          </p:cTn>
+                        </p:par>
+                      </p:childTnLst>
+                    </p:cTn>
+                  </p:par>
+                  <p:par>
+                    <p:cTn id="11" fill="hold">
+                      <p:stCondLst>
+                        <p:cond delay="indefinite"/>
+                      </p:stCondLst>
+                      <p:childTnLst>
+                        <p:par>
+                          <p:cTn id="12" fill="hold">
+                            <p:stCondLst>
+                              <p:cond delay="0"/>
+                            </p:stCondLst>
+                            <p:childTnLst>
+                              <p:par>
+                                <p:cTn id="13" presetID="10" presetClass="entr" presetSubtype="0" fill="hold" nodeType="clickEffect">
+                                  <p:stCondLst>
+                                    <p:cond delay="0"/>
+                                  </p:stCondLst>
+                                  <p:childTnLst>
+                                    <p:set>
+                                      <p:cBhvr>
+                                        <p:cTn id="14" dur="1" fill="hold">
+                                          <p:stCondLst>
+                                            <p:cond delay="0"/>
+                                          </p:stCondLst>
+                                        </p:cTn>
+                                        <p:tgtEl>
+                                          <p:spTgt spid="7"/>
+                                        </p:tgtEl>
+                                        <p:attrNameLst>
+                                          <p:attrName>style.visibility</p:attrName>
+                                        </p:attrNameLst>
+                                      </p:cBhvr>
+                                      <p:to>
+                                        <p:strVal val="visible"/>
+                                      </p:to>
+                                    </p:set>
+                                    <p:animEffect transition="in" filter="fade">
+                                      <p:cBhvr>
+                                        <p:cTn id="15" dur="300"/>
+                                        <p:tgtEl>
+                                          <p:spTgt spid="7"/>
+                                        </p:tgtEl>
+                                      </p:cBhvr>
+                                    </p:animEffect>
+                                  </p:childTnLst>
+                                </p:cTn>
+                              </p:par>
+                            </p:childTnLst>
+                          </p:cTn>
+                        </p:par>
+                        <p:par>
+                          <p:cTn id="16" fill="hold">
+                            <p:stCondLst>
+                              <p:cond delay="300"/>
+                            </p:stCondLst>
+                            <p:childTnLst>
+                              <p:par>
+                                <p:cTn id="17" presetID="10" presetClass="entr" presetSubtype="0" fill="hold" nodeType="afterEffect">
+                                  <p:stCondLst>
+                                    <p:cond delay="0"/>
+                                  </p:stCondLst>
+                                  <p:childTnLst>
+                                    <p:set>
+                                      <p:cBhvr>
+                                        <p:cTn id="18" dur="1" fill="hold">
+                                          <p:stCondLst>
+                                            <p:cond delay="0"/>
+                                          </p:stCondLst>
+                                        </p:cTn>
+                                        <p:tgtEl>
+                                          <p:spTgt spid="5"/>
+                                        </p:tgtEl>
+                                        <p:attrNameLst>
+                                          <p:attrName>style.visibility</p:attrName>
+                                        </p:attrNameLst>
+                                      </p:cBhvr>
+                                      <p:to>
+                                        <p:strVal val="visible"/>
+                                      </p:to>
+                                    </p:set>
+                                    <p:animEffect transition="in" filter="fade">
+                                      <p:cBhvr>
+                                        <p:cTn id="19" dur="300"/>
+                                        <p:tgtEl>
+                                          <p:spTgt spid="5"/>
+                                        </p:tgtEl>
+                                      </p:cBhvr>
+                                    </p:animEffect>
+                                  </p:childTnLst>
+                                </p:cTn>
+                              </p:par>
+                              <p:par>
+                                <p:cTn id="20" presetID="10" presetClass="entr" presetSubtype="0" fill="hold" grpId="0" nodeType="withEffect">
+                                  <p:stCondLst>
+                                    <p:cond delay="0"/>
+                                  </p:stCondLst>
+                                  <p:childTnLst>
+                                    <p:set>
+                                      <p:cBhvr>
+                                        <p:cTn id="21" dur="1" fill="hold">
+                                          <p:stCondLst>
+                                            <p:cond delay="0"/>
+                                          </p:stCondLst>
+                                        </p:cTn>
+                                        <p:tgtEl>
+                                          <p:spTgt spid="13"/>
+                                        </p:tgtEl>
+                                        <p:attrNameLst>
+                                          <p:attrName>style.visibility</p:attrName>
+                                        </p:attrNameLst>
+                                      </p:cBhvr>
+                                      <p:to>
+                                        <p:strVal val="visible"/>
+                                      </p:to>
+                                    </p:set>
+                                    <p:animEffect transition="in" filter="fade">
+                                      <p:cBhvr>
+                                        <p:cTn id="22" dur="500"/>
+                                        <p:tgtEl>
+                                          <p:spTgt spid="13"/>
+                                        </p:tgtEl>
+                                      </p:cBhvr>
+                                    </p:animEffect>
+                                  </p:childTnLst>
+                                </p:cTn>
+                              </p:par>
+                            </p:childTnLst>
+                          </p:cTn>
+                        </p:par>
+                      </p:childTnLst>
+                    </p:cTn>
+                  </p:par>
+                </p:childTnLst>
+              </p:cTn>
+              <p:prevCondLst>
+                <p:cond evt="onPrev" delay="0">
+                  <p:tgtEl>
+                    <p:sldTgt/>
+                  </p:tgtEl>
+                </p:cond>
+              </p:prevCondLst>
+              <p:nextCondLst>
+                <p:cond evt="onNext" delay="0">
+                  <p:tgtEl>
+                    <p:sldTgt/>
+                  </p:tgtEl>
+                </p:cond>
+              </p:nextCondLst>
+            </p:seq>
+          </p:childTnLst>
+        </p:cTn>
+      </p:par>
+    </p:tnLst>
+    <p:bldLst>
+      <p:bldP spid="11" grpId="0"/>
+      <p:bldP spid="13" grpId="0"/>
+    </p:bldLst>
+  </p:timing>
 </p:sld>
 </file>
 
 <file path=ppt/slides/slide2.xml><?xml version="1.0" encoding="utf-8"?>
 <p:sld xmlns:a="http://schemas.openxmlformats.org/drawingml/2006/main" xmlns:r="http://schemas.openxmlformats.org/officeDocument/2006/relationships" xmlns:p="http://schemas.openxmlformats.org/presentationml/2006/main">
   <p:cSld>
-    <p:bg>
-      <p:bgPr>
-        <a:gradFill>
-          <a:gsLst>
-            <a:gs pos="0">
-              <a:schemeClr val="accent6">
-                <a:lumMod val="40000"/>
-                <a:lumOff val="60000"/>
-              </a:schemeClr>
-            </a:gs>
-            <a:gs pos="100000">
-              <a:schemeClr val="accent6">
-                <a:lumMod val="75000"/>
-              </a:schemeClr>
-            </a:gs>
-          </a:gsLst>
-          <a:lin ang="8100000" scaled="1"/>
-        </a:gradFill>
-        <a:effectLst/>
-      </p:bgPr>
-    </p:bg>
     <p:spTree>
       <p:nvGrpSpPr>
         <p:cNvPr id="1" name=""/>
@@ -19417,27 +20732,6 @@
 <file path=ppt/slides/slide20.xml><?xml version="1.0" encoding="utf-8"?>
 <p:sld xmlns:a="http://schemas.openxmlformats.org/drawingml/2006/main" xmlns:r="http://schemas.openxmlformats.org/officeDocument/2006/relationships" xmlns:p="http://schemas.openxmlformats.org/presentationml/2006/main">
   <p:cSld>
-    <p:bg>
-      <p:bgPr>
-        <a:gradFill>
-          <a:gsLst>
-            <a:gs pos="0">
-              <a:schemeClr val="accent6">
-                <a:lumMod val="40000"/>
-                <a:lumOff val="60000"/>
-              </a:schemeClr>
-            </a:gs>
-            <a:gs pos="100000">
-              <a:schemeClr val="accent6">
-                <a:lumMod val="75000"/>
-              </a:schemeClr>
-            </a:gs>
-          </a:gsLst>
-          <a:lin ang="8100000" scaled="1"/>
-        </a:gradFill>
-        <a:effectLst/>
-      </p:bgPr>
-    </p:bg>
     <p:spTree>
       <p:nvGrpSpPr>
         <p:cNvPr id="1" name=""/>
@@ -19716,10 +21010,404 @@
             </a:extLst>
           </p:cNvPr>
           <p:cNvGraphicFramePr/>
+          <p:nvPr/>
+        </p:nvGraphicFramePr>
+        <p:xfrm>
+          <a:off x="1159135" y="1014684"/>
+          <a:ext cx="9601199" cy="3557340"/>
+        </p:xfrm>
+        <a:graphic>
+          <a:graphicData uri="http://schemas.openxmlformats.org/drawingml/2006/chart">
+            <c:chart xmlns:c="http://schemas.openxmlformats.org/drawingml/2006/chart" xmlns:r="http://schemas.openxmlformats.org/officeDocument/2006/relationships" r:id="rId3"/>
+          </a:graphicData>
+        </a:graphic>
+      </p:graphicFrame>
+    </p:spTree>
+    <p:extLst>
+      <p:ext uri="{BB962C8B-B14F-4D97-AF65-F5344CB8AC3E}">
+        <p14:creationId xmlns:p14="http://schemas.microsoft.com/office/powerpoint/2010/main" val="611650588"/>
+      </p:ext>
+    </p:extLst>
+  </p:cSld>
+  <p:clrMapOvr>
+    <a:masterClrMapping/>
+  </p:clrMapOvr>
+  <p:timing>
+    <p:tnLst>
+      <p:par>
+        <p:cTn id="1" dur="indefinite" restart="never" nodeType="tmRoot">
+          <p:childTnLst>
+            <p:seq concurrent="1" nextAc="seek">
+              <p:cTn id="2" dur="indefinite" nodeType="mainSeq">
+                <p:childTnLst>
+                  <p:par>
+                    <p:cTn id="3" fill="hold">
+                      <p:stCondLst>
+                        <p:cond delay="indefinite"/>
+                      </p:stCondLst>
+                      <p:childTnLst>
+                        <p:par>
+                          <p:cTn id="4" fill="hold">
+                            <p:stCondLst>
+                              <p:cond delay="0"/>
+                            </p:stCondLst>
+                            <p:childTnLst>
+                              <p:par>
+                                <p:cTn id="5" presetID="10" presetClass="entr" presetSubtype="0" fill="hold" grpId="0" nodeType="clickEffect">
+                                  <p:stCondLst>
+                                    <p:cond delay="0"/>
+                                  </p:stCondLst>
+                                  <p:childTnLst>
+                                    <p:set>
+                                      <p:cBhvr>
+                                        <p:cTn id="6" dur="1" fill="hold">
+                                          <p:stCondLst>
+                                            <p:cond delay="0"/>
+                                          </p:stCondLst>
+                                        </p:cTn>
+                                        <p:tgtEl>
+                                          <p:spTgt spid="4"/>
+                                        </p:tgtEl>
+                                        <p:attrNameLst>
+                                          <p:attrName>style.visibility</p:attrName>
+                                        </p:attrNameLst>
+                                      </p:cBhvr>
+                                      <p:to>
+                                        <p:strVal val="visible"/>
+                                      </p:to>
+                                    </p:set>
+                                    <p:animEffect transition="in" filter="fade">
+                                      <p:cBhvr>
+                                        <p:cTn id="7" dur="500"/>
+                                        <p:tgtEl>
+                                          <p:spTgt spid="4"/>
+                                        </p:tgtEl>
+                                      </p:cBhvr>
+                                    </p:animEffect>
+                                  </p:childTnLst>
+                                </p:cTn>
+                              </p:par>
+                            </p:childTnLst>
+                          </p:cTn>
+                        </p:par>
+                      </p:childTnLst>
+                    </p:cTn>
+                  </p:par>
+                </p:childTnLst>
+              </p:cTn>
+              <p:prevCondLst>
+                <p:cond evt="onPrev" delay="0">
+                  <p:tgtEl>
+                    <p:sldTgt/>
+                  </p:tgtEl>
+                </p:cond>
+              </p:prevCondLst>
+              <p:nextCondLst>
+                <p:cond evt="onNext" delay="0">
+                  <p:tgtEl>
+                    <p:sldTgt/>
+                  </p:tgtEl>
+                </p:cond>
+              </p:nextCondLst>
+            </p:seq>
+          </p:childTnLst>
+        </p:cTn>
+      </p:par>
+    </p:tnLst>
+    <p:bldLst>
+      <p:bldGraphic spid="4" grpId="0">
+        <p:bldAsOne/>
+      </p:bldGraphic>
+    </p:bldLst>
+  </p:timing>
+</p:sld>
+</file>
+
+<file path=ppt/slides/slide21.xml><?xml version="1.0" encoding="utf-8"?>
+<p:sld xmlns:a="http://schemas.openxmlformats.org/drawingml/2006/main" xmlns:r="http://schemas.openxmlformats.org/officeDocument/2006/relationships" xmlns:p="http://schemas.openxmlformats.org/presentationml/2006/main">
+  <p:cSld>
+    <p:spTree>
+      <p:nvGrpSpPr>
+        <p:cNvPr id="1" name=""/>
+        <p:cNvGrpSpPr/>
+        <p:nvPr/>
+      </p:nvGrpSpPr>
+      <p:grpSpPr>
+        <a:xfrm>
+          <a:off x="0" y="0"/>
+          <a:ext cx="0" cy="0"/>
+          <a:chOff x="0" y="0"/>
+          <a:chExt cx="0" cy="0"/>
+        </a:xfrm>
+      </p:grpSpPr>
+      <p:sp>
+        <p:nvSpPr>
+          <p:cNvPr id="8" name="Rectangle: Rounded Corners 7">
+            <a:extLst>
+              <a:ext uri="{FF2B5EF4-FFF2-40B4-BE49-F238E27FC236}">
+                <a16:creationId xmlns:a16="http://schemas.microsoft.com/office/drawing/2014/main" id="{7BB0D57C-96FC-342D-E8C0-5E4D36FCC075}"/>
+              </a:ext>
+            </a:extLst>
+          </p:cNvPr>
+          <p:cNvSpPr/>
+          <p:nvPr/>
+        </p:nvSpPr>
+        <p:spPr>
+          <a:xfrm>
+            <a:off x="136263" y="107576"/>
+            <a:ext cx="11919473" cy="6642848"/>
+          </a:xfrm>
+          <a:prstGeom prst="roundRect">
+            <a:avLst>
+              <a:gd name="adj" fmla="val 1768"/>
+            </a:avLst>
+          </a:prstGeom>
+          <a:solidFill>
+            <a:schemeClr val="accent2">
+              <a:lumMod val="20000"/>
+              <a:lumOff val="80000"/>
+            </a:schemeClr>
+          </a:solidFill>
+          <a:ln>
+            <a:noFill/>
+          </a:ln>
+          <a:effectLst>
+            <a:softEdge rad="0"/>
+          </a:effectLst>
+        </p:spPr>
+        <p:style>
+          <a:lnRef idx="2">
+            <a:schemeClr val="accent1">
+              <a:shade val="15000"/>
+            </a:schemeClr>
+          </a:lnRef>
+          <a:fillRef idx="1">
+            <a:schemeClr val="accent1"/>
+          </a:fillRef>
+          <a:effectRef idx="0">
+            <a:schemeClr val="accent1"/>
+          </a:effectRef>
+          <a:fontRef idx="minor">
+            <a:schemeClr val="lt1"/>
+          </a:fontRef>
+        </p:style>
+        <p:txBody>
+          <a:bodyPr rtlCol="0" anchor="ctr"/>
+          <a:lstStyle/>
+          <a:p>
+            <a:pPr marL="0" marR="0" lvl="0" indent="0" algn="ctr" defTabSz="914400" rtl="0" eaLnBrk="1" fontAlgn="auto" latinLnBrk="0" hangingPunct="1">
+              <a:lnSpc>
+                <a:spcPct val="100000"/>
+              </a:lnSpc>
+              <a:spcBef>
+                <a:spcPts val="0"/>
+              </a:spcBef>
+              <a:spcAft>
+                <a:spcPts val="0"/>
+              </a:spcAft>
+              <a:buClrTx/>
+              <a:buSzTx/>
+              <a:buFontTx/>
+              <a:buNone/>
+              <a:tabLst/>
+              <a:defRPr/>
+            </a:pPr>
+            <a:endParaRPr kumimoji="0" lang="it-IT" sz="1800" b="0" i="0" u="none" strike="noStrike" kern="1200" cap="none" spc="0" normalizeH="0" baseline="0" noProof="0" dirty="0">
+              <a:ln>
+                <a:noFill/>
+              </a:ln>
+              <a:solidFill>
+                <a:prstClr val="white"/>
+              </a:solidFill>
+              <a:effectLst/>
+              <a:uLnTx/>
+              <a:uFillTx/>
+              <a:latin typeface="Calibri" panose="020F0502020204030204"/>
+              <a:ea typeface="+mn-ea"/>
+              <a:cs typeface="+mn-cs"/>
+            </a:endParaRPr>
+          </a:p>
+        </p:txBody>
+      </p:sp>
+      <p:sp>
+        <p:nvSpPr>
+          <p:cNvPr id="10" name="Rectangle: Rounded Corners 9">
+            <a:extLst>
+              <a:ext uri="{FF2B5EF4-FFF2-40B4-BE49-F238E27FC236}">
+                <a16:creationId xmlns:a16="http://schemas.microsoft.com/office/drawing/2014/main" id="{353FC021-9E12-A48E-6ABA-58B63D78E973}"/>
+              </a:ext>
+            </a:extLst>
+          </p:cNvPr>
+          <p:cNvSpPr/>
+          <p:nvPr/>
+        </p:nvSpPr>
+        <p:spPr>
+          <a:xfrm>
+            <a:off x="4492101" y="253713"/>
+            <a:ext cx="3213716" cy="536232"/>
+          </a:xfrm>
+          <a:prstGeom prst="roundRect">
+            <a:avLst/>
+          </a:prstGeom>
+          <a:solidFill>
+            <a:schemeClr val="bg1"/>
+          </a:solidFill>
+          <a:ln>
+            <a:noFill/>
+          </a:ln>
+        </p:spPr>
+        <p:style>
+          <a:lnRef idx="2">
+            <a:schemeClr val="accent1">
+              <a:shade val="15000"/>
+            </a:schemeClr>
+          </a:lnRef>
+          <a:fillRef idx="1">
+            <a:schemeClr val="accent1"/>
+          </a:fillRef>
+          <a:effectRef idx="0">
+            <a:schemeClr val="accent1"/>
+          </a:effectRef>
+          <a:fontRef idx="minor">
+            <a:schemeClr val="lt1"/>
+          </a:fontRef>
+        </p:style>
+        <p:txBody>
+          <a:bodyPr rtlCol="0" anchor="ctr"/>
+          <a:lstStyle/>
+          <a:p>
+            <a:pPr marL="0" marR="0" lvl="0" indent="0" algn="ctr" defTabSz="914400" rtl="0" eaLnBrk="1" fontAlgn="auto" latinLnBrk="0" hangingPunct="1">
+              <a:lnSpc>
+                <a:spcPct val="100000"/>
+              </a:lnSpc>
+              <a:spcBef>
+                <a:spcPts val="0"/>
+              </a:spcBef>
+              <a:spcAft>
+                <a:spcPts val="0"/>
+              </a:spcAft>
+              <a:buClrTx/>
+              <a:buSzTx/>
+              <a:buFontTx/>
+              <a:buNone/>
+              <a:tabLst/>
+              <a:defRPr/>
+            </a:pPr>
+            <a:endParaRPr kumimoji="0" lang="it-IT" sz="1800" b="0" i="0" u="none" strike="noStrike" kern="1200" cap="none" spc="0" normalizeH="0" baseline="0" noProof="0">
+              <a:ln>
+                <a:noFill/>
+              </a:ln>
+              <a:solidFill>
+                <a:prstClr val="white"/>
+              </a:solidFill>
+              <a:effectLst/>
+              <a:uLnTx/>
+              <a:uFillTx/>
+              <a:latin typeface="Calibri" panose="020F0502020204030204"/>
+              <a:ea typeface="+mn-ea"/>
+              <a:cs typeface="+mn-cs"/>
+            </a:endParaRPr>
+          </a:p>
+        </p:txBody>
+      </p:sp>
+      <p:sp>
+        <p:nvSpPr>
+          <p:cNvPr id="2" name="Title 1">
+            <a:extLst>
+              <a:ext uri="{FF2B5EF4-FFF2-40B4-BE49-F238E27FC236}">
+                <a16:creationId xmlns:a16="http://schemas.microsoft.com/office/drawing/2014/main" id="{29FD1FBB-B73F-521A-0195-23D08646B2BD}"/>
+              </a:ext>
+            </a:extLst>
+          </p:cNvPr>
+          <p:cNvSpPr>
+            <a:spLocks noGrp="1"/>
+          </p:cNvSpPr>
+          <p:nvPr>
+            <p:ph type="ctrTitle"/>
+          </p:nvPr>
+        </p:nvSpPr>
+        <p:spPr>
+          <a:xfrm>
+            <a:off x="0" y="219075"/>
+            <a:ext cx="12192000" cy="547058"/>
+          </a:xfrm>
+        </p:spPr>
+        <p:txBody>
+          <a:bodyPr>
+            <a:normAutofit fontScale="90000"/>
+          </a:bodyPr>
+          <a:lstStyle/>
+          <a:p>
+            <a:pPr hangingPunct="0">
+              <a:tabLst>
+                <a:tab pos="7496175" algn="r"/>
+              </a:tabLst>
+            </a:pPr>
+            <a:r>
+              <a:rPr lang="it-IT" sz="3600" dirty="0">
+                <a:latin typeface="Cambria Math" panose="02040503050406030204" pitchFamily="18" charset="0"/>
+                <a:ea typeface="Cambria Math" panose="02040503050406030204" pitchFamily="18" charset="0"/>
+                <a:cs typeface="Times New Roman" panose="02020603050405020304" pitchFamily="18" charset="0"/>
+              </a:rPr>
+              <a:t>Risultati ottenuti</a:t>
+            </a:r>
+          </a:p>
+        </p:txBody>
+      </p:sp>
+      <p:sp>
+        <p:nvSpPr>
+          <p:cNvPr id="3" name="Subtitle 2">
+            <a:extLst>
+              <a:ext uri="{FF2B5EF4-FFF2-40B4-BE49-F238E27FC236}">
+                <a16:creationId xmlns:a16="http://schemas.microsoft.com/office/drawing/2014/main" id="{FC446B2D-F94A-2F94-9904-6D62ADA65C8F}"/>
+              </a:ext>
+            </a:extLst>
+          </p:cNvPr>
+          <p:cNvSpPr>
+            <a:spLocks noGrp="1"/>
+          </p:cNvSpPr>
+          <p:nvPr>
+            <p:ph type="subTitle" idx="1"/>
+          </p:nvPr>
+        </p:nvSpPr>
+        <p:spPr>
+          <a:xfrm>
+            <a:off x="1159136" y="1141768"/>
+            <a:ext cx="9601200" cy="5497157"/>
+          </a:xfrm>
+        </p:spPr>
+        <p:txBody>
+          <a:bodyPr>
+            <a:normAutofit/>
+          </a:bodyPr>
+          <a:lstStyle/>
+          <a:p>
+            <a:pPr algn="l">
+              <a:lnSpc>
+                <a:spcPct val="200000"/>
+              </a:lnSpc>
+            </a:pPr>
+            <a:endParaRPr lang="it-IT" dirty="0">
+              <a:latin typeface="Times New Roman" panose="02020603050405020304" pitchFamily="18" charset="0"/>
+              <a:cs typeface="Times New Roman" panose="02020603050405020304" pitchFamily="18" charset="0"/>
+            </a:endParaRPr>
+          </a:p>
+        </p:txBody>
+      </p:sp>
+      <p:graphicFrame>
+        <p:nvGraphicFramePr>
+          <p:cNvPr id="4" name="Chart 3">
+            <a:extLst>
+              <a:ext uri="{FF2B5EF4-FFF2-40B4-BE49-F238E27FC236}">
+                <a16:creationId xmlns:a16="http://schemas.microsoft.com/office/drawing/2014/main" id="{B2E7BEBD-EAB7-1AAB-6BAA-84C75C558318}"/>
+              </a:ext>
+            </a:extLst>
+          </p:cNvPr>
+          <p:cNvGraphicFramePr/>
           <p:nvPr>
             <p:extLst>
               <p:ext uri="{D42A27DB-BD31-4B8C-83A1-F6EECF244321}">
-                <p14:modId xmlns:p14="http://schemas.microsoft.com/office/powerpoint/2010/main" val="2655519638"/>
+                <p14:modId xmlns:p14="http://schemas.microsoft.com/office/powerpoint/2010/main" val="2219420121"/>
               </p:ext>
             </p:extLst>
           </p:nvPr>
@@ -19806,7 +21494,7 @@
                                           </p:stCondLst>
                                         </p:cTn>
                                         <p:tgtEl>
-                                          <p:spTgt spid="4"/>
+                                          <p:spTgt spid="5"/>
                                         </p:tgtEl>
                                         <p:attrNameLst>
                                           <p:attrName>style.visibility</p:attrName>
@@ -19819,59 +21507,6 @@
                                     <p:animEffect transition="in" filter="fade">
                                       <p:cBhvr>
                                         <p:cTn id="7" dur="500"/>
-                                        <p:tgtEl>
-                                          <p:spTgt spid="4"/>
-                                        </p:tgtEl>
-                                      </p:cBhvr>
-                                    </p:animEffect>
-                                  </p:childTnLst>
-                                </p:cTn>
-                              </p:par>
-                            </p:childTnLst>
-                          </p:cTn>
-                        </p:par>
-                      </p:childTnLst>
-                    </p:cTn>
-                  </p:par>
-                  <p:par>
-                    <p:cTn id="8" fill="hold">
-                      <p:stCondLst>
-                        <p:cond delay="indefinite"/>
-                      </p:stCondLst>
-                      <p:childTnLst>
-                        <p:par>
-                          <p:cTn id="9" fill="hold">
-                            <p:stCondLst>
-                              <p:cond delay="0"/>
-                            </p:stCondLst>
-                            <p:childTnLst>
-                              <p:par>
-                                <p:cTn id="10" presetID="10" presetClass="entr" presetSubtype="0" fill="hold" grpId="0" nodeType="clickEffect">
-                                  <p:stCondLst>
-                                    <p:cond delay="0"/>
-                                  </p:stCondLst>
-                                  <p:childTnLst>
-                                    <p:set>
-                                      <p:cBhvr>
-                                        <p:cTn id="11" dur="1" fill="hold">
-                                          <p:stCondLst>
-                                            <p:cond delay="0"/>
-                                          </p:stCondLst>
-                                        </p:cTn>
-                                        <p:tgtEl>
-                                          <p:spTgt spid="5"/>
-                                        </p:tgtEl>
-                                        <p:attrNameLst>
-                                          <p:attrName>style.visibility</p:attrName>
-                                        </p:attrNameLst>
-                                      </p:cBhvr>
-                                      <p:to>
-                                        <p:strVal val="visible"/>
-                                      </p:to>
-                                    </p:set>
-                                    <p:animEffect transition="in" filter="fade">
-                                      <p:cBhvr>
-                                        <p:cTn id="12" dur="500"/>
                                         <p:tgtEl>
                                           <p:spTgt spid="5"/>
                                         </p:tgtEl>
@@ -19908,9 +21543,6 @@
       </p:par>
     </p:tnLst>
     <p:bldLst>
-      <p:bldGraphic spid="4" grpId="0">
-        <p:bldAsOne/>
-      </p:bldGraphic>
       <p:bldGraphic spid="5" grpId="0">
         <p:bldAsOne/>
       </p:bldGraphic>
@@ -19919,7 +21551,7 @@
 </p:sld>
 </file>
 
-<file path=ppt/slides/slide21.xml><?xml version="1.0" encoding="utf-8"?>
+<file path=ppt/slides/slide22.xml><?xml version="1.0" encoding="utf-8"?>
 <p:sld xmlns:a="http://schemas.openxmlformats.org/drawingml/2006/main" xmlns:r="http://schemas.openxmlformats.org/officeDocument/2006/relationships" xmlns:p="http://schemas.openxmlformats.org/presentationml/2006/main">
   <p:cSld>
     <p:spTree>
@@ -20243,366 +21875,6 @@
   <p:clrMapOvr>
     <a:masterClrMapping/>
   </p:clrMapOvr>
-</p:sld>
-</file>
-
-<file path=ppt/slides/slide22.xml><?xml version="1.0" encoding="utf-8"?>
-<p:sld xmlns:a="http://schemas.openxmlformats.org/drawingml/2006/main" xmlns:r="http://schemas.openxmlformats.org/officeDocument/2006/relationships" xmlns:p="http://schemas.openxmlformats.org/presentationml/2006/main">
-  <p:cSld>
-    <p:bg>
-      <p:bgPr>
-        <a:gradFill>
-          <a:gsLst>
-            <a:gs pos="0">
-              <a:schemeClr val="accent6">
-                <a:lumMod val="40000"/>
-                <a:lumOff val="60000"/>
-              </a:schemeClr>
-            </a:gs>
-            <a:gs pos="100000">
-              <a:schemeClr val="accent6">
-                <a:lumMod val="75000"/>
-              </a:schemeClr>
-            </a:gs>
-          </a:gsLst>
-          <a:lin ang="8100000" scaled="1"/>
-        </a:gradFill>
-        <a:effectLst/>
-      </p:bgPr>
-    </p:bg>
-    <p:spTree>
-      <p:nvGrpSpPr>
-        <p:cNvPr id="1" name=""/>
-        <p:cNvGrpSpPr/>
-        <p:nvPr/>
-      </p:nvGrpSpPr>
-      <p:grpSpPr>
-        <a:xfrm>
-          <a:off x="0" y="0"/>
-          <a:ext cx="0" cy="0"/>
-          <a:chOff x="0" y="0"/>
-          <a:chExt cx="0" cy="0"/>
-        </a:xfrm>
-      </p:grpSpPr>
-      <p:sp>
-        <p:nvSpPr>
-          <p:cNvPr id="8" name="Rectangle: Rounded Corners 7">
-            <a:extLst>
-              <a:ext uri="{FF2B5EF4-FFF2-40B4-BE49-F238E27FC236}">
-                <a16:creationId xmlns:a16="http://schemas.microsoft.com/office/drawing/2014/main" id="{7BB0D57C-96FC-342D-E8C0-5E4D36FCC075}"/>
-              </a:ext>
-            </a:extLst>
-          </p:cNvPr>
-          <p:cNvSpPr/>
-          <p:nvPr/>
-        </p:nvSpPr>
-        <p:spPr>
-          <a:xfrm>
-            <a:off x="136263" y="107576"/>
-            <a:ext cx="11919473" cy="6642848"/>
-          </a:xfrm>
-          <a:prstGeom prst="roundRect">
-            <a:avLst>
-              <a:gd name="adj" fmla="val 1768"/>
-            </a:avLst>
-          </a:prstGeom>
-          <a:solidFill>
-            <a:schemeClr val="accent2">
-              <a:lumMod val="20000"/>
-              <a:lumOff val="80000"/>
-            </a:schemeClr>
-          </a:solidFill>
-          <a:ln>
-            <a:noFill/>
-          </a:ln>
-          <a:effectLst>
-            <a:softEdge rad="0"/>
-          </a:effectLst>
-        </p:spPr>
-        <p:style>
-          <a:lnRef idx="2">
-            <a:schemeClr val="accent1">
-              <a:shade val="15000"/>
-            </a:schemeClr>
-          </a:lnRef>
-          <a:fillRef idx="1">
-            <a:schemeClr val="accent1"/>
-          </a:fillRef>
-          <a:effectRef idx="0">
-            <a:schemeClr val="accent1"/>
-          </a:effectRef>
-          <a:fontRef idx="minor">
-            <a:schemeClr val="lt1"/>
-          </a:fontRef>
-        </p:style>
-        <p:txBody>
-          <a:bodyPr rtlCol="0" anchor="ctr"/>
-          <a:lstStyle/>
-          <a:p>
-            <a:pPr marL="0" marR="0" lvl="0" indent="0" algn="ctr" defTabSz="914400" rtl="0" eaLnBrk="1" fontAlgn="auto" latinLnBrk="0" hangingPunct="1">
-              <a:lnSpc>
-                <a:spcPct val="100000"/>
-              </a:lnSpc>
-              <a:spcBef>
-                <a:spcPts val="0"/>
-              </a:spcBef>
-              <a:spcAft>
-                <a:spcPts val="0"/>
-              </a:spcAft>
-              <a:buClrTx/>
-              <a:buSzTx/>
-              <a:buFontTx/>
-              <a:buNone/>
-              <a:tabLst/>
-              <a:defRPr/>
-            </a:pPr>
-            <a:endParaRPr kumimoji="0" lang="it-IT" sz="1800" b="0" i="0" u="none" strike="noStrike" kern="1200" cap="none" spc="0" normalizeH="0" baseline="0" noProof="0" dirty="0">
-              <a:ln>
-                <a:noFill/>
-              </a:ln>
-              <a:solidFill>
-                <a:prstClr val="white"/>
-              </a:solidFill>
-              <a:effectLst/>
-              <a:uLnTx/>
-              <a:uFillTx/>
-              <a:latin typeface="Calibri" panose="020F0502020204030204"/>
-              <a:ea typeface="+mn-ea"/>
-              <a:cs typeface="+mn-cs"/>
-            </a:endParaRPr>
-          </a:p>
-        </p:txBody>
-      </p:sp>
-      <p:sp>
-        <p:nvSpPr>
-          <p:cNvPr id="10" name="Rectangle: Rounded Corners 9">
-            <a:extLst>
-              <a:ext uri="{FF2B5EF4-FFF2-40B4-BE49-F238E27FC236}">
-                <a16:creationId xmlns:a16="http://schemas.microsoft.com/office/drawing/2014/main" id="{353FC021-9E12-A48E-6ABA-58B63D78E973}"/>
-              </a:ext>
-            </a:extLst>
-          </p:cNvPr>
-          <p:cNvSpPr/>
-          <p:nvPr/>
-        </p:nvSpPr>
-        <p:spPr>
-          <a:xfrm>
-            <a:off x="4492101" y="253713"/>
-            <a:ext cx="3213716" cy="536232"/>
-          </a:xfrm>
-          <a:prstGeom prst="roundRect">
-            <a:avLst/>
-          </a:prstGeom>
-          <a:solidFill>
-            <a:schemeClr val="bg1"/>
-          </a:solidFill>
-          <a:ln>
-            <a:noFill/>
-          </a:ln>
-        </p:spPr>
-        <p:style>
-          <a:lnRef idx="2">
-            <a:schemeClr val="accent1">
-              <a:shade val="15000"/>
-            </a:schemeClr>
-          </a:lnRef>
-          <a:fillRef idx="1">
-            <a:schemeClr val="accent1"/>
-          </a:fillRef>
-          <a:effectRef idx="0">
-            <a:schemeClr val="accent1"/>
-          </a:effectRef>
-          <a:fontRef idx="minor">
-            <a:schemeClr val="lt1"/>
-          </a:fontRef>
-        </p:style>
-        <p:txBody>
-          <a:bodyPr rtlCol="0" anchor="ctr"/>
-          <a:lstStyle/>
-          <a:p>
-            <a:pPr marL="0" marR="0" lvl="0" indent="0" algn="ctr" defTabSz="914400" rtl="0" eaLnBrk="1" fontAlgn="auto" latinLnBrk="0" hangingPunct="1">
-              <a:lnSpc>
-                <a:spcPct val="100000"/>
-              </a:lnSpc>
-              <a:spcBef>
-                <a:spcPts val="0"/>
-              </a:spcBef>
-              <a:spcAft>
-                <a:spcPts val="0"/>
-              </a:spcAft>
-              <a:buClrTx/>
-              <a:buSzTx/>
-              <a:buFontTx/>
-              <a:buNone/>
-              <a:tabLst/>
-              <a:defRPr/>
-            </a:pPr>
-            <a:endParaRPr kumimoji="0" lang="it-IT" sz="1800" b="0" i="0" u="none" strike="noStrike" kern="1200" cap="none" spc="0" normalizeH="0" baseline="0" noProof="0">
-              <a:ln>
-                <a:noFill/>
-              </a:ln>
-              <a:solidFill>
-                <a:prstClr val="white"/>
-              </a:solidFill>
-              <a:effectLst/>
-              <a:uLnTx/>
-              <a:uFillTx/>
-              <a:latin typeface="Calibri" panose="020F0502020204030204"/>
-              <a:ea typeface="+mn-ea"/>
-              <a:cs typeface="+mn-cs"/>
-            </a:endParaRPr>
-          </a:p>
-        </p:txBody>
-      </p:sp>
-      <p:sp>
-        <p:nvSpPr>
-          <p:cNvPr id="2" name="Title 1">
-            <a:extLst>
-              <a:ext uri="{FF2B5EF4-FFF2-40B4-BE49-F238E27FC236}">
-                <a16:creationId xmlns:a16="http://schemas.microsoft.com/office/drawing/2014/main" id="{29FD1FBB-B73F-521A-0195-23D08646B2BD}"/>
-              </a:ext>
-            </a:extLst>
-          </p:cNvPr>
-          <p:cNvSpPr>
-            <a:spLocks noGrp="1"/>
-          </p:cNvSpPr>
-          <p:nvPr>
-            <p:ph type="ctrTitle"/>
-          </p:nvPr>
-        </p:nvSpPr>
-        <p:spPr>
-          <a:xfrm>
-            <a:off x="0" y="219075"/>
-            <a:ext cx="12192000" cy="547058"/>
-          </a:xfrm>
-        </p:spPr>
-        <p:txBody>
-          <a:bodyPr>
-            <a:normAutofit fontScale="90000"/>
-          </a:bodyPr>
-          <a:lstStyle/>
-          <a:p>
-            <a:pPr hangingPunct="0">
-              <a:tabLst>
-                <a:tab pos="7496175" algn="r"/>
-              </a:tabLst>
-            </a:pPr>
-            <a:r>
-              <a:rPr lang="it-IT" sz="3600" dirty="0">
-                <a:latin typeface="Cambria Math" panose="02040503050406030204" pitchFamily="18" charset="0"/>
-                <a:ea typeface="Cambria Math" panose="02040503050406030204" pitchFamily="18" charset="0"/>
-                <a:cs typeface="Times New Roman" panose="02020603050405020304" pitchFamily="18" charset="0"/>
-              </a:rPr>
-              <a:t>Risultati ottenuti</a:t>
-            </a:r>
-          </a:p>
-        </p:txBody>
-      </p:sp>
-      <p:sp>
-        <p:nvSpPr>
-          <p:cNvPr id="3" name="Subtitle 2">
-            <a:extLst>
-              <a:ext uri="{FF2B5EF4-FFF2-40B4-BE49-F238E27FC236}">
-                <a16:creationId xmlns:a16="http://schemas.microsoft.com/office/drawing/2014/main" id="{FC446B2D-F94A-2F94-9904-6D62ADA65C8F}"/>
-              </a:ext>
-            </a:extLst>
-          </p:cNvPr>
-          <p:cNvSpPr>
-            <a:spLocks noGrp="1"/>
-          </p:cNvSpPr>
-          <p:nvPr>
-            <p:ph type="subTitle" idx="1"/>
-          </p:nvPr>
-        </p:nvSpPr>
-        <p:spPr>
-          <a:xfrm>
-            <a:off x="1159136" y="1141768"/>
-            <a:ext cx="9601200" cy="5497157"/>
-          </a:xfrm>
-        </p:spPr>
-        <p:txBody>
-          <a:bodyPr>
-            <a:normAutofit/>
-          </a:bodyPr>
-          <a:lstStyle/>
-          <a:p>
-            <a:pPr algn="l">
-              <a:lnSpc>
-                <a:spcPct val="200000"/>
-              </a:lnSpc>
-            </a:pPr>
-            <a:endParaRPr lang="it-IT" dirty="0">
-              <a:latin typeface="Times New Roman" panose="02020603050405020304" pitchFamily="18" charset="0"/>
-              <a:cs typeface="Times New Roman" panose="02020603050405020304" pitchFamily="18" charset="0"/>
-            </a:endParaRPr>
-          </a:p>
-        </p:txBody>
-      </p:sp>
-      <p:pic>
-        <p:nvPicPr>
-          <p:cNvPr id="7" name="Picture 6" descr="A screenshot of a computer&#10;&#10;Description automatically generated">
-            <a:extLst>
-              <a:ext uri="{FF2B5EF4-FFF2-40B4-BE49-F238E27FC236}">
-                <a16:creationId xmlns:a16="http://schemas.microsoft.com/office/drawing/2014/main" id="{1C9B805D-CBC1-0451-39AE-BF2E24808158}"/>
-              </a:ext>
-            </a:extLst>
-          </p:cNvPr>
-          <p:cNvPicPr>
-            <a:picLocks noChangeAspect="1"/>
-          </p:cNvPicPr>
-          <p:nvPr/>
-        </p:nvPicPr>
-        <p:blipFill>
-          <a:blip r:embed="rId3"/>
-          <a:stretch>
-            <a:fillRect/>
-          </a:stretch>
-        </p:blipFill>
-        <p:spPr>
-          <a:xfrm>
-            <a:off x="620089" y="894508"/>
-            <a:ext cx="10951821" cy="5709779"/>
-          </a:xfrm>
-          <a:prstGeom prst="roundRect">
-            <a:avLst>
-              <a:gd name="adj" fmla="val 753"/>
-            </a:avLst>
-          </a:prstGeom>
-          <a:solidFill>
-            <a:srgbClr val="FFFFFF">
-              <a:shade val="85000"/>
-            </a:srgbClr>
-          </a:solidFill>
-          <a:ln>
-            <a:noFill/>
-          </a:ln>
-          <a:effectLst>
-            <a:reflection blurRad="12700" stA="0" endPos="28000" dist="5000" dir="5400000" sy="-100000" algn="bl" rotWithShape="0"/>
-          </a:effectLst>
-        </p:spPr>
-      </p:pic>
-    </p:spTree>
-    <p:extLst>
-      <p:ext uri="{BB962C8B-B14F-4D97-AF65-F5344CB8AC3E}">
-        <p14:creationId xmlns:p14="http://schemas.microsoft.com/office/powerpoint/2010/main" val="1192033070"/>
-      </p:ext>
-    </p:extLst>
-  </p:cSld>
-  <p:clrMapOvr>
-    <a:masterClrMapping/>
-  </p:clrMapOvr>
-  <mc:AlternateContent xmlns:mc="http://schemas.openxmlformats.org/markup-compatibility/2006">
-    <mc:Choice xmlns:p159="http://schemas.microsoft.com/office/powerpoint/2015/09/main" Requires="p159">
-      <p:transition xmlns:p14="http://schemas.microsoft.com/office/powerpoint/2010/main" spd="slow" p14:dur="2000">
-        <p159:morph option="byObject"/>
-      </p:transition>
-    </mc:Choice>
-    <mc:Fallback>
-      <p:transition spd="slow">
-        <p:fade/>
-      </p:transition>
-    </mc:Fallback>
-  </mc:AlternateContent>
 </p:sld>
 </file>
 
@@ -20879,10 +22151,10 @@
       </p:sp>
       <p:pic>
         <p:nvPicPr>
-          <p:cNvPr id="5" name="Picture 4">
+          <p:cNvPr id="7" name="Picture 6" descr="A screenshot of a computer&#10;&#10;Description automatically generated">
             <a:extLst>
               <a:ext uri="{FF2B5EF4-FFF2-40B4-BE49-F238E27FC236}">
-                <a16:creationId xmlns:a16="http://schemas.microsoft.com/office/drawing/2014/main" id="{3812DE40-5AF8-7D6E-7A08-B24D8EBC1394}"/>
+                <a16:creationId xmlns:a16="http://schemas.microsoft.com/office/drawing/2014/main" id="{1C9B805D-CBC1-0451-39AE-BF2E24808158}"/>
               </a:ext>
             </a:extLst>
           </p:cNvPr>
@@ -20893,17 +22165,18 @@
         </p:nvPicPr>
         <p:blipFill>
           <a:blip r:embed="rId3"/>
-          <a:srcRect/>
-          <a:stretch/>
+          <a:stretch>
+            <a:fillRect/>
+          </a:stretch>
         </p:blipFill>
         <p:spPr>
           <a:xfrm>
-            <a:off x="953644" y="856599"/>
-            <a:ext cx="10284709" cy="5782326"/>
+            <a:off x="620089" y="894508"/>
+            <a:ext cx="10951821" cy="5709779"/>
           </a:xfrm>
           <a:prstGeom prst="roundRect">
             <a:avLst>
-              <a:gd name="adj" fmla="val 1017"/>
+              <a:gd name="adj" fmla="val 753"/>
             </a:avLst>
           </a:prstGeom>
           <a:solidFill>
@@ -20922,13 +22195,25 @@
     </p:spTree>
     <p:extLst>
       <p:ext uri="{BB962C8B-B14F-4D97-AF65-F5344CB8AC3E}">
-        <p14:creationId xmlns:p14="http://schemas.microsoft.com/office/powerpoint/2010/main" val="826783920"/>
+        <p14:creationId xmlns:p14="http://schemas.microsoft.com/office/powerpoint/2010/main" val="1192033070"/>
       </p:ext>
     </p:extLst>
   </p:cSld>
   <p:clrMapOvr>
     <a:masterClrMapping/>
   </p:clrMapOvr>
+  <mc:AlternateContent xmlns:mc="http://schemas.openxmlformats.org/markup-compatibility/2006" xmlns:p159="http://schemas.microsoft.com/office/powerpoint/2015/09/main">
+    <mc:Choice Requires="p159">
+      <p:transition xmlns:p14="http://schemas.microsoft.com/office/powerpoint/2010/main" spd="slow" p14:dur="2000">
+        <p159:morph option="byObject"/>
+      </p:transition>
+    </mc:Choice>
+    <mc:Fallback xmlns="">
+      <p:transition spd="slow">
+        <p:fade/>
+      </p:transition>
+    </mc:Fallback>
+  </mc:AlternateContent>
 </p:sld>
 </file>
 
@@ -21205,10 +22490,10 @@
       </p:sp>
       <p:pic>
         <p:nvPicPr>
-          <p:cNvPr id="7" name="Picture 6">
+          <p:cNvPr id="5" name="Picture 4">
             <a:extLst>
               <a:ext uri="{FF2B5EF4-FFF2-40B4-BE49-F238E27FC236}">
-                <a16:creationId xmlns:a16="http://schemas.microsoft.com/office/drawing/2014/main" id="{1C9B805D-CBC1-0451-39AE-BF2E24808158}"/>
+                <a16:creationId xmlns:a16="http://schemas.microsoft.com/office/drawing/2014/main" id="{3812DE40-5AF8-7D6E-7A08-B24D8EBC1394}"/>
               </a:ext>
             </a:extLst>
           </p:cNvPr>
@@ -21224,12 +22509,12 @@
         </p:blipFill>
         <p:spPr>
           <a:xfrm>
-            <a:off x="620089" y="894509"/>
-            <a:ext cx="10951821" cy="5709777"/>
+            <a:off x="953644" y="856599"/>
+            <a:ext cx="10284709" cy="5782326"/>
           </a:xfrm>
           <a:prstGeom prst="roundRect">
             <a:avLst>
-              <a:gd name="adj" fmla="val 753"/>
+              <a:gd name="adj" fmla="val 1017"/>
             </a:avLst>
           </a:prstGeom>
           <a:solidFill>
@@ -21248,52 +22533,19 @@
     </p:spTree>
     <p:extLst>
       <p:ext uri="{BB962C8B-B14F-4D97-AF65-F5344CB8AC3E}">
-        <p14:creationId xmlns:p14="http://schemas.microsoft.com/office/powerpoint/2010/main" val="3804425154"/>
+        <p14:creationId xmlns:p14="http://schemas.microsoft.com/office/powerpoint/2010/main" val="826783920"/>
       </p:ext>
     </p:extLst>
   </p:cSld>
   <p:clrMapOvr>
     <a:masterClrMapping/>
   </p:clrMapOvr>
-  <mc:AlternateContent xmlns:mc="http://schemas.openxmlformats.org/markup-compatibility/2006">
-    <mc:Choice xmlns:p159="http://schemas.microsoft.com/office/powerpoint/2015/09/main" Requires="p159">
-      <p:transition xmlns:p14="http://schemas.microsoft.com/office/powerpoint/2010/main" spd="slow" p14:dur="2000">
-        <p159:morph option="byObject"/>
-      </p:transition>
-    </mc:Choice>
-    <mc:Fallback>
-      <p:transition spd="slow">
-        <p:fade/>
-      </p:transition>
-    </mc:Fallback>
-  </mc:AlternateContent>
 </p:sld>
 </file>
 
 <file path=ppt/slides/slide25.xml><?xml version="1.0" encoding="utf-8"?>
 <p:sld xmlns:a="http://schemas.openxmlformats.org/drawingml/2006/main" xmlns:r="http://schemas.openxmlformats.org/officeDocument/2006/relationships" xmlns:p="http://schemas.openxmlformats.org/presentationml/2006/main">
   <p:cSld>
-    <p:bg>
-      <p:bgPr>
-        <a:gradFill>
-          <a:gsLst>
-            <a:gs pos="0">
-              <a:schemeClr val="accent6">
-                <a:lumMod val="40000"/>
-                <a:lumOff val="60000"/>
-              </a:schemeClr>
-            </a:gs>
-            <a:gs pos="100000">
-              <a:schemeClr val="accent6">
-                <a:lumMod val="75000"/>
-              </a:schemeClr>
-            </a:gs>
-          </a:gsLst>
-          <a:lin ang="8100000" scaled="1"/>
-        </a:gradFill>
-        <a:effectLst/>
-      </p:bgPr>
-    </p:bg>
     <p:spTree>
       <p:nvGrpSpPr>
         <p:cNvPr id="1" name=""/>
@@ -21411,6 +22663,344 @@
         </p:nvSpPr>
         <p:spPr>
           <a:xfrm>
+            <a:off x="4492101" y="253713"/>
+            <a:ext cx="3213716" cy="536232"/>
+          </a:xfrm>
+          <a:prstGeom prst="roundRect">
+            <a:avLst/>
+          </a:prstGeom>
+          <a:solidFill>
+            <a:schemeClr val="bg1"/>
+          </a:solidFill>
+          <a:ln>
+            <a:noFill/>
+          </a:ln>
+        </p:spPr>
+        <p:style>
+          <a:lnRef idx="2">
+            <a:schemeClr val="accent1">
+              <a:shade val="15000"/>
+            </a:schemeClr>
+          </a:lnRef>
+          <a:fillRef idx="1">
+            <a:schemeClr val="accent1"/>
+          </a:fillRef>
+          <a:effectRef idx="0">
+            <a:schemeClr val="accent1"/>
+          </a:effectRef>
+          <a:fontRef idx="minor">
+            <a:schemeClr val="lt1"/>
+          </a:fontRef>
+        </p:style>
+        <p:txBody>
+          <a:bodyPr rtlCol="0" anchor="ctr"/>
+          <a:lstStyle/>
+          <a:p>
+            <a:pPr marL="0" marR="0" lvl="0" indent="0" algn="ctr" defTabSz="914400" rtl="0" eaLnBrk="1" fontAlgn="auto" latinLnBrk="0" hangingPunct="1">
+              <a:lnSpc>
+                <a:spcPct val="100000"/>
+              </a:lnSpc>
+              <a:spcBef>
+                <a:spcPts val="0"/>
+              </a:spcBef>
+              <a:spcAft>
+                <a:spcPts val="0"/>
+              </a:spcAft>
+              <a:buClrTx/>
+              <a:buSzTx/>
+              <a:buFontTx/>
+              <a:buNone/>
+              <a:tabLst/>
+              <a:defRPr/>
+            </a:pPr>
+            <a:endParaRPr kumimoji="0" lang="it-IT" sz="1800" b="0" i="0" u="none" strike="noStrike" kern="1200" cap="none" spc="0" normalizeH="0" baseline="0" noProof="0">
+              <a:ln>
+                <a:noFill/>
+              </a:ln>
+              <a:solidFill>
+                <a:prstClr val="white"/>
+              </a:solidFill>
+              <a:effectLst/>
+              <a:uLnTx/>
+              <a:uFillTx/>
+              <a:latin typeface="Calibri" panose="020F0502020204030204"/>
+              <a:ea typeface="+mn-ea"/>
+              <a:cs typeface="+mn-cs"/>
+            </a:endParaRPr>
+          </a:p>
+        </p:txBody>
+      </p:sp>
+      <p:sp>
+        <p:nvSpPr>
+          <p:cNvPr id="2" name="Title 1">
+            <a:extLst>
+              <a:ext uri="{FF2B5EF4-FFF2-40B4-BE49-F238E27FC236}">
+                <a16:creationId xmlns:a16="http://schemas.microsoft.com/office/drawing/2014/main" id="{29FD1FBB-B73F-521A-0195-23D08646B2BD}"/>
+              </a:ext>
+            </a:extLst>
+          </p:cNvPr>
+          <p:cNvSpPr>
+            <a:spLocks noGrp="1"/>
+          </p:cNvSpPr>
+          <p:nvPr>
+            <p:ph type="ctrTitle"/>
+          </p:nvPr>
+        </p:nvSpPr>
+        <p:spPr>
+          <a:xfrm>
+            <a:off x="0" y="219075"/>
+            <a:ext cx="12192000" cy="547058"/>
+          </a:xfrm>
+        </p:spPr>
+        <p:txBody>
+          <a:bodyPr>
+            <a:normAutofit fontScale="90000"/>
+          </a:bodyPr>
+          <a:lstStyle/>
+          <a:p>
+            <a:pPr hangingPunct="0">
+              <a:tabLst>
+                <a:tab pos="7496175" algn="r"/>
+              </a:tabLst>
+            </a:pPr>
+            <a:r>
+              <a:rPr lang="it-IT" sz="3600" dirty="0">
+                <a:latin typeface="Cambria Math" panose="02040503050406030204" pitchFamily="18" charset="0"/>
+                <a:ea typeface="Cambria Math" panose="02040503050406030204" pitchFamily="18" charset="0"/>
+                <a:cs typeface="Times New Roman" panose="02020603050405020304" pitchFamily="18" charset="0"/>
+              </a:rPr>
+              <a:t>Risultati ottenuti</a:t>
+            </a:r>
+          </a:p>
+        </p:txBody>
+      </p:sp>
+      <p:sp>
+        <p:nvSpPr>
+          <p:cNvPr id="3" name="Subtitle 2">
+            <a:extLst>
+              <a:ext uri="{FF2B5EF4-FFF2-40B4-BE49-F238E27FC236}">
+                <a16:creationId xmlns:a16="http://schemas.microsoft.com/office/drawing/2014/main" id="{FC446B2D-F94A-2F94-9904-6D62ADA65C8F}"/>
+              </a:ext>
+            </a:extLst>
+          </p:cNvPr>
+          <p:cNvSpPr>
+            <a:spLocks noGrp="1"/>
+          </p:cNvSpPr>
+          <p:nvPr>
+            <p:ph type="subTitle" idx="1"/>
+          </p:nvPr>
+        </p:nvSpPr>
+        <p:spPr>
+          <a:xfrm>
+            <a:off x="1159136" y="1141768"/>
+            <a:ext cx="9601200" cy="5497157"/>
+          </a:xfrm>
+        </p:spPr>
+        <p:txBody>
+          <a:bodyPr>
+            <a:normAutofit/>
+          </a:bodyPr>
+          <a:lstStyle/>
+          <a:p>
+            <a:pPr algn="l">
+              <a:lnSpc>
+                <a:spcPct val="200000"/>
+              </a:lnSpc>
+            </a:pPr>
+            <a:endParaRPr lang="it-IT" dirty="0">
+              <a:latin typeface="Times New Roman" panose="02020603050405020304" pitchFamily="18" charset="0"/>
+              <a:cs typeface="Times New Roman" panose="02020603050405020304" pitchFamily="18" charset="0"/>
+            </a:endParaRPr>
+          </a:p>
+        </p:txBody>
+      </p:sp>
+      <p:pic>
+        <p:nvPicPr>
+          <p:cNvPr id="7" name="Picture 6">
+            <a:extLst>
+              <a:ext uri="{FF2B5EF4-FFF2-40B4-BE49-F238E27FC236}">
+                <a16:creationId xmlns:a16="http://schemas.microsoft.com/office/drawing/2014/main" id="{1C9B805D-CBC1-0451-39AE-BF2E24808158}"/>
+              </a:ext>
+            </a:extLst>
+          </p:cNvPr>
+          <p:cNvPicPr>
+            <a:picLocks noChangeAspect="1"/>
+          </p:cNvPicPr>
+          <p:nvPr/>
+        </p:nvPicPr>
+        <p:blipFill>
+          <a:blip r:embed="rId3"/>
+          <a:srcRect/>
+          <a:stretch/>
+        </p:blipFill>
+        <p:spPr>
+          <a:xfrm>
+            <a:off x="620089" y="894509"/>
+            <a:ext cx="10951821" cy="5709777"/>
+          </a:xfrm>
+          <a:prstGeom prst="roundRect">
+            <a:avLst>
+              <a:gd name="adj" fmla="val 753"/>
+            </a:avLst>
+          </a:prstGeom>
+          <a:solidFill>
+            <a:srgbClr val="FFFFFF">
+              <a:shade val="85000"/>
+            </a:srgbClr>
+          </a:solidFill>
+          <a:ln>
+            <a:noFill/>
+          </a:ln>
+          <a:effectLst>
+            <a:reflection blurRad="12700" stA="0" endPos="28000" dist="5000" dir="5400000" sy="-100000" algn="bl" rotWithShape="0"/>
+          </a:effectLst>
+        </p:spPr>
+      </p:pic>
+    </p:spTree>
+    <p:extLst>
+      <p:ext uri="{BB962C8B-B14F-4D97-AF65-F5344CB8AC3E}">
+        <p14:creationId xmlns:p14="http://schemas.microsoft.com/office/powerpoint/2010/main" val="3804425154"/>
+      </p:ext>
+    </p:extLst>
+  </p:cSld>
+  <p:clrMapOvr>
+    <a:masterClrMapping/>
+  </p:clrMapOvr>
+  <mc:AlternateContent xmlns:mc="http://schemas.openxmlformats.org/markup-compatibility/2006" xmlns:p159="http://schemas.microsoft.com/office/powerpoint/2015/09/main">
+    <mc:Choice Requires="p159">
+      <p:transition xmlns:p14="http://schemas.microsoft.com/office/powerpoint/2010/main" spd="slow" p14:dur="2000">
+        <p159:morph option="byObject"/>
+      </p:transition>
+    </mc:Choice>
+    <mc:Fallback xmlns="">
+      <p:transition spd="slow">
+        <p:fade/>
+      </p:transition>
+    </mc:Fallback>
+  </mc:AlternateContent>
+</p:sld>
+</file>
+
+<file path=ppt/slides/slide26.xml><?xml version="1.0" encoding="utf-8"?>
+<p:sld xmlns:a="http://schemas.openxmlformats.org/drawingml/2006/main" xmlns:r="http://schemas.openxmlformats.org/officeDocument/2006/relationships" xmlns:p="http://schemas.openxmlformats.org/presentationml/2006/main">
+  <p:cSld>
+    <p:spTree>
+      <p:nvGrpSpPr>
+        <p:cNvPr id="1" name=""/>
+        <p:cNvGrpSpPr/>
+        <p:nvPr/>
+      </p:nvGrpSpPr>
+      <p:grpSpPr>
+        <a:xfrm>
+          <a:off x="0" y="0"/>
+          <a:ext cx="0" cy="0"/>
+          <a:chOff x="0" y="0"/>
+          <a:chExt cx="0" cy="0"/>
+        </a:xfrm>
+      </p:grpSpPr>
+      <p:sp>
+        <p:nvSpPr>
+          <p:cNvPr id="8" name="Rectangle: Rounded Corners 7">
+            <a:extLst>
+              <a:ext uri="{FF2B5EF4-FFF2-40B4-BE49-F238E27FC236}">
+                <a16:creationId xmlns:a16="http://schemas.microsoft.com/office/drawing/2014/main" id="{7BB0D57C-96FC-342D-E8C0-5E4D36FCC075}"/>
+              </a:ext>
+            </a:extLst>
+          </p:cNvPr>
+          <p:cNvSpPr/>
+          <p:nvPr/>
+        </p:nvSpPr>
+        <p:spPr>
+          <a:xfrm>
+            <a:off x="136263" y="107576"/>
+            <a:ext cx="11919473" cy="6642848"/>
+          </a:xfrm>
+          <a:prstGeom prst="roundRect">
+            <a:avLst>
+              <a:gd name="adj" fmla="val 1768"/>
+            </a:avLst>
+          </a:prstGeom>
+          <a:solidFill>
+            <a:schemeClr val="accent2">
+              <a:lumMod val="20000"/>
+              <a:lumOff val="80000"/>
+            </a:schemeClr>
+          </a:solidFill>
+          <a:ln>
+            <a:noFill/>
+          </a:ln>
+          <a:effectLst>
+            <a:softEdge rad="0"/>
+          </a:effectLst>
+        </p:spPr>
+        <p:style>
+          <a:lnRef idx="2">
+            <a:schemeClr val="accent1">
+              <a:shade val="15000"/>
+            </a:schemeClr>
+          </a:lnRef>
+          <a:fillRef idx="1">
+            <a:schemeClr val="accent1"/>
+          </a:fillRef>
+          <a:effectRef idx="0">
+            <a:schemeClr val="accent1"/>
+          </a:effectRef>
+          <a:fontRef idx="minor">
+            <a:schemeClr val="lt1"/>
+          </a:fontRef>
+        </p:style>
+        <p:txBody>
+          <a:bodyPr rtlCol="0" anchor="ctr"/>
+          <a:lstStyle/>
+          <a:p>
+            <a:pPr marL="0" marR="0" lvl="0" indent="0" algn="ctr" defTabSz="914400" rtl="0" eaLnBrk="1" fontAlgn="auto" latinLnBrk="0" hangingPunct="1">
+              <a:lnSpc>
+                <a:spcPct val="100000"/>
+              </a:lnSpc>
+              <a:spcBef>
+                <a:spcPts val="0"/>
+              </a:spcBef>
+              <a:spcAft>
+                <a:spcPts val="0"/>
+              </a:spcAft>
+              <a:buClrTx/>
+              <a:buSzTx/>
+              <a:buFontTx/>
+              <a:buNone/>
+              <a:tabLst/>
+              <a:defRPr/>
+            </a:pPr>
+            <a:endParaRPr kumimoji="0" lang="it-IT" sz="1800" b="0" i="0" u="none" strike="noStrike" kern="1200" cap="none" spc="0" normalizeH="0" baseline="0" noProof="0" dirty="0">
+              <a:ln>
+                <a:noFill/>
+              </a:ln>
+              <a:solidFill>
+                <a:prstClr val="white"/>
+              </a:solidFill>
+              <a:effectLst/>
+              <a:uLnTx/>
+              <a:uFillTx/>
+              <a:latin typeface="Calibri" panose="020F0502020204030204"/>
+              <a:ea typeface="+mn-ea"/>
+              <a:cs typeface="+mn-cs"/>
+            </a:endParaRPr>
+          </a:p>
+        </p:txBody>
+      </p:sp>
+      <p:sp>
+        <p:nvSpPr>
+          <p:cNvPr id="10" name="Rectangle: Rounded Corners 9">
+            <a:extLst>
+              <a:ext uri="{FF2B5EF4-FFF2-40B4-BE49-F238E27FC236}">
+                <a16:creationId xmlns:a16="http://schemas.microsoft.com/office/drawing/2014/main" id="{353FC021-9E12-A48E-6ABA-58B63D78E973}"/>
+              </a:ext>
+            </a:extLst>
+          </p:cNvPr>
+          <p:cNvSpPr/>
+          <p:nvPr/>
+        </p:nvSpPr>
+        <p:spPr>
+          <a:xfrm>
             <a:off x="770237" y="2553920"/>
             <a:ext cx="10651524" cy="1750160"/>
           </a:xfrm>
@@ -21505,27 +23095,6 @@
 <file path=ppt/slides/slide3.xml><?xml version="1.0" encoding="utf-8"?>
 <p:sld xmlns:a="http://schemas.openxmlformats.org/drawingml/2006/main" xmlns:r="http://schemas.openxmlformats.org/officeDocument/2006/relationships" xmlns:p="http://schemas.openxmlformats.org/presentationml/2006/main">
   <p:cSld>
-    <p:bg>
-      <p:bgPr>
-        <a:gradFill>
-          <a:gsLst>
-            <a:gs pos="0">
-              <a:schemeClr val="accent6">
-                <a:lumMod val="40000"/>
-                <a:lumOff val="60000"/>
-              </a:schemeClr>
-            </a:gs>
-            <a:gs pos="100000">
-              <a:schemeClr val="accent6">
-                <a:lumMod val="75000"/>
-              </a:schemeClr>
-            </a:gs>
-          </a:gsLst>
-          <a:lin ang="8100000" scaled="1"/>
-        </a:gradFill>
-        <a:effectLst/>
-      </p:bgPr>
-    </p:bg>
     <p:spTree>
       <p:nvGrpSpPr>
         <p:cNvPr id="1" name=""/>
@@ -21968,16 +23537,6 @@
               <a:t>con mezzo comunicativo </a:t>
             </a:r>
             <a:r>
-              <a:rPr lang="it-IT" b="1" dirty="0" err="1">
-                <a:solidFill>
-                  <a:schemeClr val="tx1"/>
-                </a:solidFill>
-                <a:latin typeface="Times New Roman" panose="02020603050405020304" pitchFamily="18" charset="0"/>
-                <a:cs typeface="Times New Roman" panose="02020603050405020304" pitchFamily="18" charset="0"/>
-              </a:rPr>
-              <a:t>half</a:t>
-            </a:r>
-            <a:r>
               <a:rPr lang="it-IT" b="1" dirty="0">
                 <a:solidFill>
                   <a:schemeClr val="tx1"/>
@@ -21985,7 +23544,7 @@
                 <a:latin typeface="Times New Roman" panose="02020603050405020304" pitchFamily="18" charset="0"/>
                 <a:cs typeface="Times New Roman" panose="02020603050405020304" pitchFamily="18" charset="0"/>
               </a:rPr>
-              <a:t>-duplex</a:t>
+              <a:t>half-duplex</a:t>
             </a:r>
           </a:p>
         </p:txBody>
@@ -22394,27 +23953,6 @@
 <file path=ppt/slides/slide4.xml><?xml version="1.0" encoding="utf-8"?>
 <p:sld xmlns:a="http://schemas.openxmlformats.org/drawingml/2006/main" xmlns:r="http://schemas.openxmlformats.org/officeDocument/2006/relationships" xmlns:p="http://schemas.openxmlformats.org/presentationml/2006/main">
   <p:cSld>
-    <p:bg>
-      <p:bgPr>
-        <a:gradFill>
-          <a:gsLst>
-            <a:gs pos="0">
-              <a:schemeClr val="accent6">
-                <a:lumMod val="40000"/>
-                <a:lumOff val="60000"/>
-              </a:schemeClr>
-            </a:gs>
-            <a:gs pos="100000">
-              <a:schemeClr val="accent6">
-                <a:lumMod val="75000"/>
-              </a:schemeClr>
-            </a:gs>
-          </a:gsLst>
-          <a:lin ang="8100000" scaled="1"/>
-        </a:gradFill>
-        <a:effectLst/>
-      </p:bgPr>
-    </p:bg>
     <p:spTree>
       <p:nvGrpSpPr>
         <p:cNvPr id="1" name=""/>
@@ -23581,27 +25119,6 @@
 <file path=ppt/slides/slide5.xml><?xml version="1.0" encoding="utf-8"?>
 <p:sld xmlns:a="http://schemas.openxmlformats.org/drawingml/2006/main" xmlns:r="http://schemas.openxmlformats.org/officeDocument/2006/relationships" xmlns:p="http://schemas.openxmlformats.org/presentationml/2006/main">
   <p:cSld>
-    <p:bg>
-      <p:bgPr>
-        <a:gradFill>
-          <a:gsLst>
-            <a:gs pos="0">
-              <a:schemeClr val="accent6">
-                <a:lumMod val="40000"/>
-                <a:lumOff val="60000"/>
-              </a:schemeClr>
-            </a:gs>
-            <a:gs pos="100000">
-              <a:schemeClr val="accent6">
-                <a:lumMod val="75000"/>
-              </a:schemeClr>
-            </a:gs>
-          </a:gsLst>
-          <a:lin ang="8100000" scaled="1"/>
-        </a:gradFill>
-        <a:effectLst/>
-      </p:bgPr>
-    </p:bg>
     <p:spTree>
       <p:nvGrpSpPr>
         <p:cNvPr id="1" name=""/>
@@ -25198,27 +26715,6 @@
 <file path=ppt/slides/slide6.xml><?xml version="1.0" encoding="utf-8"?>
 <p:sld xmlns:a="http://schemas.openxmlformats.org/drawingml/2006/main" xmlns:r="http://schemas.openxmlformats.org/officeDocument/2006/relationships" xmlns:p="http://schemas.openxmlformats.org/presentationml/2006/main">
   <p:cSld>
-    <p:bg>
-      <p:bgPr>
-        <a:gradFill>
-          <a:gsLst>
-            <a:gs pos="0">
-              <a:schemeClr val="accent6">
-                <a:lumMod val="40000"/>
-                <a:lumOff val="60000"/>
-              </a:schemeClr>
-            </a:gs>
-            <a:gs pos="100000">
-              <a:schemeClr val="accent6">
-                <a:lumMod val="75000"/>
-              </a:schemeClr>
-            </a:gs>
-          </a:gsLst>
-          <a:lin ang="8100000" scaled="1"/>
-        </a:gradFill>
-        <a:effectLst/>
-      </p:bgPr>
-    </p:bg>
     <p:spTree>
       <p:nvGrpSpPr>
         <p:cNvPr id="1" name=""/>
@@ -26294,27 +27790,6 @@
 <file path=ppt/slides/slide7.xml><?xml version="1.0" encoding="utf-8"?>
 <p:sld xmlns:a="http://schemas.openxmlformats.org/drawingml/2006/main" xmlns:r="http://schemas.openxmlformats.org/officeDocument/2006/relationships" xmlns:p="http://schemas.openxmlformats.org/presentationml/2006/main">
   <p:cSld>
-    <p:bg>
-      <p:bgPr>
-        <a:gradFill>
-          <a:gsLst>
-            <a:gs pos="0">
-              <a:schemeClr val="accent6">
-                <a:lumMod val="40000"/>
-                <a:lumOff val="60000"/>
-              </a:schemeClr>
-            </a:gs>
-            <a:gs pos="100000">
-              <a:schemeClr val="accent6">
-                <a:lumMod val="75000"/>
-              </a:schemeClr>
-            </a:gs>
-          </a:gsLst>
-          <a:lin ang="8100000" scaled="1"/>
-        </a:gradFill>
-        <a:effectLst/>
-      </p:bgPr>
-    </p:bg>
     <p:spTree>
       <p:nvGrpSpPr>
         <p:cNvPr id="1" name=""/>
@@ -26620,7 +28095,7 @@
                 <a:latin typeface="Times New Roman" panose="02020603050405020304" pitchFamily="18" charset="0"/>
                 <a:cs typeface="Times New Roman" panose="02020603050405020304" pitchFamily="18" charset="0"/>
               </a:rPr>
-              <a:t>Ad alta priorità </a:t>
+              <a:t>Periodici ad alta priorità </a:t>
             </a:r>
             <a:r>
               <a:rPr lang="it-IT" sz="2800" dirty="0">
@@ -26667,7 +28142,7 @@
                 <a:latin typeface="Times New Roman" panose="02020603050405020304" pitchFamily="18" charset="0"/>
                 <a:cs typeface="Times New Roman" panose="02020603050405020304" pitchFamily="18" charset="0"/>
               </a:rPr>
-              <a:t>A priorità normale </a:t>
+              <a:t>Periodici a priorità normale </a:t>
             </a:r>
             <a:r>
               <a:rPr lang="it-IT" sz="2800" dirty="0">
@@ -27417,14 +28892,21 @@
               <a:defRPr/>
             </a:pPr>
             <a:r>
-              <a:rPr lang="it-IT" sz="2800" dirty="0">
+              <a:rPr kumimoji="0" lang="it-IT" sz="2800" b="0" i="0" u="none" strike="noStrike" kern="1200" cap="none" spc="0" normalizeH="0" baseline="0" noProof="0" dirty="0">
+                <a:ln>
+                  <a:noFill/>
+                </a:ln>
                 <a:solidFill>
                   <a:srgbClr val="7FB265"/>
                 </a:solidFill>
+                <a:effectLst/>
+                <a:uLnTx/>
+                <a:uFillTx/>
                 <a:latin typeface="Times New Roman" panose="02020603050405020304" pitchFamily="18" charset="0"/>
+                <a:ea typeface="+mn-ea"/>
                 <a:cs typeface="Times New Roman" panose="02020603050405020304" pitchFamily="18" charset="0"/>
               </a:rPr>
-              <a:t>Ad alta priorità </a:t>
+              <a:t>Periodici ad alta priorità </a:t>
             </a:r>
             <a:r>
               <a:rPr lang="it-IT" sz="2800" dirty="0">
@@ -27464,14 +28946,21 @@
               <a:defRPr/>
             </a:pPr>
             <a:r>
-              <a:rPr lang="it-IT" sz="2800" dirty="0">
+              <a:rPr kumimoji="0" lang="it-IT" sz="2800" b="0" i="0" u="none" strike="noStrike" kern="1200" cap="none" spc="0" normalizeH="0" baseline="0" noProof="0" dirty="0">
+                <a:ln>
+                  <a:noFill/>
+                </a:ln>
                 <a:solidFill>
                   <a:srgbClr val="B64F4B"/>
                 </a:solidFill>
+                <a:effectLst/>
+                <a:uLnTx/>
+                <a:uFillTx/>
                 <a:latin typeface="Times New Roman" panose="02020603050405020304" pitchFamily="18" charset="0"/>
+                <a:ea typeface="+mn-ea"/>
                 <a:cs typeface="Times New Roman" panose="02020603050405020304" pitchFamily="18" charset="0"/>
               </a:rPr>
-              <a:t>A priorità normale </a:t>
+              <a:t>Periodici a priorità normale </a:t>
             </a:r>
             <a:r>
               <a:rPr lang="it-IT" sz="2800" dirty="0">
@@ -27946,7 +29435,7 @@
                 <a:ea typeface="+mn-ea"/>
                 <a:cs typeface="Times New Roman" panose="02020603050405020304" pitchFamily="18" charset="0"/>
               </a:rPr>
-              <a:t>Ad alta priorità </a:t>
+              <a:t>Periodici ad alta priorità </a:t>
             </a:r>
             <a:r>
               <a:rPr kumimoji="0" lang="it-IT" sz="2800" b="0" i="0" u="none" strike="noStrike" kern="1200" cap="none" spc="0" normalizeH="0" baseline="0" noProof="0" dirty="0">
@@ -28033,7 +29522,7 @@
                 <a:ea typeface="+mn-ea"/>
                 <a:cs typeface="Times New Roman" panose="02020603050405020304" pitchFamily="18" charset="0"/>
               </a:rPr>
-              <a:t>A priorità normale </a:t>
+              <a:t>Periodici a priorità normale </a:t>
             </a:r>
             <a:r>
               <a:rPr kumimoji="0" lang="it-IT" sz="2800" b="0" i="0" u="none" strike="noStrike" kern="1200" cap="none" spc="0" normalizeH="0" baseline="0" noProof="0" dirty="0">
@@ -29381,4 +30870,290 @@
     </a:bgFillStyleLst>
   </a:fmtScheme>
 </a:themeOverride>
+</file>
+
+<file path=ppt/theme/themeOverride3.xml><?xml version="1.0" encoding="utf-8"?>
+<a:themeOverride xmlns:a="http://schemas.openxmlformats.org/drawingml/2006/main">
+  <a:clrScheme name="Office">
+    <a:dk1>
+      <a:sysClr val="windowText" lastClr="000000"/>
+    </a:dk1>
+    <a:lt1>
+      <a:sysClr val="window" lastClr="FFFFFF"/>
+    </a:lt1>
+    <a:dk2>
+      <a:srgbClr val="44546A"/>
+    </a:dk2>
+    <a:lt2>
+      <a:srgbClr val="E7E6E6"/>
+    </a:lt2>
+    <a:accent1>
+      <a:srgbClr val="4472C4"/>
+    </a:accent1>
+    <a:accent2>
+      <a:srgbClr val="ED7D31"/>
+    </a:accent2>
+    <a:accent3>
+      <a:srgbClr val="A5A5A5"/>
+    </a:accent3>
+    <a:accent4>
+      <a:srgbClr val="FFC000"/>
+    </a:accent4>
+    <a:accent5>
+      <a:srgbClr val="5B9BD5"/>
+    </a:accent5>
+    <a:accent6>
+      <a:srgbClr val="70AD47"/>
+    </a:accent6>
+    <a:hlink>
+      <a:srgbClr val="0563C1"/>
+    </a:hlink>
+    <a:folHlink>
+      <a:srgbClr val="954F72"/>
+    </a:folHlink>
+  </a:clrScheme>
+  <a:fontScheme name="Office">
+    <a:majorFont>
+      <a:latin typeface="Calibri Light" panose="020F0302020204030204"/>
+      <a:ea typeface=""/>
+      <a:cs typeface=""/>
+      <a:font script="Jpan" typeface="游ゴシック Light"/>
+      <a:font script="Hang" typeface="맑은 고딕"/>
+      <a:font script="Hans" typeface="等线 Light"/>
+      <a:font script="Hant" typeface="新細明體"/>
+      <a:font script="Arab" typeface="Times New Roman"/>
+      <a:font script="Hebr" typeface="Times New Roman"/>
+      <a:font script="Thai" typeface="Angsana New"/>
+      <a:font script="Ethi" typeface="Nyala"/>
+      <a:font script="Beng" typeface="Vrinda"/>
+      <a:font script="Gujr" typeface="Shruti"/>
+      <a:font script="Khmr" typeface="MoolBoran"/>
+      <a:font script="Knda" typeface="Tunga"/>
+      <a:font script="Guru" typeface="Raavi"/>
+      <a:font script="Cans" typeface="Euphemia"/>
+      <a:font script="Cher" typeface="Plantagenet Cherokee"/>
+      <a:font script="Yiii" typeface="Microsoft Yi Baiti"/>
+      <a:font script="Tibt" typeface="Microsoft Himalaya"/>
+      <a:font script="Thaa" typeface="MV Boli"/>
+      <a:font script="Deva" typeface="Mangal"/>
+      <a:font script="Telu" typeface="Gautami"/>
+      <a:font script="Taml" typeface="Latha"/>
+      <a:font script="Syrc" typeface="Estrangelo Edessa"/>
+      <a:font script="Orya" typeface="Kalinga"/>
+      <a:font script="Mlym" typeface="Kartika"/>
+      <a:font script="Laoo" typeface="DokChampa"/>
+      <a:font script="Sinh" typeface="Iskoola Pota"/>
+      <a:font script="Mong" typeface="Mongolian Baiti"/>
+      <a:font script="Viet" typeface="Times New Roman"/>
+      <a:font script="Uigh" typeface="Microsoft Uighur"/>
+      <a:font script="Geor" typeface="Sylfaen"/>
+      <a:font script="Armn" typeface="Arial"/>
+      <a:font script="Bugi" typeface="Leelawadee UI"/>
+      <a:font script="Bopo" typeface="Microsoft JhengHei"/>
+      <a:font script="Java" typeface="Javanese Text"/>
+      <a:font script="Lisu" typeface="Segoe UI"/>
+      <a:font script="Mymr" typeface="Myanmar Text"/>
+      <a:font script="Nkoo" typeface="Ebrima"/>
+      <a:font script="Olck" typeface="Nirmala UI"/>
+      <a:font script="Osma" typeface="Ebrima"/>
+      <a:font script="Phag" typeface="Phagspa"/>
+      <a:font script="Syrn" typeface="Estrangelo Edessa"/>
+      <a:font script="Syrj" typeface="Estrangelo Edessa"/>
+      <a:font script="Syre" typeface="Estrangelo Edessa"/>
+      <a:font script="Sora" typeface="Nirmala UI"/>
+      <a:font script="Tale" typeface="Microsoft Tai Le"/>
+      <a:font script="Talu" typeface="Microsoft New Tai Lue"/>
+      <a:font script="Tfng" typeface="Ebrima"/>
+    </a:majorFont>
+    <a:minorFont>
+      <a:latin typeface="Calibri" panose="020F0502020204030204"/>
+      <a:ea typeface=""/>
+      <a:cs typeface=""/>
+      <a:font script="Jpan" typeface="游明朝"/>
+      <a:font script="Hang" typeface="맑은 고딕"/>
+      <a:font script="Hans" typeface="等线"/>
+      <a:font script="Hant" typeface="新細明體"/>
+      <a:font script="Arab" typeface="Arial"/>
+      <a:font script="Hebr" typeface="Arial"/>
+      <a:font script="Thai" typeface="Cordia New"/>
+      <a:font script="Ethi" typeface="Nyala"/>
+      <a:font script="Beng" typeface="Vrinda"/>
+      <a:font script="Gujr" typeface="Shruti"/>
+      <a:font script="Khmr" typeface="DaunPenh"/>
+      <a:font script="Knda" typeface="Tunga"/>
+      <a:font script="Guru" typeface="Raavi"/>
+      <a:font script="Cans" typeface="Euphemia"/>
+      <a:font script="Cher" typeface="Plantagenet Cherokee"/>
+      <a:font script="Yiii" typeface="Microsoft Yi Baiti"/>
+      <a:font script="Tibt" typeface="Microsoft Himalaya"/>
+      <a:font script="Thaa" typeface="MV Boli"/>
+      <a:font script="Deva" typeface="Mangal"/>
+      <a:font script="Telu" typeface="Gautami"/>
+      <a:font script="Taml" typeface="Latha"/>
+      <a:font script="Syrc" typeface="Estrangelo Edessa"/>
+      <a:font script="Orya" typeface="Kalinga"/>
+      <a:font script="Mlym" typeface="Kartika"/>
+      <a:font script="Laoo" typeface="DokChampa"/>
+      <a:font script="Sinh" typeface="Iskoola Pota"/>
+      <a:font script="Mong" typeface="Mongolian Baiti"/>
+      <a:font script="Viet" typeface="Arial"/>
+      <a:font script="Uigh" typeface="Microsoft Uighur"/>
+      <a:font script="Geor" typeface="Sylfaen"/>
+      <a:font script="Armn" typeface="Arial"/>
+      <a:font script="Bugi" typeface="Leelawadee UI"/>
+      <a:font script="Bopo" typeface="Microsoft JhengHei"/>
+      <a:font script="Java" typeface="Javanese Text"/>
+      <a:font script="Lisu" typeface="Segoe UI"/>
+      <a:font script="Mymr" typeface="Myanmar Text"/>
+      <a:font script="Nkoo" typeface="Ebrima"/>
+      <a:font script="Olck" typeface="Nirmala UI"/>
+      <a:font script="Osma" typeface="Ebrima"/>
+      <a:font script="Phag" typeface="Phagspa"/>
+      <a:font script="Syrn" typeface="Estrangelo Edessa"/>
+      <a:font script="Syrj" typeface="Estrangelo Edessa"/>
+      <a:font script="Syre" typeface="Estrangelo Edessa"/>
+      <a:font script="Sora" typeface="Nirmala UI"/>
+      <a:font script="Tale" typeface="Microsoft Tai Le"/>
+      <a:font script="Talu" typeface="Microsoft New Tai Lue"/>
+      <a:font script="Tfng" typeface="Ebrima"/>
+    </a:minorFont>
+  </a:fontScheme>
+  <a:fmtScheme name="Office">
+    <a:fillStyleLst>
+      <a:solidFill>
+        <a:schemeClr val="phClr"/>
+      </a:solidFill>
+      <a:gradFill rotWithShape="1">
+        <a:gsLst>
+          <a:gs pos="0">
+            <a:schemeClr val="phClr">
+              <a:lumMod val="110000"/>
+              <a:satMod val="105000"/>
+              <a:tint val="67000"/>
+            </a:schemeClr>
+          </a:gs>
+          <a:gs pos="50000">
+            <a:schemeClr val="phClr">
+              <a:lumMod val="105000"/>
+              <a:satMod val="103000"/>
+              <a:tint val="73000"/>
+            </a:schemeClr>
+          </a:gs>
+          <a:gs pos="100000">
+            <a:schemeClr val="phClr">
+              <a:lumMod val="105000"/>
+              <a:satMod val="109000"/>
+              <a:tint val="81000"/>
+            </a:schemeClr>
+          </a:gs>
+        </a:gsLst>
+        <a:lin ang="5400000" scaled="0"/>
+      </a:gradFill>
+      <a:gradFill rotWithShape="1">
+        <a:gsLst>
+          <a:gs pos="0">
+            <a:schemeClr val="phClr">
+              <a:satMod val="103000"/>
+              <a:lumMod val="102000"/>
+              <a:tint val="94000"/>
+            </a:schemeClr>
+          </a:gs>
+          <a:gs pos="50000">
+            <a:schemeClr val="phClr">
+              <a:satMod val="110000"/>
+              <a:lumMod val="100000"/>
+              <a:shade val="100000"/>
+            </a:schemeClr>
+          </a:gs>
+          <a:gs pos="100000">
+            <a:schemeClr val="phClr">
+              <a:lumMod val="99000"/>
+              <a:satMod val="120000"/>
+              <a:shade val="78000"/>
+            </a:schemeClr>
+          </a:gs>
+        </a:gsLst>
+        <a:lin ang="5400000" scaled="0"/>
+      </a:gradFill>
+    </a:fillStyleLst>
+    <a:lnStyleLst>
+      <a:ln w="6350" cap="flat" cmpd="sng" algn="ctr">
+        <a:solidFill>
+          <a:schemeClr val="phClr"/>
+        </a:solidFill>
+        <a:prstDash val="solid"/>
+        <a:miter lim="800000"/>
+      </a:ln>
+      <a:ln w="12700" cap="flat" cmpd="sng" algn="ctr">
+        <a:solidFill>
+          <a:schemeClr val="phClr"/>
+        </a:solidFill>
+        <a:prstDash val="solid"/>
+        <a:miter lim="800000"/>
+      </a:ln>
+      <a:ln w="19050" cap="flat" cmpd="sng" algn="ctr">
+        <a:solidFill>
+          <a:schemeClr val="phClr"/>
+        </a:solidFill>
+        <a:prstDash val="solid"/>
+        <a:miter lim="800000"/>
+      </a:ln>
+    </a:lnStyleLst>
+    <a:effectStyleLst>
+      <a:effectStyle>
+        <a:effectLst/>
+      </a:effectStyle>
+      <a:effectStyle>
+        <a:effectLst/>
+      </a:effectStyle>
+      <a:effectStyle>
+        <a:effectLst>
+          <a:outerShdw blurRad="57150" dist="19050" dir="5400000" algn="ctr" rotWithShape="0">
+            <a:srgbClr val="000000">
+              <a:alpha val="63000"/>
+            </a:srgbClr>
+          </a:outerShdw>
+        </a:effectLst>
+      </a:effectStyle>
+    </a:effectStyleLst>
+    <a:bgFillStyleLst>
+      <a:solidFill>
+        <a:schemeClr val="phClr"/>
+      </a:solidFill>
+      <a:solidFill>
+        <a:schemeClr val="phClr">
+          <a:tint val="95000"/>
+          <a:satMod val="170000"/>
+        </a:schemeClr>
+      </a:solidFill>
+      <a:gradFill rotWithShape="1">
+        <a:gsLst>
+          <a:gs pos="0">
+            <a:schemeClr val="phClr">
+              <a:tint val="93000"/>
+              <a:satMod val="150000"/>
+              <a:shade val="98000"/>
+              <a:lumMod val="102000"/>
+            </a:schemeClr>
+          </a:gs>
+          <a:gs pos="50000">
+            <a:schemeClr val="phClr">
+              <a:tint val="98000"/>
+              <a:satMod val="130000"/>
+              <a:shade val="90000"/>
+              <a:lumMod val="103000"/>
+            </a:schemeClr>
+          </a:gs>
+          <a:gs pos="100000">
+            <a:schemeClr val="phClr">
+              <a:shade val="63000"/>
+              <a:satMod val="120000"/>
+            </a:schemeClr>
+          </a:gs>
+        </a:gsLst>
+        <a:lin ang="5400000" scaled="0"/>
+      </a:gradFill>
+    </a:bgFillStyleLst>
+  </a:fmtScheme>
+</a:themeOverride>
 </file>
</xml_diff>

<commit_message>
first draft completed presentation
</commit_message>
<xml_diff>
--- a/Presentazione_Tesi_Triennale_Informatica_Unimore_2022_2023_Enrico_Marras_152336.pptx
+++ b/Presentazione_Tesi_Triennale_Informatica_Unimore_2022_2023_Enrico_Marras_152336.pptx
@@ -16577,13 +16577,13 @@
           <p:nvPr>
             <p:extLst>
               <p:ext uri="{D42A27DB-BD31-4B8C-83A1-F6EECF244321}">
-                <p14:modId xmlns:p14="http://schemas.microsoft.com/office/powerpoint/2010/main" val="3131436737"/>
+                <p14:modId xmlns:p14="http://schemas.microsoft.com/office/powerpoint/2010/main" val="407762285"/>
               </p:ext>
             </p:extLst>
           </p:nvPr>
         </p:nvGraphicFramePr>
         <p:xfrm>
-          <a:off x="982065" y="2436775"/>
+          <a:off x="970225" y="1715241"/>
           <a:ext cx="10251546" cy="4141806"/>
         </p:xfrm>
         <a:graphic>
@@ -16606,7 +16606,7 @@
         </p:nvSpPr>
         <p:spPr>
           <a:xfrm>
-            <a:off x="970226" y="1025238"/>
+            <a:off x="970225" y="1025238"/>
             <a:ext cx="10251545" cy="536232"/>
           </a:xfrm>
           <a:prstGeom prst="roundRect">
@@ -16672,7 +16672,39 @@
                 <a:latin typeface="Times New Roman" panose="02020603050405020304" pitchFamily="18" charset="0"/>
                 <a:cs typeface="Times New Roman" panose="02020603050405020304" pitchFamily="18" charset="0"/>
               </a:rPr>
-              <a:t>Per vincoli architetturali, non è possibile interrogare più di 40 registri per comunicazione</a:t>
+              <a:t>Per vincoli architetturali, non è possibile interrogare più di </a:t>
+            </a:r>
+            <a:r>
+              <a:rPr kumimoji="0" lang="it-IT" sz="2200" b="1" i="0" u="none" strike="noStrike" kern="1200" cap="none" spc="0" normalizeH="0" baseline="0" noProof="0" dirty="0">
+                <a:ln>
+                  <a:noFill/>
+                </a:ln>
+                <a:solidFill>
+                  <a:schemeClr val="tx1"/>
+                </a:solidFill>
+                <a:effectLst/>
+                <a:uLnTx/>
+                <a:uFillTx/>
+                <a:latin typeface="Times New Roman" panose="02020603050405020304" pitchFamily="18" charset="0"/>
+                <a:cs typeface="Times New Roman" panose="02020603050405020304" pitchFamily="18" charset="0"/>
+              </a:rPr>
+              <a:t>40 registri </a:t>
+            </a:r>
+            <a:r>
+              <a:rPr kumimoji="0" lang="it-IT" sz="2200" b="0" i="0" u="none" strike="noStrike" kern="1200" cap="none" spc="0" normalizeH="0" baseline="0" noProof="0" dirty="0">
+                <a:ln>
+                  <a:noFill/>
+                </a:ln>
+                <a:solidFill>
+                  <a:schemeClr val="tx1"/>
+                </a:solidFill>
+                <a:effectLst/>
+                <a:uLnTx/>
+                <a:uFillTx/>
+                <a:latin typeface="Times New Roman" panose="02020603050405020304" pitchFamily="18" charset="0"/>
+                <a:cs typeface="Times New Roman" panose="02020603050405020304" pitchFamily="18" charset="0"/>
+              </a:rPr>
+              <a:t>per comunicazione</a:t>
             </a:r>
           </a:p>
         </p:txBody>
@@ -16691,7 +16723,7 @@
         </p:nvSpPr>
         <p:spPr>
           <a:xfrm>
-            <a:off x="982065" y="1819628"/>
+            <a:off x="982064" y="6010818"/>
             <a:ext cx="10251545" cy="536232"/>
           </a:xfrm>
           <a:prstGeom prst="roundRect">
@@ -16859,6 +16891,59 @@
                                           </p:stCondLst>
                                         </p:cTn>
                                         <p:tgtEl>
+                                          <p:spTgt spid="4"/>
+                                        </p:tgtEl>
+                                        <p:attrNameLst>
+                                          <p:attrName>style.visibility</p:attrName>
+                                        </p:attrNameLst>
+                                      </p:cBhvr>
+                                      <p:to>
+                                        <p:strVal val="visible"/>
+                                      </p:to>
+                                    </p:set>
+                                    <p:animEffect transition="in" filter="fade">
+                                      <p:cBhvr>
+                                        <p:cTn id="12" dur="500"/>
+                                        <p:tgtEl>
+                                          <p:spTgt spid="4"/>
+                                        </p:tgtEl>
+                                      </p:cBhvr>
+                                    </p:animEffect>
+                                  </p:childTnLst>
+                                </p:cTn>
+                              </p:par>
+                            </p:childTnLst>
+                          </p:cTn>
+                        </p:par>
+                      </p:childTnLst>
+                    </p:cTn>
+                  </p:par>
+                  <p:par>
+                    <p:cTn id="13" fill="hold">
+                      <p:stCondLst>
+                        <p:cond delay="indefinite"/>
+                      </p:stCondLst>
+                      <p:childTnLst>
+                        <p:par>
+                          <p:cTn id="14" fill="hold">
+                            <p:stCondLst>
+                              <p:cond delay="0"/>
+                            </p:stCondLst>
+                            <p:childTnLst>
+                              <p:par>
+                                <p:cTn id="15" presetID="10" presetClass="entr" presetSubtype="0" fill="hold" grpId="0" nodeType="clickEffect">
+                                  <p:stCondLst>
+                                    <p:cond delay="0"/>
+                                  </p:stCondLst>
+                                  <p:childTnLst>
+                                    <p:set>
+                                      <p:cBhvr>
+                                        <p:cTn id="16" dur="1" fill="hold">
+                                          <p:stCondLst>
+                                            <p:cond delay="0"/>
+                                          </p:stCondLst>
+                                        </p:cTn>
+                                        <p:tgtEl>
                                           <p:spTgt spid="6"/>
                                         </p:tgtEl>
                                         <p:attrNameLst>
@@ -16871,53 +16956,9 @@
                                     </p:set>
                                     <p:animEffect transition="in" filter="fade">
                                       <p:cBhvr>
-                                        <p:cTn id="12" dur="300"/>
+                                        <p:cTn id="17" dur="500"/>
                                         <p:tgtEl>
                                           <p:spTgt spid="6"/>
-                                        </p:tgtEl>
-                                      </p:cBhvr>
-                                    </p:animEffect>
-                                  </p:childTnLst>
-                                </p:cTn>
-                              </p:par>
-                            </p:childTnLst>
-                          </p:cTn>
-                        </p:par>
-                        <p:par>
-                          <p:cTn id="13" fill="hold">
-                            <p:stCondLst>
-                              <p:cond delay="300"/>
-                            </p:stCondLst>
-                            <p:childTnLst>
-                              <p:par>
-                                <p:cTn id="14" presetID="10" presetClass="entr" presetSubtype="0" fill="hold" grpId="0" nodeType="afterEffect">
-                                  <p:stCondLst>
-                                    <p:cond delay="0"/>
-                                  </p:stCondLst>
-                                  <p:childTnLst>
-                                    <p:set>
-                                      <p:cBhvr>
-                                        <p:cTn id="15" dur="1" fill="hold">
-                                          <p:stCondLst>
-                                            <p:cond delay="0"/>
-                                          </p:stCondLst>
-                                        </p:cTn>
-                                        <p:tgtEl>
-                                          <p:spTgt spid="4"/>
-                                        </p:tgtEl>
-                                        <p:attrNameLst>
-                                          <p:attrName>style.visibility</p:attrName>
-                                        </p:attrNameLst>
-                                      </p:cBhvr>
-                                      <p:to>
-                                        <p:strVal val="visible"/>
-                                      </p:to>
-                                    </p:set>
-                                    <p:animEffect transition="in" filter="fade">
-                                      <p:cBhvr>
-                                        <p:cTn id="16" dur="300"/>
-                                        <p:tgtEl>
-                                          <p:spTgt spid="4"/>
                                         </p:tgtEl>
                                       </p:cBhvr>
                                     </p:animEffect>
@@ -17149,6 +17190,50 @@
           </a:p>
         </p:txBody>
       </p:sp>
+      <p:cxnSp>
+        <p:nvCxnSpPr>
+          <p:cNvPr id="28" name="Straight Arrow Connector 27">
+            <a:extLst>
+              <a:ext uri="{FF2B5EF4-FFF2-40B4-BE49-F238E27FC236}">
+                <a16:creationId xmlns:a16="http://schemas.microsoft.com/office/drawing/2014/main" id="{85D522AE-65DD-6954-E378-37F06E87BD27}"/>
+              </a:ext>
+            </a:extLst>
+          </p:cNvPr>
+          <p:cNvCxnSpPr>
+            <a:cxnSpLocks/>
+          </p:cNvCxnSpPr>
+          <p:nvPr/>
+        </p:nvCxnSpPr>
+        <p:spPr>
+          <a:xfrm>
+            <a:off x="4474476" y="1921770"/>
+            <a:ext cx="1621524" cy="0"/>
+          </a:xfrm>
+          <a:prstGeom prst="straightConnector1">
+            <a:avLst/>
+          </a:prstGeom>
+          <a:ln w="123825">
+            <a:solidFill>
+              <a:srgbClr val="56517E"/>
+            </a:solidFill>
+            <a:tailEnd type="triangle"/>
+          </a:ln>
+        </p:spPr>
+        <p:style>
+          <a:lnRef idx="1">
+            <a:schemeClr val="accent1"/>
+          </a:lnRef>
+          <a:fillRef idx="0">
+            <a:schemeClr val="accent1"/>
+          </a:fillRef>
+          <a:effectRef idx="0">
+            <a:schemeClr val="accent1"/>
+          </a:effectRef>
+          <a:fontRef idx="minor">
+            <a:schemeClr val="tx1"/>
+          </a:fontRef>
+        </p:style>
+      </p:cxnSp>
       <p:sp>
         <p:nvSpPr>
           <p:cNvPr id="2" name="Title 1">
@@ -17207,8 +17292,8 @@
         </p:nvSpPr>
         <p:spPr>
           <a:xfrm>
-            <a:off x="932786" y="1234788"/>
-            <a:ext cx="10326425" cy="1184562"/>
+            <a:off x="803358" y="1648241"/>
+            <a:ext cx="3739698" cy="547058"/>
           </a:xfrm>
           <a:prstGeom prst="roundRect">
             <a:avLst/>
@@ -17273,24 +17358,710 @@
                 <a:latin typeface="Times New Roman" panose="02020603050405020304" pitchFamily="18" charset="0"/>
                 <a:cs typeface="Times New Roman" panose="02020603050405020304" pitchFamily="18" charset="0"/>
               </a:rPr>
-              <a:t>Se il </a:t>
+              <a:t>Se uno </a:t>
             </a:r>
             <a:r>
-              <a:rPr kumimoji="0" lang="it-IT" sz="2200" b="1" i="0" u="none" strike="noStrike" kern="1200" cap="none" spc="0" normalizeH="0" baseline="0" noProof="0" dirty="0" err="1">
-                <a:ln>
-                  <a:noFill/>
-                </a:ln>
+              <a:rPr lang="it-IT" sz="2200" dirty="0">
                 <a:solidFill>
                   <a:schemeClr val="tx1"/>
                 </a:solidFill>
-                <a:effectLst/>
-                <a:uLnTx/>
-                <a:uFillTx/>
+                <a:latin typeface="Times New Roman" panose="02020603050405020304" pitchFamily="18" charset="0"/>
+                <a:cs typeface="Times New Roman" panose="02020603050405020304" pitchFamily="18" charset="0"/>
+              </a:rPr>
+              <a:t>slave causa un </a:t>
+            </a:r>
+            <a:r>
+              <a:rPr lang="it-IT" sz="2200" b="1" dirty="0" err="1">
+                <a:solidFill>
+                  <a:schemeClr val="tx1"/>
+                </a:solidFill>
                 <a:latin typeface="Times New Roman" panose="02020603050405020304" pitchFamily="18" charset="0"/>
                 <a:cs typeface="Times New Roman" panose="02020603050405020304" pitchFamily="18" charset="0"/>
               </a:rPr>
               <a:t>timeout</a:t>
             </a:r>
+            <a:endParaRPr kumimoji="0" lang="it-IT" sz="2200" b="0" i="0" u="none" strike="noStrike" kern="1200" cap="none" spc="0" normalizeH="0" baseline="0" noProof="0" dirty="0">
+              <a:ln>
+                <a:noFill/>
+              </a:ln>
+              <a:solidFill>
+                <a:schemeClr val="tx1"/>
+              </a:solidFill>
+              <a:effectLst/>
+              <a:uLnTx/>
+              <a:uFillTx/>
+              <a:latin typeface="Times New Roman" panose="02020603050405020304" pitchFamily="18" charset="0"/>
+              <a:cs typeface="Times New Roman" panose="02020603050405020304" pitchFamily="18" charset="0"/>
+            </a:endParaRPr>
+          </a:p>
+        </p:txBody>
+      </p:sp>
+      <p:sp>
+        <p:nvSpPr>
+          <p:cNvPr id="6" name="Rectangle 5">
+            <a:extLst>
+              <a:ext uri="{FF2B5EF4-FFF2-40B4-BE49-F238E27FC236}">
+                <a16:creationId xmlns:a16="http://schemas.microsoft.com/office/drawing/2014/main" id="{269E22DF-F0AF-D206-AA58-880707AF3406}"/>
+              </a:ext>
+            </a:extLst>
+          </p:cNvPr>
+          <p:cNvSpPr/>
+          <p:nvPr/>
+        </p:nvSpPr>
+        <p:spPr>
+          <a:xfrm>
+            <a:off x="3505434" y="3501922"/>
+            <a:ext cx="4402619" cy="95388"/>
+          </a:xfrm>
+          <a:prstGeom prst="rect">
+            <a:avLst/>
+          </a:prstGeom>
+          <a:solidFill>
+            <a:srgbClr val="56517E"/>
+          </a:solidFill>
+          <a:ln>
+            <a:noFill/>
+          </a:ln>
+        </p:spPr>
+        <p:style>
+          <a:lnRef idx="2">
+            <a:schemeClr val="accent1">
+              <a:shade val="15000"/>
+            </a:schemeClr>
+          </a:lnRef>
+          <a:fillRef idx="1">
+            <a:schemeClr val="accent1"/>
+          </a:fillRef>
+          <a:effectRef idx="0">
+            <a:schemeClr val="accent1"/>
+          </a:effectRef>
+          <a:fontRef idx="minor">
+            <a:schemeClr val="lt1"/>
+          </a:fontRef>
+        </p:style>
+        <p:txBody>
+          <a:bodyPr rtlCol="0" anchor="ctr"/>
+          <a:lstStyle/>
+          <a:p>
+            <a:pPr algn="ctr"/>
+            <a:endParaRPr lang="it-IT"/>
+          </a:p>
+        </p:txBody>
+      </p:sp>
+      <p:pic>
+        <p:nvPicPr>
+          <p:cNvPr id="5" name="Graphic 4" descr="Monitor outline">
+            <a:extLst>
+              <a:ext uri="{FF2B5EF4-FFF2-40B4-BE49-F238E27FC236}">
+                <a16:creationId xmlns:a16="http://schemas.microsoft.com/office/drawing/2014/main" id="{057AE615-702F-1A4D-6C9A-6042196C082A}"/>
+              </a:ext>
+            </a:extLst>
+          </p:cNvPr>
+          <p:cNvPicPr>
+            <a:picLocks noChangeAspect="1"/>
+          </p:cNvPicPr>
+          <p:nvPr/>
+        </p:nvPicPr>
+        <p:blipFill>
+          <a:blip r:embed="rId3">
+            <a:extLst>
+              <a:ext uri="{96DAC541-7B7A-43D3-8B79-37D633B846F1}">
+                <asvg:svgBlip xmlns:asvg="http://schemas.microsoft.com/office/drawing/2016/SVG/main" r:embed="rId4"/>
+              </a:ext>
+            </a:extLst>
+          </a:blip>
+          <a:stretch>
+            <a:fillRect/>
+          </a:stretch>
+        </p:blipFill>
+        <p:spPr>
+          <a:xfrm>
+            <a:off x="1358190" y="2499528"/>
+            <a:ext cx="2349651" cy="2349651"/>
+          </a:xfrm>
+          <a:prstGeom prst="rect">
+            <a:avLst/>
+          </a:prstGeom>
+        </p:spPr>
+      </p:pic>
+      <p:sp>
+        <p:nvSpPr>
+          <p:cNvPr id="7" name="Rectangle 6">
+            <a:extLst>
+              <a:ext uri="{FF2B5EF4-FFF2-40B4-BE49-F238E27FC236}">
+                <a16:creationId xmlns:a16="http://schemas.microsoft.com/office/drawing/2014/main" id="{761FCAE0-DB86-3AC5-0EA1-71929C2FB336}"/>
+              </a:ext>
+            </a:extLst>
+          </p:cNvPr>
+          <p:cNvSpPr/>
+          <p:nvPr/>
+        </p:nvSpPr>
+        <p:spPr>
+          <a:xfrm>
+            <a:off x="6390751" y="2605810"/>
+            <a:ext cx="80386" cy="981452"/>
+          </a:xfrm>
+          <a:prstGeom prst="rect">
+            <a:avLst/>
+          </a:prstGeom>
+          <a:solidFill>
+            <a:srgbClr val="56517E"/>
+          </a:solidFill>
+          <a:ln>
+            <a:noFill/>
+          </a:ln>
+        </p:spPr>
+        <p:style>
+          <a:lnRef idx="2">
+            <a:schemeClr val="accent1">
+              <a:shade val="15000"/>
+            </a:schemeClr>
+          </a:lnRef>
+          <a:fillRef idx="1">
+            <a:schemeClr val="accent1"/>
+          </a:fillRef>
+          <a:effectRef idx="0">
+            <a:schemeClr val="accent1"/>
+          </a:effectRef>
+          <a:fontRef idx="minor">
+            <a:schemeClr val="lt1"/>
+          </a:fontRef>
+        </p:style>
+        <p:txBody>
+          <a:bodyPr rtlCol="0" anchor="ctr"/>
+          <a:lstStyle/>
+          <a:p>
+            <a:pPr algn="ctr"/>
+            <a:endParaRPr lang="it-IT"/>
+          </a:p>
+        </p:txBody>
+      </p:sp>
+      <p:pic>
+        <p:nvPicPr>
+          <p:cNvPr id="11" name="Graphic 10" descr="Tablet outline">
+            <a:extLst>
+              <a:ext uri="{FF2B5EF4-FFF2-40B4-BE49-F238E27FC236}">
+                <a16:creationId xmlns:a16="http://schemas.microsoft.com/office/drawing/2014/main" id="{ECEF8746-4DE9-167D-BDC7-C9F802C13253}"/>
+              </a:ext>
+            </a:extLst>
+          </p:cNvPr>
+          <p:cNvPicPr>
+            <a:picLocks noChangeAspect="1"/>
+          </p:cNvPicPr>
+          <p:nvPr/>
+        </p:nvPicPr>
+        <p:blipFill>
+          <a:blip r:embed="rId5">
+            <a:extLst>
+              <a:ext uri="{96DAC541-7B7A-43D3-8B79-37D633B846F1}">
+                <asvg:svgBlip xmlns:asvg="http://schemas.microsoft.com/office/drawing/2016/SVG/main" r:embed="rId6"/>
+              </a:ext>
+            </a:extLst>
+          </a:blip>
+          <a:stretch>
+            <a:fillRect/>
+          </a:stretch>
+        </p:blipFill>
+        <p:spPr>
+          <a:xfrm rot="5400000">
+            <a:off x="5797827" y="1576528"/>
+            <a:ext cx="1266235" cy="1018235"/>
+          </a:xfrm>
+          <a:prstGeom prst="rect">
+            <a:avLst/>
+          </a:prstGeom>
+        </p:spPr>
+      </p:pic>
+      <p:sp>
+        <p:nvSpPr>
+          <p:cNvPr id="12" name="Rectangle 11">
+            <a:extLst>
+              <a:ext uri="{FF2B5EF4-FFF2-40B4-BE49-F238E27FC236}">
+                <a16:creationId xmlns:a16="http://schemas.microsoft.com/office/drawing/2014/main" id="{8E584E7F-BE6A-DD5B-48B7-7BCB85B738DD}"/>
+              </a:ext>
+            </a:extLst>
+          </p:cNvPr>
+          <p:cNvSpPr/>
+          <p:nvPr/>
+        </p:nvSpPr>
+        <p:spPr>
+          <a:xfrm>
+            <a:off x="7827667" y="3587262"/>
+            <a:ext cx="80386" cy="981452"/>
+          </a:xfrm>
+          <a:prstGeom prst="rect">
+            <a:avLst/>
+          </a:prstGeom>
+          <a:solidFill>
+            <a:srgbClr val="56517E"/>
+          </a:solidFill>
+          <a:ln>
+            <a:noFill/>
+          </a:ln>
+        </p:spPr>
+        <p:style>
+          <a:lnRef idx="2">
+            <a:schemeClr val="accent1">
+              <a:shade val="15000"/>
+            </a:schemeClr>
+          </a:lnRef>
+          <a:fillRef idx="1">
+            <a:schemeClr val="accent1"/>
+          </a:fillRef>
+          <a:effectRef idx="0">
+            <a:schemeClr val="accent1"/>
+          </a:effectRef>
+          <a:fontRef idx="minor">
+            <a:schemeClr val="lt1"/>
+          </a:fontRef>
+        </p:style>
+        <p:txBody>
+          <a:bodyPr rtlCol="0" anchor="ctr"/>
+          <a:lstStyle/>
+          <a:p>
+            <a:pPr algn="ctr"/>
+            <a:endParaRPr lang="it-IT"/>
+          </a:p>
+        </p:txBody>
+      </p:sp>
+      <p:pic>
+        <p:nvPicPr>
+          <p:cNvPr id="13" name="Graphic 12" descr="Tablet outline">
+            <a:extLst>
+              <a:ext uri="{FF2B5EF4-FFF2-40B4-BE49-F238E27FC236}">
+                <a16:creationId xmlns:a16="http://schemas.microsoft.com/office/drawing/2014/main" id="{D769E223-C314-1830-4613-488C9A79D27F}"/>
+              </a:ext>
+            </a:extLst>
+          </p:cNvPr>
+          <p:cNvPicPr>
+            <a:picLocks noChangeAspect="1"/>
+          </p:cNvPicPr>
+          <p:nvPr/>
+        </p:nvPicPr>
+        <p:blipFill>
+          <a:blip r:embed="rId5">
+            <a:extLst>
+              <a:ext uri="{96DAC541-7B7A-43D3-8B79-37D633B846F1}">
+                <asvg:svgBlip xmlns:asvg="http://schemas.microsoft.com/office/drawing/2016/SVG/main" r:embed="rId6"/>
+              </a:ext>
+            </a:extLst>
+          </a:blip>
+          <a:stretch>
+            <a:fillRect/>
+          </a:stretch>
+        </p:blipFill>
+        <p:spPr>
+          <a:xfrm rot="5400000">
+            <a:off x="7248671" y="4572597"/>
+            <a:ext cx="1266235" cy="1018235"/>
+          </a:xfrm>
+          <a:prstGeom prst="rect">
+            <a:avLst/>
+          </a:prstGeom>
+        </p:spPr>
+      </p:pic>
+      <p:sp>
+        <p:nvSpPr>
+          <p:cNvPr id="14" name="Rectangle 13">
+            <a:extLst>
+              <a:ext uri="{FF2B5EF4-FFF2-40B4-BE49-F238E27FC236}">
+                <a16:creationId xmlns:a16="http://schemas.microsoft.com/office/drawing/2014/main" id="{A8D5C3B9-409B-D975-042D-287A67454CE4}"/>
+              </a:ext>
+            </a:extLst>
+          </p:cNvPr>
+          <p:cNvSpPr/>
+          <p:nvPr/>
+        </p:nvSpPr>
+        <p:spPr>
+          <a:xfrm>
+            <a:off x="7940011" y="3501922"/>
+            <a:ext cx="80386" cy="95388"/>
+          </a:xfrm>
+          <a:prstGeom prst="rect">
+            <a:avLst/>
+          </a:prstGeom>
+          <a:solidFill>
+            <a:srgbClr val="56517E"/>
+          </a:solidFill>
+          <a:ln>
+            <a:noFill/>
+          </a:ln>
+        </p:spPr>
+        <p:style>
+          <a:lnRef idx="2">
+            <a:schemeClr val="accent1">
+              <a:shade val="15000"/>
+            </a:schemeClr>
+          </a:lnRef>
+          <a:fillRef idx="1">
+            <a:schemeClr val="accent1"/>
+          </a:fillRef>
+          <a:effectRef idx="0">
+            <a:schemeClr val="accent1"/>
+          </a:effectRef>
+          <a:fontRef idx="minor">
+            <a:schemeClr val="lt1"/>
+          </a:fontRef>
+        </p:style>
+        <p:txBody>
+          <a:bodyPr rtlCol="0" anchor="ctr"/>
+          <a:lstStyle/>
+          <a:p>
+            <a:pPr algn="ctr"/>
+            <a:endParaRPr lang="it-IT"/>
+          </a:p>
+        </p:txBody>
+      </p:sp>
+      <p:sp>
+        <p:nvSpPr>
+          <p:cNvPr id="15" name="Rectangle 14">
+            <a:extLst>
+              <a:ext uri="{FF2B5EF4-FFF2-40B4-BE49-F238E27FC236}">
+                <a16:creationId xmlns:a16="http://schemas.microsoft.com/office/drawing/2014/main" id="{604EE47B-628B-1867-9957-60F78E2B8020}"/>
+              </a:ext>
+            </a:extLst>
+          </p:cNvPr>
+          <p:cNvSpPr/>
+          <p:nvPr/>
+        </p:nvSpPr>
+        <p:spPr>
+          <a:xfrm>
+            <a:off x="8050917" y="3503597"/>
+            <a:ext cx="80386" cy="93713"/>
+          </a:xfrm>
+          <a:prstGeom prst="rect">
+            <a:avLst/>
+          </a:prstGeom>
+          <a:solidFill>
+            <a:srgbClr val="56517E"/>
+          </a:solidFill>
+          <a:ln>
+            <a:noFill/>
+          </a:ln>
+        </p:spPr>
+        <p:style>
+          <a:lnRef idx="2">
+            <a:schemeClr val="accent1">
+              <a:shade val="15000"/>
+            </a:schemeClr>
+          </a:lnRef>
+          <a:fillRef idx="1">
+            <a:schemeClr val="accent1"/>
+          </a:fillRef>
+          <a:effectRef idx="0">
+            <a:schemeClr val="accent1"/>
+          </a:effectRef>
+          <a:fontRef idx="minor">
+            <a:schemeClr val="lt1"/>
+          </a:fontRef>
+        </p:style>
+        <p:txBody>
+          <a:bodyPr rtlCol="0" anchor="ctr"/>
+          <a:lstStyle/>
+          <a:p>
+            <a:pPr algn="ctr"/>
+            <a:endParaRPr lang="it-IT"/>
+          </a:p>
+        </p:txBody>
+      </p:sp>
+      <p:sp>
+        <p:nvSpPr>
+          <p:cNvPr id="16" name="Rectangle 15">
+            <a:extLst>
+              <a:ext uri="{FF2B5EF4-FFF2-40B4-BE49-F238E27FC236}">
+                <a16:creationId xmlns:a16="http://schemas.microsoft.com/office/drawing/2014/main" id="{D0B155B6-A187-A969-8D12-E169A5C85D0E}"/>
+              </a:ext>
+            </a:extLst>
+          </p:cNvPr>
+          <p:cNvSpPr/>
+          <p:nvPr/>
+        </p:nvSpPr>
+        <p:spPr>
+          <a:xfrm>
+            <a:off x="8158648" y="3501922"/>
+            <a:ext cx="80386" cy="95388"/>
+          </a:xfrm>
+          <a:prstGeom prst="rect">
+            <a:avLst/>
+          </a:prstGeom>
+          <a:solidFill>
+            <a:srgbClr val="56517E"/>
+          </a:solidFill>
+          <a:ln>
+            <a:noFill/>
+          </a:ln>
+        </p:spPr>
+        <p:style>
+          <a:lnRef idx="2">
+            <a:schemeClr val="accent1">
+              <a:shade val="15000"/>
+            </a:schemeClr>
+          </a:lnRef>
+          <a:fillRef idx="1">
+            <a:schemeClr val="accent1"/>
+          </a:fillRef>
+          <a:effectRef idx="0">
+            <a:schemeClr val="accent1"/>
+          </a:effectRef>
+          <a:fontRef idx="minor">
+            <a:schemeClr val="lt1"/>
+          </a:fontRef>
+        </p:style>
+        <p:txBody>
+          <a:bodyPr rtlCol="0" anchor="ctr"/>
+          <a:lstStyle/>
+          <a:p>
+            <a:pPr algn="ctr"/>
+            <a:endParaRPr lang="it-IT"/>
+          </a:p>
+        </p:txBody>
+      </p:sp>
+      <p:pic>
+        <p:nvPicPr>
+          <p:cNvPr id="18" name="Graphic 17" descr="Hourglass 90% outline">
+            <a:extLst>
+              <a:ext uri="{FF2B5EF4-FFF2-40B4-BE49-F238E27FC236}">
+                <a16:creationId xmlns:a16="http://schemas.microsoft.com/office/drawing/2014/main" id="{9E887DAB-2200-293F-353A-106B9B852D8A}"/>
+              </a:ext>
+            </a:extLst>
+          </p:cNvPr>
+          <p:cNvPicPr>
+            <a:picLocks noChangeAspect="1"/>
+          </p:cNvPicPr>
+          <p:nvPr/>
+        </p:nvPicPr>
+        <p:blipFill>
+          <a:blip r:embed="rId7">
+            <a:extLst>
+              <a:ext uri="{96DAC541-7B7A-43D3-8B79-37D633B846F1}">
+                <asvg:svgBlip xmlns:asvg="http://schemas.microsoft.com/office/drawing/2016/SVG/main" r:embed="rId8"/>
+              </a:ext>
+            </a:extLst>
+          </a:blip>
+          <a:stretch>
+            <a:fillRect/>
+          </a:stretch>
+        </p:blipFill>
+        <p:spPr>
+          <a:xfrm>
+            <a:off x="6179953" y="1815786"/>
+            <a:ext cx="506597" cy="506597"/>
+          </a:xfrm>
+          <a:prstGeom prst="rect">
+            <a:avLst/>
+          </a:prstGeom>
+        </p:spPr>
+      </p:pic>
+      <p:sp>
+        <p:nvSpPr>
+          <p:cNvPr id="19" name="TextBox 18">
+            <a:extLst>
+              <a:ext uri="{FF2B5EF4-FFF2-40B4-BE49-F238E27FC236}">
+                <a16:creationId xmlns:a16="http://schemas.microsoft.com/office/drawing/2014/main" id="{85750BE4-8CF0-3C53-AF61-F4BDC37A7967}"/>
+              </a:ext>
+            </a:extLst>
+          </p:cNvPr>
+          <p:cNvSpPr txBox="1"/>
+          <p:nvPr/>
+        </p:nvSpPr>
+        <p:spPr>
+          <a:xfrm>
+            <a:off x="5921827" y="1152856"/>
+            <a:ext cx="1018235" cy="400110"/>
+          </a:xfrm>
+          <a:prstGeom prst="rect">
+            <a:avLst/>
+          </a:prstGeom>
+          <a:noFill/>
+        </p:spPr>
+        <p:txBody>
+          <a:bodyPr wrap="square" rtlCol="0">
+            <a:spAutoFit/>
+          </a:bodyPr>
+          <a:lstStyle/>
+          <a:p>
+            <a:pPr algn="ctr"/>
+            <a:r>
+              <a:rPr lang="it-IT" sz="2000" dirty="0">
+                <a:solidFill>
+                  <a:schemeClr val="accent2">
+                    <a:lumMod val="50000"/>
+                  </a:schemeClr>
+                </a:solidFill>
+                <a:latin typeface="Times New Roman" panose="02020603050405020304" pitchFamily="18" charset="0"/>
+                <a:cs typeface="Times New Roman" panose="02020603050405020304" pitchFamily="18" charset="0"/>
+              </a:rPr>
+              <a:t>Drive 1</a:t>
+            </a:r>
+          </a:p>
+        </p:txBody>
+      </p:sp>
+      <p:sp>
+        <p:nvSpPr>
+          <p:cNvPr id="23" name="Arrow: Bent-Up 22">
+            <a:extLst>
+              <a:ext uri="{FF2B5EF4-FFF2-40B4-BE49-F238E27FC236}">
+                <a16:creationId xmlns:a16="http://schemas.microsoft.com/office/drawing/2014/main" id="{4168703C-5D10-170C-A2AB-92080B41CF77}"/>
+              </a:ext>
+            </a:extLst>
+          </p:cNvPr>
+          <p:cNvSpPr/>
+          <p:nvPr/>
+        </p:nvSpPr>
+        <p:spPr>
+          <a:xfrm rot="10800000" flipH="1">
+            <a:off x="9610229" y="1993772"/>
+            <a:ext cx="755304" cy="1034353"/>
+          </a:xfrm>
+          <a:prstGeom prst="bentUpArrow">
+            <a:avLst>
+              <a:gd name="adj1" fmla="val 17406"/>
+              <a:gd name="adj2" fmla="val 19610"/>
+              <a:gd name="adj3" fmla="val 31787"/>
+            </a:avLst>
+          </a:prstGeom>
+          <a:solidFill>
+            <a:srgbClr val="56517E"/>
+          </a:solidFill>
+          <a:ln>
+            <a:noFill/>
+          </a:ln>
+        </p:spPr>
+        <p:style>
+          <a:lnRef idx="2">
+            <a:schemeClr val="accent1">
+              <a:shade val="15000"/>
+            </a:schemeClr>
+          </a:lnRef>
+          <a:fillRef idx="1">
+            <a:schemeClr val="accent1"/>
+          </a:fillRef>
+          <a:effectRef idx="0">
+            <a:schemeClr val="accent1"/>
+          </a:effectRef>
+          <a:fontRef idx="minor">
+            <a:schemeClr val="lt1"/>
+          </a:fontRef>
+        </p:style>
+        <p:txBody>
+          <a:bodyPr rtlCol="0" anchor="ctr"/>
+          <a:lstStyle/>
+          <a:p>
+            <a:pPr algn="ctr"/>
+            <a:endParaRPr lang="it-IT"/>
+          </a:p>
+        </p:txBody>
+      </p:sp>
+      <p:sp>
+        <p:nvSpPr>
+          <p:cNvPr id="20" name="TextBox 19">
+            <a:extLst>
+              <a:ext uri="{FF2B5EF4-FFF2-40B4-BE49-F238E27FC236}">
+                <a16:creationId xmlns:a16="http://schemas.microsoft.com/office/drawing/2014/main" id="{5985B4D2-860A-20C3-5A4E-0707CD84A08B}"/>
+              </a:ext>
+            </a:extLst>
+          </p:cNvPr>
+          <p:cNvSpPr txBox="1"/>
+          <p:nvPr/>
+        </p:nvSpPr>
+        <p:spPr>
+          <a:xfrm>
+            <a:off x="7398935" y="5632463"/>
+            <a:ext cx="1018235" cy="400110"/>
+          </a:xfrm>
+          <a:prstGeom prst="rect">
+            <a:avLst/>
+          </a:prstGeom>
+          <a:noFill/>
+        </p:spPr>
+        <p:txBody>
+          <a:bodyPr wrap="square" rtlCol="0">
+            <a:spAutoFit/>
+          </a:bodyPr>
+          <a:lstStyle/>
+          <a:p>
+            <a:pPr algn="ctr"/>
+            <a:r>
+              <a:rPr lang="it-IT" sz="2000" dirty="0">
+                <a:solidFill>
+                  <a:schemeClr val="accent2">
+                    <a:lumMod val="50000"/>
+                  </a:schemeClr>
+                </a:solidFill>
+                <a:latin typeface="Times New Roman" panose="02020603050405020304" pitchFamily="18" charset="0"/>
+                <a:cs typeface="Times New Roman" panose="02020603050405020304" pitchFamily="18" charset="0"/>
+              </a:rPr>
+              <a:t>Drive 2</a:t>
+            </a:r>
+          </a:p>
+        </p:txBody>
+      </p:sp>
+      <p:sp>
+        <p:nvSpPr>
+          <p:cNvPr id="21" name="Rectangle: Rounded Corners 20">
+            <a:extLst>
+              <a:ext uri="{FF2B5EF4-FFF2-40B4-BE49-F238E27FC236}">
+                <a16:creationId xmlns:a16="http://schemas.microsoft.com/office/drawing/2014/main" id="{30C48CD4-58B0-7E8A-E74C-BD08F1B9C437}"/>
+              </a:ext>
+            </a:extLst>
+          </p:cNvPr>
+          <p:cNvSpPr/>
+          <p:nvPr/>
+        </p:nvSpPr>
+        <p:spPr>
+          <a:xfrm>
+            <a:off x="6846286" y="1442513"/>
+            <a:ext cx="3005332" cy="1295955"/>
+          </a:xfrm>
+          <a:prstGeom prst="roundRect">
+            <a:avLst/>
+          </a:prstGeom>
+          <a:solidFill>
+            <a:schemeClr val="bg1"/>
+          </a:solidFill>
+          <a:ln w="28575">
+            <a:solidFill>
+              <a:schemeClr val="tx1"/>
+            </a:solidFill>
+          </a:ln>
+        </p:spPr>
+        <p:style>
+          <a:lnRef idx="2">
+            <a:schemeClr val="accent1">
+              <a:shade val="15000"/>
+            </a:schemeClr>
+          </a:lnRef>
+          <a:fillRef idx="1">
+            <a:schemeClr val="accent1"/>
+          </a:fillRef>
+          <a:effectRef idx="0">
+            <a:schemeClr val="accent1"/>
+          </a:effectRef>
+          <a:fontRef idx="minor">
+            <a:schemeClr val="lt1"/>
+          </a:fontRef>
+        </p:style>
+        <p:txBody>
+          <a:bodyPr rtlCol="0" anchor="ctr"/>
+          <a:lstStyle/>
+          <a:p>
+            <a:pPr marL="0" marR="0" lvl="0" indent="0" defTabSz="914400" rtl="0" eaLnBrk="1" fontAlgn="auto" latinLnBrk="0" hangingPunct="1">
+              <a:lnSpc>
+                <a:spcPct val="100000"/>
+              </a:lnSpc>
+              <a:spcBef>
+                <a:spcPts val="0"/>
+              </a:spcBef>
+              <a:spcAft>
+                <a:spcPts val="0"/>
+              </a:spcAft>
+              <a:buClrTx/>
+              <a:buSzTx/>
+              <a:buFontTx/>
+              <a:buNone/>
+              <a:tabLst/>
+              <a:defRPr/>
+            </a:pPr>
             <a:r>
               <a:rPr kumimoji="0" lang="it-IT" sz="2200" b="0" i="0" u="none" strike="noStrike" kern="1200" cap="none" spc="0" normalizeH="0" baseline="0" noProof="0" dirty="0">
                 <a:ln>
@@ -17305,7 +18076,278 @@
                 <a:latin typeface="Times New Roman" panose="02020603050405020304" pitchFamily="18" charset="0"/>
                 <a:cs typeface="Times New Roman" panose="02020603050405020304" pitchFamily="18" charset="0"/>
               </a:rPr>
-              <a:t> per le comunicazioni è stato scelto idoneamente, si potrebbero considerare tutti gli slave che non rispondono entro il limite di tempo come temporaneamente irraggiungibili, ignorando tutti i loro Task almeno una volta</a:t>
+              <a:t>Viene considerato come </a:t>
+            </a:r>
+            <a:r>
+              <a:rPr kumimoji="0" lang="it-IT" sz="2200" b="1" i="0" u="none" strike="noStrike" kern="1200" cap="none" spc="0" normalizeH="0" baseline="0" noProof="0" dirty="0">
+                <a:ln>
+                  <a:noFill/>
+                </a:ln>
+                <a:solidFill>
+                  <a:schemeClr val="tx1"/>
+                </a:solidFill>
+                <a:effectLst/>
+                <a:uLnTx/>
+                <a:uFillTx/>
+                <a:latin typeface="Times New Roman" panose="02020603050405020304" pitchFamily="18" charset="0"/>
+                <a:cs typeface="Times New Roman" panose="02020603050405020304" pitchFamily="18" charset="0"/>
+              </a:rPr>
+              <a:t>temporaneamente</a:t>
+            </a:r>
+            <a:r>
+              <a:rPr kumimoji="0" lang="it-IT" sz="2200" b="1" i="0" u="none" strike="noStrike" kern="1200" cap="none" spc="0" normalizeH="0" noProof="0" dirty="0">
+                <a:ln>
+                  <a:noFill/>
+                </a:ln>
+                <a:solidFill>
+                  <a:schemeClr val="tx1"/>
+                </a:solidFill>
+                <a:effectLst/>
+                <a:uLnTx/>
+                <a:uFillTx/>
+                <a:latin typeface="Times New Roman" panose="02020603050405020304" pitchFamily="18" charset="0"/>
+                <a:cs typeface="Times New Roman" panose="02020603050405020304" pitchFamily="18" charset="0"/>
+              </a:rPr>
+              <a:t> irraggiungibile</a:t>
+            </a:r>
+            <a:endParaRPr kumimoji="0" lang="it-IT" sz="2200" b="0" i="0" u="none" strike="noStrike" kern="1200" cap="none" spc="0" normalizeH="0" baseline="0" noProof="0" dirty="0">
+              <a:ln>
+                <a:noFill/>
+              </a:ln>
+              <a:solidFill>
+                <a:schemeClr val="tx1"/>
+              </a:solidFill>
+              <a:effectLst/>
+              <a:uLnTx/>
+              <a:uFillTx/>
+              <a:latin typeface="Times New Roman" panose="02020603050405020304" pitchFamily="18" charset="0"/>
+              <a:cs typeface="Times New Roman" panose="02020603050405020304" pitchFamily="18" charset="0"/>
+            </a:endParaRPr>
+          </a:p>
+        </p:txBody>
+      </p:sp>
+      <p:sp>
+        <p:nvSpPr>
+          <p:cNvPr id="22" name="Rectangle: Rounded Corners 21">
+            <a:extLst>
+              <a:ext uri="{FF2B5EF4-FFF2-40B4-BE49-F238E27FC236}">
+                <a16:creationId xmlns:a16="http://schemas.microsoft.com/office/drawing/2014/main" id="{965C32DA-7580-A7A9-52A3-0BF76C3A4135}"/>
+              </a:ext>
+            </a:extLst>
+          </p:cNvPr>
+          <p:cNvSpPr/>
+          <p:nvPr/>
+        </p:nvSpPr>
+        <p:spPr>
+          <a:xfrm>
+            <a:off x="8305899" y="3096537"/>
+            <a:ext cx="3664830" cy="1580238"/>
+          </a:xfrm>
+          <a:prstGeom prst="roundRect">
+            <a:avLst/>
+          </a:prstGeom>
+          <a:solidFill>
+            <a:schemeClr val="bg1"/>
+          </a:solidFill>
+          <a:ln w="28575">
+            <a:solidFill>
+              <a:schemeClr val="tx1"/>
+            </a:solidFill>
+          </a:ln>
+        </p:spPr>
+        <p:style>
+          <a:lnRef idx="2">
+            <a:schemeClr val="accent1">
+              <a:shade val="15000"/>
+            </a:schemeClr>
+          </a:lnRef>
+          <a:fillRef idx="1">
+            <a:schemeClr val="accent1"/>
+          </a:fillRef>
+          <a:effectRef idx="0">
+            <a:schemeClr val="accent1"/>
+          </a:effectRef>
+          <a:fontRef idx="minor">
+            <a:schemeClr val="lt1"/>
+          </a:fontRef>
+        </p:style>
+        <p:txBody>
+          <a:bodyPr rtlCol="0" anchor="ctr"/>
+          <a:lstStyle/>
+          <a:p>
+            <a:pPr marL="0" marR="0" lvl="0" indent="0" defTabSz="914400" rtl="0" eaLnBrk="1" fontAlgn="auto" latinLnBrk="0" hangingPunct="1">
+              <a:lnSpc>
+                <a:spcPct val="100000"/>
+              </a:lnSpc>
+              <a:spcBef>
+                <a:spcPts val="0"/>
+              </a:spcBef>
+              <a:spcAft>
+                <a:spcPts val="0"/>
+              </a:spcAft>
+              <a:buClrTx/>
+              <a:buSzTx/>
+              <a:buFontTx/>
+              <a:buNone/>
+              <a:tabLst/>
+              <a:defRPr/>
+            </a:pPr>
+            <a:r>
+              <a:rPr kumimoji="0" lang="it-IT" sz="2200" b="0" i="0" u="none" strike="noStrike" kern="1200" cap="none" spc="0" normalizeH="0" baseline="0" noProof="0" dirty="0">
+                <a:ln>
+                  <a:noFill/>
+                </a:ln>
+                <a:solidFill>
+                  <a:schemeClr val="tx1"/>
+                </a:solidFill>
+                <a:effectLst/>
+                <a:uLnTx/>
+                <a:uFillTx/>
+                <a:latin typeface="Times New Roman" panose="02020603050405020304" pitchFamily="18" charset="0"/>
+                <a:cs typeface="Times New Roman" panose="02020603050405020304" pitchFamily="18" charset="0"/>
+              </a:rPr>
+              <a:t>Tutti i suoi</a:t>
+            </a:r>
+            <a:r>
+              <a:rPr kumimoji="0" lang="it-IT" sz="2200" b="0" i="0" u="none" strike="noStrike" kern="1200" cap="none" spc="0" normalizeH="0" noProof="0" dirty="0">
+                <a:ln>
+                  <a:noFill/>
+                </a:ln>
+                <a:solidFill>
+                  <a:schemeClr val="tx1"/>
+                </a:solidFill>
+                <a:effectLst/>
+                <a:uLnTx/>
+                <a:uFillTx/>
+                <a:latin typeface="Times New Roman" panose="02020603050405020304" pitchFamily="18" charset="0"/>
+                <a:cs typeface="Times New Roman" panose="02020603050405020304" pitchFamily="18" charset="0"/>
+              </a:rPr>
+              <a:t> Task nella coda verranno </a:t>
+            </a:r>
+            <a:r>
+              <a:rPr kumimoji="0" lang="it-IT" sz="2200" b="1" i="0" u="none" strike="noStrike" kern="1200" cap="none" spc="0" normalizeH="0" noProof="0" dirty="0">
+                <a:ln>
+                  <a:noFill/>
+                </a:ln>
+                <a:solidFill>
+                  <a:schemeClr val="tx1"/>
+                </a:solidFill>
+                <a:effectLst/>
+                <a:uLnTx/>
+                <a:uFillTx/>
+                <a:latin typeface="Times New Roman" panose="02020603050405020304" pitchFamily="18" charset="0"/>
+                <a:cs typeface="Times New Roman" panose="02020603050405020304" pitchFamily="18" charset="0"/>
+              </a:rPr>
+              <a:t>temporaneamente saltati </a:t>
+            </a:r>
+            <a:r>
+              <a:rPr kumimoji="0" lang="it-IT" sz="2200" b="0" i="0" u="none" strike="noStrike" kern="1200" cap="none" spc="0" normalizeH="0" noProof="0" dirty="0">
+                <a:ln>
+                  <a:noFill/>
+                </a:ln>
+                <a:solidFill>
+                  <a:schemeClr val="tx1"/>
+                </a:solidFill>
+                <a:effectLst/>
+                <a:uLnTx/>
+                <a:uFillTx/>
+                <a:latin typeface="Times New Roman" panose="02020603050405020304" pitchFamily="18" charset="0"/>
+                <a:cs typeface="Times New Roman" panose="02020603050405020304" pitchFamily="18" charset="0"/>
+              </a:rPr>
+              <a:t>per non occupare il mezzo comunicativo</a:t>
+            </a:r>
+            <a:endParaRPr kumimoji="0" lang="it-IT" sz="2200" b="0" i="0" u="none" strike="noStrike" kern="1200" cap="none" spc="0" normalizeH="0" baseline="0" noProof="0" dirty="0">
+              <a:ln>
+                <a:noFill/>
+              </a:ln>
+              <a:solidFill>
+                <a:schemeClr val="tx1"/>
+              </a:solidFill>
+              <a:effectLst/>
+              <a:uLnTx/>
+              <a:uFillTx/>
+              <a:latin typeface="Times New Roman" panose="02020603050405020304" pitchFamily="18" charset="0"/>
+              <a:cs typeface="Times New Roman" panose="02020603050405020304" pitchFamily="18" charset="0"/>
+            </a:endParaRPr>
+          </a:p>
+        </p:txBody>
+      </p:sp>
+      <p:pic>
+        <p:nvPicPr>
+          <p:cNvPr id="25" name="Graphic 24" descr="Open envelope outline">
+            <a:extLst>
+              <a:ext uri="{FF2B5EF4-FFF2-40B4-BE49-F238E27FC236}">
+                <a16:creationId xmlns:a16="http://schemas.microsoft.com/office/drawing/2014/main" id="{879DAAF1-D0B1-9922-EEFD-FEB758879401}"/>
+              </a:ext>
+            </a:extLst>
+          </p:cNvPr>
+          <p:cNvPicPr>
+            <a:picLocks noChangeAspect="1"/>
+          </p:cNvPicPr>
+          <p:nvPr/>
+        </p:nvPicPr>
+        <p:blipFill>
+          <a:blip r:embed="rId9">
+            <a:extLst>
+              <a:ext uri="{96DAC541-7B7A-43D3-8B79-37D633B846F1}">
+                <asvg:svgBlip xmlns:asvg="http://schemas.microsoft.com/office/drawing/2016/SVG/main" r:embed="rId10"/>
+              </a:ext>
+            </a:extLst>
+          </a:blip>
+          <a:stretch>
+            <a:fillRect/>
+          </a:stretch>
+        </p:blipFill>
+        <p:spPr>
+          <a:xfrm>
+            <a:off x="7654719" y="4860584"/>
+            <a:ext cx="454138" cy="454138"/>
+          </a:xfrm>
+          <a:prstGeom prst="rect">
+            <a:avLst/>
+          </a:prstGeom>
+        </p:spPr>
+      </p:pic>
+      <p:sp>
+        <p:nvSpPr>
+          <p:cNvPr id="26" name="TextBox 25">
+            <a:extLst>
+              <a:ext uri="{FF2B5EF4-FFF2-40B4-BE49-F238E27FC236}">
+                <a16:creationId xmlns:a16="http://schemas.microsoft.com/office/drawing/2014/main" id="{A39A8CFE-488D-6748-4563-AB80944A351A}"/>
+              </a:ext>
+            </a:extLst>
+          </p:cNvPr>
+          <p:cNvSpPr txBox="1"/>
+          <p:nvPr/>
+        </p:nvSpPr>
+        <p:spPr>
+          <a:xfrm>
+            <a:off x="2023897" y="2499528"/>
+            <a:ext cx="1018235" cy="400110"/>
+          </a:xfrm>
+          <a:prstGeom prst="rect">
+            <a:avLst/>
+          </a:prstGeom>
+          <a:noFill/>
+        </p:spPr>
+        <p:txBody>
+          <a:bodyPr wrap="square" rtlCol="0">
+            <a:spAutoFit/>
+          </a:bodyPr>
+          <a:lstStyle/>
+          <a:p>
+            <a:pPr algn="ctr"/>
+            <a:r>
+              <a:rPr lang="it-IT" sz="2000" dirty="0">
+                <a:solidFill>
+                  <a:schemeClr val="accent2">
+                    <a:lumMod val="50000"/>
+                  </a:schemeClr>
+                </a:solidFill>
+                <a:latin typeface="Times New Roman" panose="02020603050405020304" pitchFamily="18" charset="0"/>
+                <a:cs typeface="Times New Roman" panose="02020603050405020304" pitchFamily="18" charset="0"/>
+              </a:rPr>
+              <a:t>HMI</a:t>
             </a:r>
           </a:p>
         </p:txBody>
@@ -17320,6 +18362,1079 @@
   <p:clrMapOvr>
     <a:masterClrMapping/>
   </p:clrMapOvr>
+  <p:timing>
+    <p:tnLst>
+      <p:par>
+        <p:cTn id="1" dur="indefinite" restart="never" nodeType="tmRoot">
+          <p:childTnLst>
+            <p:seq concurrent="1" nextAc="seek">
+              <p:cTn id="2" dur="indefinite" nodeType="mainSeq">
+                <p:childTnLst>
+                  <p:par>
+                    <p:cTn id="3" fill="hold">
+                      <p:stCondLst>
+                        <p:cond delay="indefinite"/>
+                        <p:cond evt="onBegin" delay="0">
+                          <p:tn val="2"/>
+                        </p:cond>
+                      </p:stCondLst>
+                      <p:childTnLst>
+                        <p:par>
+                          <p:cTn id="4" fill="hold">
+                            <p:stCondLst>
+                              <p:cond delay="0"/>
+                            </p:stCondLst>
+                            <p:childTnLst>
+                              <p:par>
+                                <p:cTn id="5" presetID="10" presetClass="entr" presetSubtype="0" fill="hold" grpId="0" nodeType="withEffect">
+                                  <p:stCondLst>
+                                    <p:cond delay="0"/>
+                                  </p:stCondLst>
+                                  <p:childTnLst>
+                                    <p:set>
+                                      <p:cBhvr>
+                                        <p:cTn id="6" dur="1" fill="hold">
+                                          <p:stCondLst>
+                                            <p:cond delay="0"/>
+                                          </p:stCondLst>
+                                        </p:cTn>
+                                        <p:tgtEl>
+                                          <p:spTgt spid="19"/>
+                                        </p:tgtEl>
+                                        <p:attrNameLst>
+                                          <p:attrName>style.visibility</p:attrName>
+                                        </p:attrNameLst>
+                                      </p:cBhvr>
+                                      <p:to>
+                                        <p:strVal val="visible"/>
+                                      </p:to>
+                                    </p:set>
+                                    <p:animEffect transition="in" filter="fade">
+                                      <p:cBhvr>
+                                        <p:cTn id="7" dur="500"/>
+                                        <p:tgtEl>
+                                          <p:spTgt spid="19"/>
+                                        </p:tgtEl>
+                                      </p:cBhvr>
+                                    </p:animEffect>
+                                  </p:childTnLst>
+                                </p:cTn>
+                              </p:par>
+                              <p:par>
+                                <p:cTn id="8" presetID="10" presetClass="entr" presetSubtype="0" fill="hold" grpId="0" nodeType="withEffect">
+                                  <p:stCondLst>
+                                    <p:cond delay="0"/>
+                                  </p:stCondLst>
+                                  <p:childTnLst>
+                                    <p:set>
+                                      <p:cBhvr>
+                                        <p:cTn id="9" dur="1" fill="hold">
+                                          <p:stCondLst>
+                                            <p:cond delay="0"/>
+                                          </p:stCondLst>
+                                        </p:cTn>
+                                        <p:tgtEl>
+                                          <p:spTgt spid="20"/>
+                                        </p:tgtEl>
+                                        <p:attrNameLst>
+                                          <p:attrName>style.visibility</p:attrName>
+                                        </p:attrNameLst>
+                                      </p:cBhvr>
+                                      <p:to>
+                                        <p:strVal val="visible"/>
+                                      </p:to>
+                                    </p:set>
+                                    <p:animEffect transition="in" filter="fade">
+                                      <p:cBhvr>
+                                        <p:cTn id="10" dur="500"/>
+                                        <p:tgtEl>
+                                          <p:spTgt spid="20"/>
+                                        </p:tgtEl>
+                                      </p:cBhvr>
+                                    </p:animEffect>
+                                  </p:childTnLst>
+                                </p:cTn>
+                              </p:par>
+                              <p:par>
+                                <p:cTn id="11" presetID="10" presetClass="entr" presetSubtype="0" fill="hold" nodeType="withEffect">
+                                  <p:stCondLst>
+                                    <p:cond delay="0"/>
+                                  </p:stCondLst>
+                                  <p:childTnLst>
+                                    <p:set>
+                                      <p:cBhvr>
+                                        <p:cTn id="12" dur="1" fill="hold">
+                                          <p:stCondLst>
+                                            <p:cond delay="0"/>
+                                          </p:stCondLst>
+                                        </p:cTn>
+                                        <p:tgtEl>
+                                          <p:spTgt spid="5"/>
+                                        </p:tgtEl>
+                                        <p:attrNameLst>
+                                          <p:attrName>style.visibility</p:attrName>
+                                        </p:attrNameLst>
+                                      </p:cBhvr>
+                                      <p:to>
+                                        <p:strVal val="visible"/>
+                                      </p:to>
+                                    </p:set>
+                                    <p:animEffect transition="in" filter="fade">
+                                      <p:cBhvr>
+                                        <p:cTn id="13" dur="500"/>
+                                        <p:tgtEl>
+                                          <p:spTgt spid="5"/>
+                                        </p:tgtEl>
+                                      </p:cBhvr>
+                                    </p:animEffect>
+                                  </p:childTnLst>
+                                </p:cTn>
+                              </p:par>
+                              <p:par>
+                                <p:cTn id="14" presetID="10" presetClass="entr" presetSubtype="0" fill="hold" grpId="0" nodeType="withEffect">
+                                  <p:stCondLst>
+                                    <p:cond delay="0"/>
+                                  </p:stCondLst>
+                                  <p:childTnLst>
+                                    <p:set>
+                                      <p:cBhvr>
+                                        <p:cTn id="15" dur="1" fill="hold">
+                                          <p:stCondLst>
+                                            <p:cond delay="0"/>
+                                          </p:stCondLst>
+                                        </p:cTn>
+                                        <p:tgtEl>
+                                          <p:spTgt spid="6"/>
+                                        </p:tgtEl>
+                                        <p:attrNameLst>
+                                          <p:attrName>style.visibility</p:attrName>
+                                        </p:attrNameLst>
+                                      </p:cBhvr>
+                                      <p:to>
+                                        <p:strVal val="visible"/>
+                                      </p:to>
+                                    </p:set>
+                                    <p:animEffect transition="in" filter="fade">
+                                      <p:cBhvr>
+                                        <p:cTn id="16" dur="500"/>
+                                        <p:tgtEl>
+                                          <p:spTgt spid="6"/>
+                                        </p:tgtEl>
+                                      </p:cBhvr>
+                                    </p:animEffect>
+                                  </p:childTnLst>
+                                </p:cTn>
+                              </p:par>
+                              <p:par>
+                                <p:cTn id="17" presetID="10" presetClass="entr" presetSubtype="0" fill="hold" grpId="0" nodeType="withEffect">
+                                  <p:stCondLst>
+                                    <p:cond delay="0"/>
+                                  </p:stCondLst>
+                                  <p:childTnLst>
+                                    <p:set>
+                                      <p:cBhvr>
+                                        <p:cTn id="18" dur="1" fill="hold">
+                                          <p:stCondLst>
+                                            <p:cond delay="0"/>
+                                          </p:stCondLst>
+                                        </p:cTn>
+                                        <p:tgtEl>
+                                          <p:spTgt spid="7"/>
+                                        </p:tgtEl>
+                                        <p:attrNameLst>
+                                          <p:attrName>style.visibility</p:attrName>
+                                        </p:attrNameLst>
+                                      </p:cBhvr>
+                                      <p:to>
+                                        <p:strVal val="visible"/>
+                                      </p:to>
+                                    </p:set>
+                                    <p:animEffect transition="in" filter="fade">
+                                      <p:cBhvr>
+                                        <p:cTn id="19" dur="500"/>
+                                        <p:tgtEl>
+                                          <p:spTgt spid="7"/>
+                                        </p:tgtEl>
+                                      </p:cBhvr>
+                                    </p:animEffect>
+                                  </p:childTnLst>
+                                </p:cTn>
+                              </p:par>
+                              <p:par>
+                                <p:cTn id="20" presetID="10" presetClass="entr" presetSubtype="0" fill="hold" nodeType="withEffect">
+                                  <p:stCondLst>
+                                    <p:cond delay="0"/>
+                                  </p:stCondLst>
+                                  <p:childTnLst>
+                                    <p:set>
+                                      <p:cBhvr>
+                                        <p:cTn id="21" dur="1" fill="hold">
+                                          <p:stCondLst>
+                                            <p:cond delay="0"/>
+                                          </p:stCondLst>
+                                        </p:cTn>
+                                        <p:tgtEl>
+                                          <p:spTgt spid="11"/>
+                                        </p:tgtEl>
+                                        <p:attrNameLst>
+                                          <p:attrName>style.visibility</p:attrName>
+                                        </p:attrNameLst>
+                                      </p:cBhvr>
+                                      <p:to>
+                                        <p:strVal val="visible"/>
+                                      </p:to>
+                                    </p:set>
+                                    <p:animEffect transition="in" filter="fade">
+                                      <p:cBhvr>
+                                        <p:cTn id="22" dur="500"/>
+                                        <p:tgtEl>
+                                          <p:spTgt spid="11"/>
+                                        </p:tgtEl>
+                                      </p:cBhvr>
+                                    </p:animEffect>
+                                  </p:childTnLst>
+                                </p:cTn>
+                              </p:par>
+                              <p:par>
+                                <p:cTn id="23" presetID="10" presetClass="entr" presetSubtype="0" fill="hold" grpId="0" nodeType="withEffect">
+                                  <p:stCondLst>
+                                    <p:cond delay="0"/>
+                                  </p:stCondLst>
+                                  <p:childTnLst>
+                                    <p:set>
+                                      <p:cBhvr>
+                                        <p:cTn id="24" dur="1" fill="hold">
+                                          <p:stCondLst>
+                                            <p:cond delay="0"/>
+                                          </p:stCondLst>
+                                        </p:cTn>
+                                        <p:tgtEl>
+                                          <p:spTgt spid="12"/>
+                                        </p:tgtEl>
+                                        <p:attrNameLst>
+                                          <p:attrName>style.visibility</p:attrName>
+                                        </p:attrNameLst>
+                                      </p:cBhvr>
+                                      <p:to>
+                                        <p:strVal val="visible"/>
+                                      </p:to>
+                                    </p:set>
+                                    <p:animEffect transition="in" filter="fade">
+                                      <p:cBhvr>
+                                        <p:cTn id="25" dur="500"/>
+                                        <p:tgtEl>
+                                          <p:spTgt spid="12"/>
+                                        </p:tgtEl>
+                                      </p:cBhvr>
+                                    </p:animEffect>
+                                  </p:childTnLst>
+                                </p:cTn>
+                              </p:par>
+                              <p:par>
+                                <p:cTn id="26" presetID="10" presetClass="entr" presetSubtype="0" fill="hold" nodeType="withEffect">
+                                  <p:stCondLst>
+                                    <p:cond delay="0"/>
+                                  </p:stCondLst>
+                                  <p:childTnLst>
+                                    <p:set>
+                                      <p:cBhvr>
+                                        <p:cTn id="27" dur="1" fill="hold">
+                                          <p:stCondLst>
+                                            <p:cond delay="0"/>
+                                          </p:stCondLst>
+                                        </p:cTn>
+                                        <p:tgtEl>
+                                          <p:spTgt spid="13"/>
+                                        </p:tgtEl>
+                                        <p:attrNameLst>
+                                          <p:attrName>style.visibility</p:attrName>
+                                        </p:attrNameLst>
+                                      </p:cBhvr>
+                                      <p:to>
+                                        <p:strVal val="visible"/>
+                                      </p:to>
+                                    </p:set>
+                                    <p:animEffect transition="in" filter="fade">
+                                      <p:cBhvr>
+                                        <p:cTn id="28" dur="500"/>
+                                        <p:tgtEl>
+                                          <p:spTgt spid="13"/>
+                                        </p:tgtEl>
+                                      </p:cBhvr>
+                                    </p:animEffect>
+                                  </p:childTnLst>
+                                </p:cTn>
+                              </p:par>
+                            </p:childTnLst>
+                          </p:cTn>
+                        </p:par>
+                      </p:childTnLst>
+                    </p:cTn>
+                  </p:par>
+                  <p:par>
+                    <p:cTn id="29" fill="hold">
+                      <p:stCondLst>
+                        <p:cond delay="indefinite"/>
+                      </p:stCondLst>
+                      <p:childTnLst>
+                        <p:par>
+                          <p:cTn id="30" fill="hold">
+                            <p:stCondLst>
+                              <p:cond delay="0"/>
+                            </p:stCondLst>
+                            <p:childTnLst>
+                              <p:par>
+                                <p:cTn id="31" presetID="10" presetClass="entr" presetSubtype="0" fill="hold" grpId="0" nodeType="clickEffect">
+                                  <p:stCondLst>
+                                    <p:cond delay="0"/>
+                                  </p:stCondLst>
+                                  <p:childTnLst>
+                                    <p:set>
+                                      <p:cBhvr>
+                                        <p:cTn id="32" dur="1" fill="hold">
+                                          <p:stCondLst>
+                                            <p:cond delay="0"/>
+                                          </p:stCondLst>
+                                        </p:cTn>
+                                        <p:tgtEl>
+                                          <p:spTgt spid="4"/>
+                                        </p:tgtEl>
+                                        <p:attrNameLst>
+                                          <p:attrName>style.visibility</p:attrName>
+                                        </p:attrNameLst>
+                                      </p:cBhvr>
+                                      <p:to>
+                                        <p:strVal val="visible"/>
+                                      </p:to>
+                                    </p:set>
+                                    <p:animEffect transition="in" filter="fade">
+                                      <p:cBhvr>
+                                        <p:cTn id="33" dur="500"/>
+                                        <p:tgtEl>
+                                          <p:spTgt spid="4"/>
+                                        </p:tgtEl>
+                                      </p:cBhvr>
+                                    </p:animEffect>
+                                  </p:childTnLst>
+                                </p:cTn>
+                              </p:par>
+                              <p:par>
+                                <p:cTn id="34" presetID="10" presetClass="entr" presetSubtype="0" fill="hold" nodeType="withEffect">
+                                  <p:stCondLst>
+                                    <p:cond delay="0"/>
+                                  </p:stCondLst>
+                                  <p:childTnLst>
+                                    <p:set>
+                                      <p:cBhvr>
+                                        <p:cTn id="35" dur="1" fill="hold">
+                                          <p:stCondLst>
+                                            <p:cond delay="0"/>
+                                          </p:stCondLst>
+                                        </p:cTn>
+                                        <p:tgtEl>
+                                          <p:spTgt spid="28"/>
+                                        </p:tgtEl>
+                                        <p:attrNameLst>
+                                          <p:attrName>style.visibility</p:attrName>
+                                        </p:attrNameLst>
+                                      </p:cBhvr>
+                                      <p:to>
+                                        <p:strVal val="visible"/>
+                                      </p:to>
+                                    </p:set>
+                                    <p:animEffect transition="in" filter="fade">
+                                      <p:cBhvr>
+                                        <p:cTn id="36" dur="500"/>
+                                        <p:tgtEl>
+                                          <p:spTgt spid="28"/>
+                                        </p:tgtEl>
+                                      </p:cBhvr>
+                                    </p:animEffect>
+                                  </p:childTnLst>
+                                </p:cTn>
+                              </p:par>
+                              <p:par>
+                                <p:cTn id="37" presetID="10" presetClass="entr" presetSubtype="0" fill="hold" nodeType="withEffect">
+                                  <p:stCondLst>
+                                    <p:cond delay="0"/>
+                                  </p:stCondLst>
+                                  <p:childTnLst>
+                                    <p:set>
+                                      <p:cBhvr>
+                                        <p:cTn id="38" dur="1" fill="hold">
+                                          <p:stCondLst>
+                                            <p:cond delay="0"/>
+                                          </p:stCondLst>
+                                        </p:cTn>
+                                        <p:tgtEl>
+                                          <p:spTgt spid="18"/>
+                                        </p:tgtEl>
+                                        <p:attrNameLst>
+                                          <p:attrName>style.visibility</p:attrName>
+                                        </p:attrNameLst>
+                                      </p:cBhvr>
+                                      <p:to>
+                                        <p:strVal val="visible"/>
+                                      </p:to>
+                                    </p:set>
+                                    <p:animEffect transition="in" filter="fade">
+                                      <p:cBhvr>
+                                        <p:cTn id="39" dur="500"/>
+                                        <p:tgtEl>
+                                          <p:spTgt spid="18"/>
+                                        </p:tgtEl>
+                                      </p:cBhvr>
+                                    </p:animEffect>
+                                  </p:childTnLst>
+                                </p:cTn>
+                              </p:par>
+                              <p:par>
+                                <p:cTn id="40" presetID="19" presetClass="emph" presetSubtype="0" fill="hold" grpId="1" nodeType="withEffect">
+                                  <p:stCondLst>
+                                    <p:cond delay="0"/>
+                                  </p:stCondLst>
+                                  <p:childTnLst>
+                                    <p:animClr clrSpc="rgb" dir="cw">
+                                      <p:cBhvr override="childStyle">
+                                        <p:cTn id="41" dur="500" fill="hold"/>
+                                        <p:tgtEl>
+                                          <p:spTgt spid="7"/>
+                                        </p:tgtEl>
+                                        <p:attrNameLst>
+                                          <p:attrName>style.color</p:attrName>
+                                        </p:attrNameLst>
+                                      </p:cBhvr>
+                                      <p:to>
+                                        <a:srgbClr val="FF3333"/>
+                                      </p:to>
+                                    </p:animClr>
+                                    <p:animClr clrSpc="rgb" dir="cw">
+                                      <p:cBhvr>
+                                        <p:cTn id="42" dur="500" fill="hold"/>
+                                        <p:tgtEl>
+                                          <p:spTgt spid="7"/>
+                                        </p:tgtEl>
+                                        <p:attrNameLst>
+                                          <p:attrName>fillcolor</p:attrName>
+                                        </p:attrNameLst>
+                                      </p:cBhvr>
+                                      <p:to>
+                                        <a:srgbClr val="FF3333"/>
+                                      </p:to>
+                                    </p:animClr>
+                                    <p:set>
+                                      <p:cBhvr>
+                                        <p:cTn id="43" dur="500" fill="hold"/>
+                                        <p:tgtEl>
+                                          <p:spTgt spid="7"/>
+                                        </p:tgtEl>
+                                        <p:attrNameLst>
+                                          <p:attrName>fill.type</p:attrName>
+                                        </p:attrNameLst>
+                                      </p:cBhvr>
+                                      <p:to>
+                                        <p:strVal val="solid"/>
+                                      </p:to>
+                                    </p:set>
+                                    <p:set>
+                                      <p:cBhvr>
+                                        <p:cTn id="44" dur="500" fill="hold"/>
+                                        <p:tgtEl>
+                                          <p:spTgt spid="7"/>
+                                        </p:tgtEl>
+                                        <p:attrNameLst>
+                                          <p:attrName>fill.on</p:attrName>
+                                        </p:attrNameLst>
+                                      </p:cBhvr>
+                                      <p:to>
+                                        <p:strVal val="true"/>
+                                      </p:to>
+                                    </p:set>
+                                  </p:childTnLst>
+                                </p:cTn>
+                              </p:par>
+                            </p:childTnLst>
+                          </p:cTn>
+                        </p:par>
+                        <p:par>
+                          <p:cTn id="45" fill="hold">
+                            <p:stCondLst>
+                              <p:cond delay="500"/>
+                            </p:stCondLst>
+                            <p:childTnLst>
+                              <p:par>
+                                <p:cTn id="46" presetID="10" presetClass="entr" presetSubtype="0" fill="hold" grpId="0" nodeType="afterEffect">
+                                  <p:stCondLst>
+                                    <p:cond delay="0"/>
+                                  </p:stCondLst>
+                                  <p:childTnLst>
+                                    <p:set>
+                                      <p:cBhvr>
+                                        <p:cTn id="47" dur="1" fill="hold">
+                                          <p:stCondLst>
+                                            <p:cond delay="0"/>
+                                          </p:stCondLst>
+                                        </p:cTn>
+                                        <p:tgtEl>
+                                          <p:spTgt spid="21"/>
+                                        </p:tgtEl>
+                                        <p:attrNameLst>
+                                          <p:attrName>style.visibility</p:attrName>
+                                        </p:attrNameLst>
+                                      </p:cBhvr>
+                                      <p:to>
+                                        <p:strVal val="visible"/>
+                                      </p:to>
+                                    </p:set>
+                                    <p:animEffect transition="in" filter="fade">
+                                      <p:cBhvr>
+                                        <p:cTn id="48" dur="500"/>
+                                        <p:tgtEl>
+                                          <p:spTgt spid="21"/>
+                                        </p:tgtEl>
+                                      </p:cBhvr>
+                                    </p:animEffect>
+                                  </p:childTnLst>
+                                </p:cTn>
+                              </p:par>
+                            </p:childTnLst>
+                          </p:cTn>
+                        </p:par>
+                      </p:childTnLst>
+                    </p:cTn>
+                  </p:par>
+                  <p:par>
+                    <p:cTn id="49" fill="hold">
+                      <p:stCondLst>
+                        <p:cond delay="indefinite"/>
+                      </p:stCondLst>
+                      <p:childTnLst>
+                        <p:par>
+                          <p:cTn id="50" fill="hold">
+                            <p:stCondLst>
+                              <p:cond delay="0"/>
+                            </p:stCondLst>
+                            <p:childTnLst>
+                              <p:par>
+                                <p:cTn id="51" presetID="10" presetClass="entr" presetSubtype="0" fill="hold" grpId="0" nodeType="clickEffect">
+                                  <p:stCondLst>
+                                    <p:cond delay="0"/>
+                                  </p:stCondLst>
+                                  <p:childTnLst>
+                                    <p:set>
+                                      <p:cBhvr>
+                                        <p:cTn id="52" dur="1" fill="hold">
+                                          <p:stCondLst>
+                                            <p:cond delay="0"/>
+                                          </p:stCondLst>
+                                        </p:cTn>
+                                        <p:tgtEl>
+                                          <p:spTgt spid="23"/>
+                                        </p:tgtEl>
+                                        <p:attrNameLst>
+                                          <p:attrName>style.visibility</p:attrName>
+                                        </p:attrNameLst>
+                                      </p:cBhvr>
+                                      <p:to>
+                                        <p:strVal val="visible"/>
+                                      </p:to>
+                                    </p:set>
+                                    <p:animEffect transition="in" filter="fade">
+                                      <p:cBhvr>
+                                        <p:cTn id="53" dur="500"/>
+                                        <p:tgtEl>
+                                          <p:spTgt spid="23"/>
+                                        </p:tgtEl>
+                                      </p:cBhvr>
+                                    </p:animEffect>
+                                  </p:childTnLst>
+                                </p:cTn>
+                              </p:par>
+                            </p:childTnLst>
+                          </p:cTn>
+                        </p:par>
+                        <p:par>
+                          <p:cTn id="54" fill="hold">
+                            <p:stCondLst>
+                              <p:cond delay="500"/>
+                            </p:stCondLst>
+                            <p:childTnLst>
+                              <p:par>
+                                <p:cTn id="55" presetID="10" presetClass="entr" presetSubtype="0" fill="hold" grpId="0" nodeType="afterEffect">
+                                  <p:stCondLst>
+                                    <p:cond delay="0"/>
+                                  </p:stCondLst>
+                                  <p:childTnLst>
+                                    <p:set>
+                                      <p:cBhvr>
+                                        <p:cTn id="56" dur="1" fill="hold">
+                                          <p:stCondLst>
+                                            <p:cond delay="0"/>
+                                          </p:stCondLst>
+                                        </p:cTn>
+                                        <p:tgtEl>
+                                          <p:spTgt spid="22"/>
+                                        </p:tgtEl>
+                                        <p:attrNameLst>
+                                          <p:attrName>style.visibility</p:attrName>
+                                        </p:attrNameLst>
+                                      </p:cBhvr>
+                                      <p:to>
+                                        <p:strVal val="visible"/>
+                                      </p:to>
+                                    </p:set>
+                                    <p:animEffect transition="in" filter="fade">
+                                      <p:cBhvr>
+                                        <p:cTn id="57" dur="500"/>
+                                        <p:tgtEl>
+                                          <p:spTgt spid="22"/>
+                                        </p:tgtEl>
+                                      </p:cBhvr>
+                                    </p:animEffect>
+                                  </p:childTnLst>
+                                </p:cTn>
+                              </p:par>
+                              <p:par>
+                                <p:cTn id="58" presetID="19" presetClass="emph" presetSubtype="0" fill="hold" grpId="1" nodeType="withEffect">
+                                  <p:stCondLst>
+                                    <p:cond delay="0"/>
+                                  </p:stCondLst>
+                                  <p:childTnLst>
+                                    <p:animClr clrSpc="rgb" dir="cw">
+                                      <p:cBhvr override="childStyle">
+                                        <p:cTn id="59" dur="500" fill="hold"/>
+                                        <p:tgtEl>
+                                          <p:spTgt spid="6"/>
+                                        </p:tgtEl>
+                                        <p:attrNameLst>
+                                          <p:attrName>style.color</p:attrName>
+                                        </p:attrNameLst>
+                                      </p:cBhvr>
+                                      <p:to>
+                                        <a:srgbClr val="87DD91"/>
+                                      </p:to>
+                                    </p:animClr>
+                                    <p:animClr clrSpc="rgb" dir="cw">
+                                      <p:cBhvr>
+                                        <p:cTn id="60" dur="500" fill="hold"/>
+                                        <p:tgtEl>
+                                          <p:spTgt spid="6"/>
+                                        </p:tgtEl>
+                                        <p:attrNameLst>
+                                          <p:attrName>fillcolor</p:attrName>
+                                        </p:attrNameLst>
+                                      </p:cBhvr>
+                                      <p:to>
+                                        <a:srgbClr val="87DD91"/>
+                                      </p:to>
+                                    </p:animClr>
+                                    <p:set>
+                                      <p:cBhvr>
+                                        <p:cTn id="61" dur="500" fill="hold"/>
+                                        <p:tgtEl>
+                                          <p:spTgt spid="6"/>
+                                        </p:tgtEl>
+                                        <p:attrNameLst>
+                                          <p:attrName>fill.type</p:attrName>
+                                        </p:attrNameLst>
+                                      </p:cBhvr>
+                                      <p:to>
+                                        <p:strVal val="solid"/>
+                                      </p:to>
+                                    </p:set>
+                                    <p:set>
+                                      <p:cBhvr>
+                                        <p:cTn id="62" dur="500" fill="hold"/>
+                                        <p:tgtEl>
+                                          <p:spTgt spid="6"/>
+                                        </p:tgtEl>
+                                        <p:attrNameLst>
+                                          <p:attrName>fill.on</p:attrName>
+                                        </p:attrNameLst>
+                                      </p:cBhvr>
+                                      <p:to>
+                                        <p:strVal val="true"/>
+                                      </p:to>
+                                    </p:set>
+                                  </p:childTnLst>
+                                </p:cTn>
+                              </p:par>
+                              <p:par>
+                                <p:cTn id="63" presetID="19" presetClass="emph" presetSubtype="0" fill="hold" grpId="1" nodeType="withEffect">
+                                  <p:stCondLst>
+                                    <p:cond delay="0"/>
+                                  </p:stCondLst>
+                                  <p:childTnLst>
+                                    <p:animClr clrSpc="rgb" dir="cw">
+                                      <p:cBhvr override="childStyle">
+                                        <p:cTn id="64" dur="500" fill="hold"/>
+                                        <p:tgtEl>
+                                          <p:spTgt spid="12"/>
+                                        </p:tgtEl>
+                                        <p:attrNameLst>
+                                          <p:attrName>style.color</p:attrName>
+                                        </p:attrNameLst>
+                                      </p:cBhvr>
+                                      <p:to>
+                                        <a:srgbClr val="87DD91"/>
+                                      </p:to>
+                                    </p:animClr>
+                                    <p:animClr clrSpc="rgb" dir="cw">
+                                      <p:cBhvr>
+                                        <p:cTn id="65" dur="500" fill="hold"/>
+                                        <p:tgtEl>
+                                          <p:spTgt spid="12"/>
+                                        </p:tgtEl>
+                                        <p:attrNameLst>
+                                          <p:attrName>fillcolor</p:attrName>
+                                        </p:attrNameLst>
+                                      </p:cBhvr>
+                                      <p:to>
+                                        <a:srgbClr val="87DD91"/>
+                                      </p:to>
+                                    </p:animClr>
+                                    <p:set>
+                                      <p:cBhvr>
+                                        <p:cTn id="66" dur="500" fill="hold"/>
+                                        <p:tgtEl>
+                                          <p:spTgt spid="12"/>
+                                        </p:tgtEl>
+                                        <p:attrNameLst>
+                                          <p:attrName>fill.type</p:attrName>
+                                        </p:attrNameLst>
+                                      </p:cBhvr>
+                                      <p:to>
+                                        <p:strVal val="solid"/>
+                                      </p:to>
+                                    </p:set>
+                                    <p:set>
+                                      <p:cBhvr>
+                                        <p:cTn id="67" dur="500" fill="hold"/>
+                                        <p:tgtEl>
+                                          <p:spTgt spid="12"/>
+                                        </p:tgtEl>
+                                        <p:attrNameLst>
+                                          <p:attrName>fill.on</p:attrName>
+                                        </p:attrNameLst>
+                                      </p:cBhvr>
+                                      <p:to>
+                                        <p:strVal val="true"/>
+                                      </p:to>
+                                    </p:set>
+                                  </p:childTnLst>
+                                </p:cTn>
+                              </p:par>
+                              <p:par>
+                                <p:cTn id="68" presetID="19" presetClass="emph" presetSubtype="0" fill="hold" grpId="0" nodeType="withEffect">
+                                  <p:stCondLst>
+                                    <p:cond delay="0"/>
+                                  </p:stCondLst>
+                                  <p:childTnLst>
+                                    <p:animClr clrSpc="rgb" dir="cw">
+                                      <p:cBhvr override="childStyle">
+                                        <p:cTn id="69" dur="500" fill="hold"/>
+                                        <p:tgtEl>
+                                          <p:spTgt spid="14"/>
+                                        </p:tgtEl>
+                                        <p:attrNameLst>
+                                          <p:attrName>style.color</p:attrName>
+                                        </p:attrNameLst>
+                                      </p:cBhvr>
+                                      <p:to>
+                                        <a:srgbClr val="87DD91"/>
+                                      </p:to>
+                                    </p:animClr>
+                                    <p:animClr clrSpc="rgb" dir="cw">
+                                      <p:cBhvr>
+                                        <p:cTn id="70" dur="500" fill="hold"/>
+                                        <p:tgtEl>
+                                          <p:spTgt spid="14"/>
+                                        </p:tgtEl>
+                                        <p:attrNameLst>
+                                          <p:attrName>fillcolor</p:attrName>
+                                        </p:attrNameLst>
+                                      </p:cBhvr>
+                                      <p:to>
+                                        <a:srgbClr val="87DD91"/>
+                                      </p:to>
+                                    </p:animClr>
+                                    <p:set>
+                                      <p:cBhvr>
+                                        <p:cTn id="71" dur="500" fill="hold"/>
+                                        <p:tgtEl>
+                                          <p:spTgt spid="14"/>
+                                        </p:tgtEl>
+                                        <p:attrNameLst>
+                                          <p:attrName>fill.type</p:attrName>
+                                        </p:attrNameLst>
+                                      </p:cBhvr>
+                                      <p:to>
+                                        <p:strVal val="solid"/>
+                                      </p:to>
+                                    </p:set>
+                                    <p:set>
+                                      <p:cBhvr>
+                                        <p:cTn id="72" dur="500" fill="hold"/>
+                                        <p:tgtEl>
+                                          <p:spTgt spid="14"/>
+                                        </p:tgtEl>
+                                        <p:attrNameLst>
+                                          <p:attrName>fill.on</p:attrName>
+                                        </p:attrNameLst>
+                                      </p:cBhvr>
+                                      <p:to>
+                                        <p:strVal val="true"/>
+                                      </p:to>
+                                    </p:set>
+                                  </p:childTnLst>
+                                </p:cTn>
+                              </p:par>
+                              <p:par>
+                                <p:cTn id="73" presetID="19" presetClass="emph" presetSubtype="0" fill="hold" grpId="0" nodeType="withEffect">
+                                  <p:stCondLst>
+                                    <p:cond delay="0"/>
+                                  </p:stCondLst>
+                                  <p:childTnLst>
+                                    <p:animClr clrSpc="rgb" dir="cw">
+                                      <p:cBhvr override="childStyle">
+                                        <p:cTn id="74" dur="500" fill="hold"/>
+                                        <p:tgtEl>
+                                          <p:spTgt spid="15"/>
+                                        </p:tgtEl>
+                                        <p:attrNameLst>
+                                          <p:attrName>style.color</p:attrName>
+                                        </p:attrNameLst>
+                                      </p:cBhvr>
+                                      <p:to>
+                                        <a:srgbClr val="87DD91"/>
+                                      </p:to>
+                                    </p:animClr>
+                                    <p:animClr clrSpc="rgb" dir="cw">
+                                      <p:cBhvr>
+                                        <p:cTn id="75" dur="500" fill="hold"/>
+                                        <p:tgtEl>
+                                          <p:spTgt spid="15"/>
+                                        </p:tgtEl>
+                                        <p:attrNameLst>
+                                          <p:attrName>fillcolor</p:attrName>
+                                        </p:attrNameLst>
+                                      </p:cBhvr>
+                                      <p:to>
+                                        <a:srgbClr val="87DD91"/>
+                                      </p:to>
+                                    </p:animClr>
+                                    <p:set>
+                                      <p:cBhvr>
+                                        <p:cTn id="76" dur="500" fill="hold"/>
+                                        <p:tgtEl>
+                                          <p:spTgt spid="15"/>
+                                        </p:tgtEl>
+                                        <p:attrNameLst>
+                                          <p:attrName>fill.type</p:attrName>
+                                        </p:attrNameLst>
+                                      </p:cBhvr>
+                                      <p:to>
+                                        <p:strVal val="solid"/>
+                                      </p:to>
+                                    </p:set>
+                                    <p:set>
+                                      <p:cBhvr>
+                                        <p:cTn id="77" dur="500" fill="hold"/>
+                                        <p:tgtEl>
+                                          <p:spTgt spid="15"/>
+                                        </p:tgtEl>
+                                        <p:attrNameLst>
+                                          <p:attrName>fill.on</p:attrName>
+                                        </p:attrNameLst>
+                                      </p:cBhvr>
+                                      <p:to>
+                                        <p:strVal val="true"/>
+                                      </p:to>
+                                    </p:set>
+                                  </p:childTnLst>
+                                </p:cTn>
+                              </p:par>
+                              <p:par>
+                                <p:cTn id="78" presetID="19" presetClass="emph" presetSubtype="0" fill="hold" grpId="0" nodeType="withEffect">
+                                  <p:stCondLst>
+                                    <p:cond delay="0"/>
+                                  </p:stCondLst>
+                                  <p:childTnLst>
+                                    <p:animClr clrSpc="rgb" dir="cw">
+                                      <p:cBhvr override="childStyle">
+                                        <p:cTn id="79" dur="500" fill="hold"/>
+                                        <p:tgtEl>
+                                          <p:spTgt spid="16"/>
+                                        </p:tgtEl>
+                                        <p:attrNameLst>
+                                          <p:attrName>style.color</p:attrName>
+                                        </p:attrNameLst>
+                                      </p:cBhvr>
+                                      <p:to>
+                                        <a:srgbClr val="87DD91"/>
+                                      </p:to>
+                                    </p:animClr>
+                                    <p:animClr clrSpc="rgb" dir="cw">
+                                      <p:cBhvr>
+                                        <p:cTn id="80" dur="500" fill="hold"/>
+                                        <p:tgtEl>
+                                          <p:spTgt spid="16"/>
+                                        </p:tgtEl>
+                                        <p:attrNameLst>
+                                          <p:attrName>fillcolor</p:attrName>
+                                        </p:attrNameLst>
+                                      </p:cBhvr>
+                                      <p:to>
+                                        <a:srgbClr val="87DD91"/>
+                                      </p:to>
+                                    </p:animClr>
+                                    <p:set>
+                                      <p:cBhvr>
+                                        <p:cTn id="81" dur="500" fill="hold"/>
+                                        <p:tgtEl>
+                                          <p:spTgt spid="16"/>
+                                        </p:tgtEl>
+                                        <p:attrNameLst>
+                                          <p:attrName>fill.type</p:attrName>
+                                        </p:attrNameLst>
+                                      </p:cBhvr>
+                                      <p:to>
+                                        <p:strVal val="solid"/>
+                                      </p:to>
+                                    </p:set>
+                                    <p:set>
+                                      <p:cBhvr>
+                                        <p:cTn id="82" dur="500" fill="hold"/>
+                                        <p:tgtEl>
+                                          <p:spTgt spid="16"/>
+                                        </p:tgtEl>
+                                        <p:attrNameLst>
+                                          <p:attrName>fill.on</p:attrName>
+                                        </p:attrNameLst>
+                                      </p:cBhvr>
+                                      <p:to>
+                                        <p:strVal val="true"/>
+                                      </p:to>
+                                    </p:set>
+                                  </p:childTnLst>
+                                </p:cTn>
+                              </p:par>
+                              <p:par>
+                                <p:cTn id="83" presetID="10" presetClass="entr" presetSubtype="0" fill="hold" nodeType="withEffect">
+                                  <p:stCondLst>
+                                    <p:cond delay="0"/>
+                                  </p:stCondLst>
+                                  <p:childTnLst>
+                                    <p:set>
+                                      <p:cBhvr>
+                                        <p:cTn id="84" dur="1" fill="hold">
+                                          <p:stCondLst>
+                                            <p:cond delay="0"/>
+                                          </p:stCondLst>
+                                        </p:cTn>
+                                        <p:tgtEl>
+                                          <p:spTgt spid="25"/>
+                                        </p:tgtEl>
+                                        <p:attrNameLst>
+                                          <p:attrName>style.visibility</p:attrName>
+                                        </p:attrNameLst>
+                                      </p:cBhvr>
+                                      <p:to>
+                                        <p:strVal val="visible"/>
+                                      </p:to>
+                                    </p:set>
+                                    <p:animEffect transition="in" filter="fade">
+                                      <p:cBhvr>
+                                        <p:cTn id="85" dur="500"/>
+                                        <p:tgtEl>
+                                          <p:spTgt spid="25"/>
+                                        </p:tgtEl>
+                                      </p:cBhvr>
+                                    </p:animEffect>
+                                  </p:childTnLst>
+                                </p:cTn>
+                              </p:par>
+                              <p:par>
+                                <p:cTn id="86" presetID="10" presetClass="entr" presetSubtype="0" fill="hold" grpId="0" nodeType="withEffect">
+                                  <p:stCondLst>
+                                    <p:cond delay="0"/>
+                                  </p:stCondLst>
+                                  <p:childTnLst>
+                                    <p:set>
+                                      <p:cBhvr>
+                                        <p:cTn id="87" dur="1" fill="hold">
+                                          <p:stCondLst>
+                                            <p:cond delay="0"/>
+                                          </p:stCondLst>
+                                        </p:cTn>
+                                        <p:tgtEl>
+                                          <p:spTgt spid="26"/>
+                                        </p:tgtEl>
+                                        <p:attrNameLst>
+                                          <p:attrName>style.visibility</p:attrName>
+                                        </p:attrNameLst>
+                                      </p:cBhvr>
+                                      <p:to>
+                                        <p:strVal val="visible"/>
+                                      </p:to>
+                                    </p:set>
+                                    <p:animEffect transition="in" filter="fade">
+                                      <p:cBhvr>
+                                        <p:cTn id="88" dur="500"/>
+                                        <p:tgtEl>
+                                          <p:spTgt spid="26"/>
+                                        </p:tgtEl>
+                                      </p:cBhvr>
+                                    </p:animEffect>
+                                  </p:childTnLst>
+                                </p:cTn>
+                              </p:par>
+                            </p:childTnLst>
+                          </p:cTn>
+                        </p:par>
+                      </p:childTnLst>
+                    </p:cTn>
+                  </p:par>
+                </p:childTnLst>
+              </p:cTn>
+              <p:prevCondLst>
+                <p:cond evt="onPrev" delay="0">
+                  <p:tgtEl>
+                    <p:sldTgt/>
+                  </p:tgtEl>
+                </p:cond>
+              </p:prevCondLst>
+              <p:nextCondLst>
+                <p:cond evt="onNext" delay="0">
+                  <p:tgtEl>
+                    <p:sldTgt/>
+                  </p:tgtEl>
+                </p:cond>
+              </p:nextCondLst>
+            </p:seq>
+          </p:childTnLst>
+        </p:cTn>
+      </p:par>
+    </p:tnLst>
+    <p:bldLst>
+      <p:bldP spid="4" grpId="0" animBg="1"/>
+      <p:bldP spid="6" grpId="0" animBg="1"/>
+      <p:bldP spid="6" grpId="1" animBg="1"/>
+      <p:bldP spid="7" grpId="0" animBg="1"/>
+      <p:bldP spid="7" grpId="1" animBg="1"/>
+      <p:bldP spid="12" grpId="0" animBg="1"/>
+      <p:bldP spid="12" grpId="1" animBg="1"/>
+      <p:bldP spid="14" grpId="0" animBg="1"/>
+      <p:bldP spid="15" grpId="0" animBg="1"/>
+      <p:bldP spid="16" grpId="0" animBg="1"/>
+      <p:bldP spid="19" grpId="0"/>
+      <p:bldP spid="23" grpId="0" animBg="1"/>
+      <p:bldP spid="20" grpId="0"/>
+      <p:bldP spid="21" grpId="0" animBg="1"/>
+      <p:bldP spid="22" grpId="0" animBg="1"/>
+      <p:bldP spid="26" grpId="0"/>
+    </p:bldLst>
+  </p:timing>
 </p:sld>
 </file>
 

</xml_diff>